<commit_message>
Update Final - How to build a team.pptx
</commit_message>
<xml_diff>
--- a/Final - How to build a team.pptx
+++ b/Final - How to build a team.pptx
@@ -5,19 +5,18 @@
     <p:sldMasterId id="2147483648" r:id="rId4"/>
   </p:sldMasterIdLst>
   <p:notesMasterIdLst>
-    <p:notesMasterId r:id="rId12"/>
+    <p:notesMasterId r:id="rId11"/>
   </p:notesMasterIdLst>
   <p:handoutMasterIdLst>
-    <p:handoutMasterId r:id="rId13"/>
+    <p:handoutMasterId r:id="rId12"/>
   </p:handoutMasterIdLst>
   <p:sldIdLst>
     <p:sldId id="298" r:id="rId5"/>
-    <p:sldId id="309" r:id="rId6"/>
-    <p:sldId id="313" r:id="rId7"/>
-    <p:sldId id="301" r:id="rId8"/>
-    <p:sldId id="307" r:id="rId9"/>
-    <p:sldId id="265" r:id="rId10"/>
-    <p:sldId id="296" r:id="rId11"/>
+    <p:sldId id="314" r:id="rId6"/>
+    <p:sldId id="301" r:id="rId7"/>
+    <p:sldId id="307" r:id="rId8"/>
+    <p:sldId id="265" r:id="rId9"/>
+    <p:sldId id="296" r:id="rId10"/>
   </p:sldIdLst>
   <p:sldSz cx="12192000" cy="6858000"/>
   <p:notesSz cx="6858000" cy="9144000"/>
@@ -874,753 +873,6 @@
 </dgm:colorsDef>
 </file>
 
-<file path=ppt/diagrams/colors2.xml><?xml version="1.0" encoding="utf-8"?>
-<dgm:colorsDef xmlns:dgm="http://schemas.openxmlformats.org/drawingml/2006/diagram" xmlns:a="http://schemas.openxmlformats.org/drawingml/2006/main" uniqueId="urn:microsoft.com/office/officeart/2005/8/colors/accent1_2">
-  <dgm:title val=""/>
-  <dgm:desc val=""/>
-  <dgm:catLst>
-    <dgm:cat type="accent1" pri="11200"/>
-  </dgm:catLst>
-  <dgm:styleLbl name="node0">
-    <dgm:fillClrLst meth="repeat">
-      <a:schemeClr val="accent1"/>
-    </dgm:fillClrLst>
-    <dgm:linClrLst meth="repeat">
-      <a:schemeClr val="lt1"/>
-    </dgm:linClrLst>
-    <dgm:effectClrLst/>
-    <dgm:txLinClrLst/>
-    <dgm:txFillClrLst/>
-    <dgm:txEffectClrLst/>
-  </dgm:styleLbl>
-  <dgm:styleLbl name="alignNode1">
-    <dgm:fillClrLst meth="repeat">
-      <a:schemeClr val="accent1"/>
-    </dgm:fillClrLst>
-    <dgm:linClrLst meth="repeat">
-      <a:schemeClr val="accent1"/>
-    </dgm:linClrLst>
-    <dgm:effectClrLst/>
-    <dgm:txLinClrLst/>
-    <dgm:txFillClrLst/>
-    <dgm:txEffectClrLst/>
-  </dgm:styleLbl>
-  <dgm:styleLbl name="node1">
-    <dgm:fillClrLst meth="repeat">
-      <a:schemeClr val="accent1"/>
-    </dgm:fillClrLst>
-    <dgm:linClrLst meth="repeat">
-      <a:schemeClr val="lt1"/>
-    </dgm:linClrLst>
-    <dgm:effectClrLst/>
-    <dgm:txLinClrLst/>
-    <dgm:txFillClrLst/>
-    <dgm:txEffectClrLst/>
-  </dgm:styleLbl>
-  <dgm:styleLbl name="lnNode1">
-    <dgm:fillClrLst meth="repeat">
-      <a:schemeClr val="accent1"/>
-    </dgm:fillClrLst>
-    <dgm:linClrLst meth="repeat">
-      <a:schemeClr val="lt1"/>
-    </dgm:linClrLst>
-    <dgm:effectClrLst/>
-    <dgm:txLinClrLst/>
-    <dgm:txFillClrLst/>
-    <dgm:txEffectClrLst/>
-  </dgm:styleLbl>
-  <dgm:styleLbl name="vennNode1">
-    <dgm:fillClrLst meth="repeat">
-      <a:schemeClr val="accent1">
-        <a:alpha val="50000"/>
-      </a:schemeClr>
-    </dgm:fillClrLst>
-    <dgm:linClrLst meth="repeat">
-      <a:schemeClr val="lt1"/>
-    </dgm:linClrLst>
-    <dgm:effectClrLst/>
-    <dgm:txLinClrLst/>
-    <dgm:txFillClrLst/>
-    <dgm:txEffectClrLst/>
-  </dgm:styleLbl>
-  <dgm:styleLbl name="node2">
-    <dgm:fillClrLst meth="repeat">
-      <a:schemeClr val="accent1"/>
-    </dgm:fillClrLst>
-    <dgm:linClrLst meth="repeat">
-      <a:schemeClr val="lt1"/>
-    </dgm:linClrLst>
-    <dgm:effectClrLst/>
-    <dgm:txLinClrLst/>
-    <dgm:txFillClrLst/>
-    <dgm:txEffectClrLst/>
-  </dgm:styleLbl>
-  <dgm:styleLbl name="node3">
-    <dgm:fillClrLst meth="repeat">
-      <a:schemeClr val="accent1"/>
-    </dgm:fillClrLst>
-    <dgm:linClrLst meth="repeat">
-      <a:schemeClr val="lt1"/>
-    </dgm:linClrLst>
-    <dgm:effectClrLst/>
-    <dgm:txLinClrLst/>
-    <dgm:txFillClrLst/>
-    <dgm:txEffectClrLst/>
-  </dgm:styleLbl>
-  <dgm:styleLbl name="node4">
-    <dgm:fillClrLst meth="repeat">
-      <a:schemeClr val="accent1"/>
-    </dgm:fillClrLst>
-    <dgm:linClrLst meth="repeat">
-      <a:schemeClr val="lt1"/>
-    </dgm:linClrLst>
-    <dgm:effectClrLst/>
-    <dgm:txLinClrLst/>
-    <dgm:txFillClrLst/>
-    <dgm:txEffectClrLst/>
-  </dgm:styleLbl>
-  <dgm:styleLbl name="fgImgPlace1">
-    <dgm:fillClrLst meth="repeat">
-      <a:schemeClr val="accent1">
-        <a:tint val="50000"/>
-      </a:schemeClr>
-    </dgm:fillClrLst>
-    <dgm:linClrLst meth="repeat">
-      <a:schemeClr val="lt1"/>
-    </dgm:linClrLst>
-    <dgm:effectClrLst/>
-    <dgm:txLinClrLst/>
-    <dgm:txFillClrLst meth="repeat">
-      <a:schemeClr val="lt1"/>
-    </dgm:txFillClrLst>
-    <dgm:txEffectClrLst/>
-  </dgm:styleLbl>
-  <dgm:styleLbl name="alignImgPlace1">
-    <dgm:fillClrLst meth="repeat">
-      <a:schemeClr val="accent1">
-        <a:tint val="50000"/>
-      </a:schemeClr>
-    </dgm:fillClrLst>
-    <dgm:linClrLst meth="repeat">
-      <a:schemeClr val="lt1"/>
-    </dgm:linClrLst>
-    <dgm:effectClrLst/>
-    <dgm:txLinClrLst/>
-    <dgm:txFillClrLst meth="repeat">
-      <a:schemeClr val="lt1"/>
-    </dgm:txFillClrLst>
-    <dgm:txEffectClrLst/>
-  </dgm:styleLbl>
-  <dgm:styleLbl name="bgImgPlace1">
-    <dgm:fillClrLst meth="repeat">
-      <a:schemeClr val="accent1">
-        <a:tint val="50000"/>
-      </a:schemeClr>
-    </dgm:fillClrLst>
-    <dgm:linClrLst meth="repeat">
-      <a:schemeClr val="lt1"/>
-    </dgm:linClrLst>
-    <dgm:effectClrLst/>
-    <dgm:txLinClrLst/>
-    <dgm:txFillClrLst meth="repeat">
-      <a:schemeClr val="lt1"/>
-    </dgm:txFillClrLst>
-    <dgm:txEffectClrLst/>
-  </dgm:styleLbl>
-  <dgm:styleLbl name="sibTrans2D1">
-    <dgm:fillClrLst meth="repeat">
-      <a:schemeClr val="accent1">
-        <a:tint val="60000"/>
-      </a:schemeClr>
-    </dgm:fillClrLst>
-    <dgm:linClrLst meth="repeat">
-      <a:schemeClr val="accent1">
-        <a:tint val="60000"/>
-      </a:schemeClr>
-    </dgm:linClrLst>
-    <dgm:effectClrLst/>
-    <dgm:txLinClrLst/>
-    <dgm:txFillClrLst/>
-    <dgm:txEffectClrLst/>
-  </dgm:styleLbl>
-  <dgm:styleLbl name="fgSibTrans2D1">
-    <dgm:fillClrLst meth="repeat">
-      <a:schemeClr val="accent1">
-        <a:tint val="60000"/>
-      </a:schemeClr>
-    </dgm:fillClrLst>
-    <dgm:linClrLst meth="repeat">
-      <a:schemeClr val="accent1">
-        <a:tint val="60000"/>
-      </a:schemeClr>
-    </dgm:linClrLst>
-    <dgm:effectClrLst/>
-    <dgm:txLinClrLst/>
-    <dgm:txFillClrLst/>
-    <dgm:txEffectClrLst/>
-  </dgm:styleLbl>
-  <dgm:styleLbl name="bgSibTrans2D1">
-    <dgm:fillClrLst meth="repeat">
-      <a:schemeClr val="accent1">
-        <a:tint val="60000"/>
-      </a:schemeClr>
-    </dgm:fillClrLst>
-    <dgm:linClrLst meth="repeat">
-      <a:schemeClr val="accent1">
-        <a:tint val="60000"/>
-      </a:schemeClr>
-    </dgm:linClrLst>
-    <dgm:effectClrLst/>
-    <dgm:txLinClrLst/>
-    <dgm:txFillClrLst/>
-    <dgm:txEffectClrLst/>
-  </dgm:styleLbl>
-  <dgm:styleLbl name="sibTrans1D1">
-    <dgm:fillClrLst meth="repeat">
-      <a:schemeClr val="accent1"/>
-    </dgm:fillClrLst>
-    <dgm:linClrLst meth="repeat">
-      <a:schemeClr val="accent1"/>
-    </dgm:linClrLst>
-    <dgm:effectClrLst/>
-    <dgm:txLinClrLst/>
-    <dgm:txFillClrLst meth="repeat">
-      <a:schemeClr val="tx1"/>
-    </dgm:txFillClrLst>
-    <dgm:txEffectClrLst/>
-  </dgm:styleLbl>
-  <dgm:styleLbl name="callout">
-    <dgm:fillClrLst meth="repeat">
-      <a:schemeClr val="accent1"/>
-    </dgm:fillClrLst>
-    <dgm:linClrLst meth="repeat">
-      <a:schemeClr val="accent1">
-        <a:tint val="50000"/>
-      </a:schemeClr>
-    </dgm:linClrLst>
-    <dgm:effectClrLst/>
-    <dgm:txLinClrLst/>
-    <dgm:txFillClrLst meth="repeat">
-      <a:schemeClr val="tx1"/>
-    </dgm:txFillClrLst>
-    <dgm:txEffectClrLst/>
-  </dgm:styleLbl>
-  <dgm:styleLbl name="asst0">
-    <dgm:fillClrLst meth="repeat">
-      <a:schemeClr val="accent1"/>
-    </dgm:fillClrLst>
-    <dgm:linClrLst meth="repeat">
-      <a:schemeClr val="lt1"/>
-    </dgm:linClrLst>
-    <dgm:effectClrLst/>
-    <dgm:txLinClrLst/>
-    <dgm:txFillClrLst/>
-    <dgm:txEffectClrLst/>
-  </dgm:styleLbl>
-  <dgm:styleLbl name="asst1">
-    <dgm:fillClrLst meth="repeat">
-      <a:schemeClr val="accent1"/>
-    </dgm:fillClrLst>
-    <dgm:linClrLst meth="repeat">
-      <a:schemeClr val="lt1"/>
-    </dgm:linClrLst>
-    <dgm:effectClrLst/>
-    <dgm:txLinClrLst/>
-    <dgm:txFillClrLst/>
-    <dgm:txEffectClrLst/>
-  </dgm:styleLbl>
-  <dgm:styleLbl name="asst2">
-    <dgm:fillClrLst meth="repeat">
-      <a:schemeClr val="accent1"/>
-    </dgm:fillClrLst>
-    <dgm:linClrLst meth="repeat">
-      <a:schemeClr val="lt1"/>
-    </dgm:linClrLst>
-    <dgm:effectClrLst/>
-    <dgm:txLinClrLst/>
-    <dgm:txFillClrLst/>
-    <dgm:txEffectClrLst/>
-  </dgm:styleLbl>
-  <dgm:styleLbl name="asst3">
-    <dgm:fillClrLst meth="repeat">
-      <a:schemeClr val="accent1"/>
-    </dgm:fillClrLst>
-    <dgm:linClrLst meth="repeat">
-      <a:schemeClr val="lt1"/>
-    </dgm:linClrLst>
-    <dgm:effectClrLst/>
-    <dgm:txLinClrLst/>
-    <dgm:txFillClrLst/>
-    <dgm:txEffectClrLst/>
-  </dgm:styleLbl>
-  <dgm:styleLbl name="asst4">
-    <dgm:fillClrLst meth="repeat">
-      <a:schemeClr val="accent1"/>
-    </dgm:fillClrLst>
-    <dgm:linClrLst meth="repeat">
-      <a:schemeClr val="lt1"/>
-    </dgm:linClrLst>
-    <dgm:effectClrLst/>
-    <dgm:txLinClrLst/>
-    <dgm:txFillClrLst/>
-    <dgm:txEffectClrLst/>
-  </dgm:styleLbl>
-  <dgm:styleLbl name="parChTrans2D1">
-    <dgm:fillClrLst meth="repeat">
-      <a:schemeClr val="accent1">
-        <a:tint val="60000"/>
-      </a:schemeClr>
-    </dgm:fillClrLst>
-    <dgm:linClrLst meth="repeat">
-      <a:schemeClr val="accent1">
-        <a:tint val="60000"/>
-      </a:schemeClr>
-    </dgm:linClrLst>
-    <dgm:effectClrLst/>
-    <dgm:txLinClrLst/>
-    <dgm:txFillClrLst meth="repeat">
-      <a:schemeClr val="lt1"/>
-    </dgm:txFillClrLst>
-    <dgm:txEffectClrLst/>
-  </dgm:styleLbl>
-  <dgm:styleLbl name="parChTrans2D2">
-    <dgm:fillClrLst meth="repeat">
-      <a:schemeClr val="accent1"/>
-    </dgm:fillClrLst>
-    <dgm:linClrLst meth="repeat">
-      <a:schemeClr val="accent1"/>
-    </dgm:linClrLst>
-    <dgm:effectClrLst/>
-    <dgm:txLinClrLst/>
-    <dgm:txFillClrLst meth="repeat">
-      <a:schemeClr val="lt1"/>
-    </dgm:txFillClrLst>
-    <dgm:txEffectClrLst/>
-  </dgm:styleLbl>
-  <dgm:styleLbl name="parChTrans2D3">
-    <dgm:fillClrLst meth="repeat">
-      <a:schemeClr val="accent1"/>
-    </dgm:fillClrLst>
-    <dgm:linClrLst meth="repeat">
-      <a:schemeClr val="accent1"/>
-    </dgm:linClrLst>
-    <dgm:effectClrLst/>
-    <dgm:txLinClrLst/>
-    <dgm:txFillClrLst meth="repeat">
-      <a:schemeClr val="lt1"/>
-    </dgm:txFillClrLst>
-    <dgm:txEffectClrLst/>
-  </dgm:styleLbl>
-  <dgm:styleLbl name="parChTrans2D4">
-    <dgm:fillClrLst meth="repeat">
-      <a:schemeClr val="accent1"/>
-    </dgm:fillClrLst>
-    <dgm:linClrLst meth="repeat">
-      <a:schemeClr val="accent1"/>
-    </dgm:linClrLst>
-    <dgm:effectClrLst/>
-    <dgm:txLinClrLst/>
-    <dgm:txFillClrLst meth="repeat">
-      <a:schemeClr val="lt1"/>
-    </dgm:txFillClrLst>
-    <dgm:txEffectClrLst/>
-  </dgm:styleLbl>
-  <dgm:styleLbl name="parChTrans1D1">
-    <dgm:fillClrLst meth="repeat">
-      <a:schemeClr val="accent1"/>
-    </dgm:fillClrLst>
-    <dgm:linClrLst meth="repeat">
-      <a:schemeClr val="accent1">
-        <a:shade val="60000"/>
-      </a:schemeClr>
-    </dgm:linClrLst>
-    <dgm:effectClrLst/>
-    <dgm:txLinClrLst/>
-    <dgm:txFillClrLst meth="repeat">
-      <a:schemeClr val="tx1"/>
-    </dgm:txFillClrLst>
-    <dgm:txEffectClrLst/>
-  </dgm:styleLbl>
-  <dgm:styleLbl name="parChTrans1D2">
-    <dgm:fillClrLst meth="repeat">
-      <a:schemeClr val="accent1"/>
-    </dgm:fillClrLst>
-    <dgm:linClrLst meth="repeat">
-      <a:schemeClr val="accent1">
-        <a:shade val="60000"/>
-      </a:schemeClr>
-    </dgm:linClrLst>
-    <dgm:effectClrLst/>
-    <dgm:txLinClrLst/>
-    <dgm:txFillClrLst meth="repeat">
-      <a:schemeClr val="tx1"/>
-    </dgm:txFillClrLst>
-    <dgm:txEffectClrLst/>
-  </dgm:styleLbl>
-  <dgm:styleLbl name="parChTrans1D3">
-    <dgm:fillClrLst meth="repeat">
-      <a:schemeClr val="accent1"/>
-    </dgm:fillClrLst>
-    <dgm:linClrLst meth="repeat">
-      <a:schemeClr val="accent1">
-        <a:shade val="80000"/>
-      </a:schemeClr>
-    </dgm:linClrLst>
-    <dgm:effectClrLst/>
-    <dgm:txLinClrLst/>
-    <dgm:txFillClrLst meth="repeat">
-      <a:schemeClr val="tx1"/>
-    </dgm:txFillClrLst>
-    <dgm:txEffectClrLst/>
-  </dgm:styleLbl>
-  <dgm:styleLbl name="parChTrans1D4">
-    <dgm:fillClrLst meth="repeat">
-      <a:schemeClr val="accent1"/>
-    </dgm:fillClrLst>
-    <dgm:linClrLst meth="repeat">
-      <a:schemeClr val="accent1">
-        <a:shade val="80000"/>
-      </a:schemeClr>
-    </dgm:linClrLst>
-    <dgm:effectClrLst/>
-    <dgm:txLinClrLst/>
-    <dgm:txFillClrLst meth="repeat">
-      <a:schemeClr val="tx1"/>
-    </dgm:txFillClrLst>
-    <dgm:txEffectClrLst/>
-  </dgm:styleLbl>
-  <dgm:styleLbl name="fgAcc1">
-    <dgm:fillClrLst meth="repeat">
-      <a:schemeClr val="lt1">
-        <a:alpha val="90000"/>
-      </a:schemeClr>
-    </dgm:fillClrLst>
-    <dgm:linClrLst meth="repeat">
-      <a:schemeClr val="accent1"/>
-    </dgm:linClrLst>
-    <dgm:effectClrLst/>
-    <dgm:txLinClrLst/>
-    <dgm:txFillClrLst meth="repeat">
-      <a:schemeClr val="dk1"/>
-    </dgm:txFillClrLst>
-    <dgm:txEffectClrLst/>
-  </dgm:styleLbl>
-  <dgm:styleLbl name="conFgAcc1">
-    <dgm:fillClrLst meth="repeat">
-      <a:schemeClr val="lt1">
-        <a:alpha val="90000"/>
-      </a:schemeClr>
-    </dgm:fillClrLst>
-    <dgm:linClrLst meth="repeat">
-      <a:schemeClr val="accent1"/>
-    </dgm:linClrLst>
-    <dgm:effectClrLst/>
-    <dgm:txLinClrLst/>
-    <dgm:txFillClrLst meth="repeat">
-      <a:schemeClr val="dk1"/>
-    </dgm:txFillClrLst>
-    <dgm:txEffectClrLst/>
-  </dgm:styleLbl>
-  <dgm:styleLbl name="alignAcc1">
-    <dgm:fillClrLst meth="repeat">
-      <a:schemeClr val="lt1">
-        <a:alpha val="90000"/>
-      </a:schemeClr>
-    </dgm:fillClrLst>
-    <dgm:linClrLst meth="repeat">
-      <a:schemeClr val="accent1"/>
-    </dgm:linClrLst>
-    <dgm:effectClrLst/>
-    <dgm:txLinClrLst/>
-    <dgm:txFillClrLst meth="repeat">
-      <a:schemeClr val="dk1"/>
-    </dgm:txFillClrLst>
-    <dgm:txEffectClrLst/>
-  </dgm:styleLbl>
-  <dgm:styleLbl name="trAlignAcc1">
-    <dgm:fillClrLst meth="repeat">
-      <a:schemeClr val="lt1">
-        <a:alpha val="40000"/>
-      </a:schemeClr>
-    </dgm:fillClrLst>
-    <dgm:linClrLst meth="repeat">
-      <a:schemeClr val="accent1"/>
-    </dgm:linClrLst>
-    <dgm:effectClrLst/>
-    <dgm:txLinClrLst/>
-    <dgm:txFillClrLst meth="repeat">
-      <a:schemeClr val="dk1"/>
-    </dgm:txFillClrLst>
-    <dgm:txEffectClrLst/>
-  </dgm:styleLbl>
-  <dgm:styleLbl name="bgAcc1">
-    <dgm:fillClrLst meth="repeat">
-      <a:schemeClr val="lt1">
-        <a:alpha val="90000"/>
-      </a:schemeClr>
-    </dgm:fillClrLst>
-    <dgm:linClrLst meth="repeat">
-      <a:schemeClr val="accent1"/>
-    </dgm:linClrLst>
-    <dgm:effectClrLst/>
-    <dgm:txLinClrLst/>
-    <dgm:txFillClrLst meth="repeat">
-      <a:schemeClr val="dk1"/>
-    </dgm:txFillClrLst>
-    <dgm:txEffectClrLst/>
-  </dgm:styleLbl>
-  <dgm:styleLbl name="solidFgAcc1">
-    <dgm:fillClrLst meth="repeat">
-      <a:schemeClr val="lt1"/>
-    </dgm:fillClrLst>
-    <dgm:linClrLst meth="repeat">
-      <a:schemeClr val="accent1"/>
-    </dgm:linClrLst>
-    <dgm:effectClrLst/>
-    <dgm:txLinClrLst/>
-    <dgm:txFillClrLst meth="repeat">
-      <a:schemeClr val="dk1"/>
-    </dgm:txFillClrLst>
-    <dgm:txEffectClrLst/>
-  </dgm:styleLbl>
-  <dgm:styleLbl name="solidAlignAcc1">
-    <dgm:fillClrLst meth="repeat">
-      <a:schemeClr val="lt1"/>
-    </dgm:fillClrLst>
-    <dgm:linClrLst meth="repeat">
-      <a:schemeClr val="accent1"/>
-    </dgm:linClrLst>
-    <dgm:effectClrLst/>
-    <dgm:txLinClrLst/>
-    <dgm:txFillClrLst meth="repeat">
-      <a:schemeClr val="dk1"/>
-    </dgm:txFillClrLst>
-    <dgm:txEffectClrLst/>
-  </dgm:styleLbl>
-  <dgm:styleLbl name="solidBgAcc1">
-    <dgm:fillClrLst meth="repeat">
-      <a:schemeClr val="lt1"/>
-    </dgm:fillClrLst>
-    <dgm:linClrLst meth="repeat">
-      <a:schemeClr val="accent1"/>
-    </dgm:linClrLst>
-    <dgm:effectClrLst/>
-    <dgm:txLinClrLst/>
-    <dgm:txFillClrLst meth="repeat">
-      <a:schemeClr val="dk1"/>
-    </dgm:txFillClrLst>
-    <dgm:txEffectClrLst/>
-  </dgm:styleLbl>
-  <dgm:styleLbl name="fgAccFollowNode1">
-    <dgm:fillClrLst meth="repeat">
-      <a:schemeClr val="accent1">
-        <a:alpha val="90000"/>
-        <a:tint val="40000"/>
-      </a:schemeClr>
-    </dgm:fillClrLst>
-    <dgm:linClrLst meth="repeat">
-      <a:schemeClr val="accent1">
-        <a:alpha val="90000"/>
-        <a:tint val="40000"/>
-      </a:schemeClr>
-    </dgm:linClrLst>
-    <dgm:effectClrLst/>
-    <dgm:txLinClrLst/>
-    <dgm:txFillClrLst meth="repeat">
-      <a:schemeClr val="dk1"/>
-    </dgm:txFillClrLst>
-    <dgm:txEffectClrLst/>
-  </dgm:styleLbl>
-  <dgm:styleLbl name="alignAccFollowNode1">
-    <dgm:fillClrLst meth="repeat">
-      <a:schemeClr val="accent1">
-        <a:alpha val="90000"/>
-        <a:tint val="40000"/>
-      </a:schemeClr>
-    </dgm:fillClrLst>
-    <dgm:linClrLst meth="repeat">
-      <a:schemeClr val="accent1">
-        <a:alpha val="90000"/>
-        <a:tint val="40000"/>
-      </a:schemeClr>
-    </dgm:linClrLst>
-    <dgm:effectClrLst/>
-    <dgm:txLinClrLst/>
-    <dgm:txFillClrLst meth="repeat">
-      <a:schemeClr val="dk1"/>
-    </dgm:txFillClrLst>
-    <dgm:txEffectClrLst/>
-  </dgm:styleLbl>
-  <dgm:styleLbl name="bgAccFollowNode1">
-    <dgm:fillClrLst meth="repeat">
-      <a:schemeClr val="accent1">
-        <a:alpha val="90000"/>
-        <a:tint val="40000"/>
-      </a:schemeClr>
-    </dgm:fillClrLst>
-    <dgm:linClrLst meth="repeat">
-      <a:schemeClr val="accent1">
-        <a:alpha val="90000"/>
-        <a:tint val="40000"/>
-      </a:schemeClr>
-    </dgm:linClrLst>
-    <dgm:effectClrLst/>
-    <dgm:txLinClrLst/>
-    <dgm:txFillClrLst meth="repeat">
-      <a:schemeClr val="dk1"/>
-    </dgm:txFillClrLst>
-    <dgm:txEffectClrLst/>
-  </dgm:styleLbl>
-  <dgm:styleLbl name="fgAcc0">
-    <dgm:fillClrLst meth="repeat">
-      <a:schemeClr val="lt1">
-        <a:alpha val="90000"/>
-      </a:schemeClr>
-    </dgm:fillClrLst>
-    <dgm:linClrLst meth="repeat">
-      <a:schemeClr val="accent1"/>
-    </dgm:linClrLst>
-    <dgm:effectClrLst/>
-    <dgm:txLinClrLst/>
-    <dgm:txFillClrLst meth="repeat">
-      <a:schemeClr val="dk1"/>
-    </dgm:txFillClrLst>
-    <dgm:txEffectClrLst/>
-  </dgm:styleLbl>
-  <dgm:styleLbl name="fgAcc2">
-    <dgm:fillClrLst meth="repeat">
-      <a:schemeClr val="lt1">
-        <a:alpha val="90000"/>
-      </a:schemeClr>
-    </dgm:fillClrLst>
-    <dgm:linClrLst meth="repeat">
-      <a:schemeClr val="accent1"/>
-    </dgm:linClrLst>
-    <dgm:effectClrLst/>
-    <dgm:txLinClrLst/>
-    <dgm:txFillClrLst meth="repeat">
-      <a:schemeClr val="dk1"/>
-    </dgm:txFillClrLst>
-    <dgm:txEffectClrLst/>
-  </dgm:styleLbl>
-  <dgm:styleLbl name="fgAcc3">
-    <dgm:fillClrLst meth="repeat">
-      <a:schemeClr val="lt1">
-        <a:alpha val="90000"/>
-      </a:schemeClr>
-    </dgm:fillClrLst>
-    <dgm:linClrLst meth="repeat">
-      <a:schemeClr val="accent1"/>
-    </dgm:linClrLst>
-    <dgm:effectClrLst/>
-    <dgm:txLinClrLst/>
-    <dgm:txFillClrLst meth="repeat">
-      <a:schemeClr val="dk1"/>
-    </dgm:txFillClrLst>
-    <dgm:txEffectClrLst/>
-  </dgm:styleLbl>
-  <dgm:styleLbl name="fgAcc4">
-    <dgm:fillClrLst meth="repeat">
-      <a:schemeClr val="lt1">
-        <a:alpha val="90000"/>
-      </a:schemeClr>
-    </dgm:fillClrLst>
-    <dgm:linClrLst meth="repeat">
-      <a:schemeClr val="accent1"/>
-    </dgm:linClrLst>
-    <dgm:effectClrLst/>
-    <dgm:txLinClrLst/>
-    <dgm:txFillClrLst meth="repeat">
-      <a:schemeClr val="dk1"/>
-    </dgm:txFillClrLst>
-    <dgm:txEffectClrLst/>
-  </dgm:styleLbl>
-  <dgm:styleLbl name="bgShp">
-    <dgm:fillClrLst meth="repeat">
-      <a:schemeClr val="accent1">
-        <a:tint val="40000"/>
-      </a:schemeClr>
-    </dgm:fillClrLst>
-    <dgm:linClrLst meth="repeat">
-      <a:schemeClr val="accent1"/>
-    </dgm:linClrLst>
-    <dgm:effectClrLst/>
-    <dgm:txLinClrLst/>
-    <dgm:txFillClrLst meth="repeat">
-      <a:schemeClr val="dk1"/>
-    </dgm:txFillClrLst>
-    <dgm:txEffectClrLst/>
-  </dgm:styleLbl>
-  <dgm:styleLbl name="dkBgShp">
-    <dgm:fillClrLst meth="repeat">
-      <a:schemeClr val="accent1">
-        <a:shade val="80000"/>
-      </a:schemeClr>
-    </dgm:fillClrLst>
-    <dgm:linClrLst meth="repeat">
-      <a:schemeClr val="accent1"/>
-    </dgm:linClrLst>
-    <dgm:effectClrLst/>
-    <dgm:txLinClrLst/>
-    <dgm:txFillClrLst meth="repeat">
-      <a:schemeClr val="lt1"/>
-    </dgm:txFillClrLst>
-    <dgm:txEffectClrLst/>
-  </dgm:styleLbl>
-  <dgm:styleLbl name="trBgShp">
-    <dgm:fillClrLst meth="repeat">
-      <a:schemeClr val="accent1">
-        <a:tint val="50000"/>
-        <a:alpha val="40000"/>
-      </a:schemeClr>
-    </dgm:fillClrLst>
-    <dgm:linClrLst meth="repeat">
-      <a:schemeClr val="accent1"/>
-    </dgm:linClrLst>
-    <dgm:effectClrLst/>
-    <dgm:txLinClrLst/>
-    <dgm:txFillClrLst meth="repeat">
-      <a:schemeClr val="lt1"/>
-    </dgm:txFillClrLst>
-    <dgm:txEffectClrLst/>
-  </dgm:styleLbl>
-  <dgm:styleLbl name="fgShp">
-    <dgm:fillClrLst meth="repeat">
-      <a:schemeClr val="accent1">
-        <a:tint val="60000"/>
-      </a:schemeClr>
-    </dgm:fillClrLst>
-    <dgm:linClrLst meth="repeat">
-      <a:schemeClr val="lt1"/>
-    </dgm:linClrLst>
-    <dgm:effectClrLst/>
-    <dgm:txLinClrLst/>
-    <dgm:txFillClrLst meth="repeat">
-      <a:schemeClr val="dk1"/>
-    </dgm:txFillClrLst>
-    <dgm:txEffectClrLst/>
-  </dgm:styleLbl>
-  <dgm:styleLbl name="revTx">
-    <dgm:fillClrLst meth="repeat">
-      <a:schemeClr val="lt1">
-        <a:alpha val="0"/>
-      </a:schemeClr>
-    </dgm:fillClrLst>
-    <dgm:linClrLst meth="repeat">
-      <a:schemeClr val="dk1">
-        <a:alpha val="0"/>
-      </a:schemeClr>
-    </dgm:linClrLst>
-    <dgm:effectClrLst/>
-    <dgm:txLinClrLst/>
-    <dgm:txFillClrLst meth="repeat">
-      <a:schemeClr val="tx1"/>
-    </dgm:txFillClrLst>
-    <dgm:txEffectClrLst/>
-  </dgm:styleLbl>
-</dgm:colorsDef>
-</file>
-
 <file path=ppt/diagrams/data1.xml><?xml version="1.0" encoding="utf-8"?>
 <dgm:dataModel xmlns:dgm="http://schemas.openxmlformats.org/drawingml/2006/diagram" xmlns:a="http://schemas.openxmlformats.org/drawingml/2006/main">
   <dgm:ptLst>
@@ -1666,7 +918,13 @@
     </dgm:pt>
     <dgm:pt modelId="{E971DB89-68A5-4C52-8EED-179DE4BB06A3}" type="sibTrans" cxnId="{DEA98233-7FE1-4245-A319-B28073786190}">
       <dgm:prSet/>
-      <dgm:spPr/>
+      <dgm:spPr>
+        <a:ln>
+          <a:solidFill>
+            <a:srgbClr val="FFC000"/>
+          </a:solidFill>
+        </a:ln>
+      </dgm:spPr>
       <dgm:t>
         <a:bodyPr/>
         <a:lstStyle/>
@@ -1877,262 +1135,6 @@
 </dgm:dataModel>
 </file>
 
-<file path=ppt/diagrams/data2.xml><?xml version="1.0" encoding="utf-8"?>
-<dgm:dataModel xmlns:dgm="http://schemas.openxmlformats.org/drawingml/2006/diagram" xmlns:a="http://schemas.openxmlformats.org/drawingml/2006/main">
-  <dgm:ptLst>
-    <dgm:pt modelId="{DAE18C0C-B4B6-4987-BE8F-F0817E1DDB06}" type="doc">
-      <dgm:prSet loTypeId="urn:microsoft.com/office/officeart/2008/layout/VerticalCurvedList" loCatId="list" qsTypeId="urn:microsoft.com/office/officeart/2005/8/quickstyle/simple1" qsCatId="simple" csTypeId="urn:microsoft.com/office/officeart/2005/8/colors/accent1_2" csCatId="accent1" phldr="1"/>
-      <dgm:spPr/>
-      <dgm:t>
-        <a:bodyPr/>
-        <a:lstStyle/>
-        <a:p>
-          <a:endParaRPr lang="en-US"/>
-        </a:p>
-      </dgm:t>
-    </dgm:pt>
-    <dgm:pt modelId="{77CEC9C4-0EAF-4943-8AC0-9D376A16ED58}">
-      <dgm:prSet phldrT="[Text]" custT="1"/>
-      <dgm:spPr/>
-      <dgm:t>
-        <a:bodyPr/>
-        <a:lstStyle/>
-        <a:p>
-          <a:r>
-            <a:rPr lang="en-US" sz="2000" dirty="0">
-              <a:solidFill>
-                <a:schemeClr val="bg1"/>
-              </a:solidFill>
-            </a:rPr>
-            <a:t>Building Team</a:t>
-          </a:r>
-        </a:p>
-      </dgm:t>
-    </dgm:pt>
-    <dgm:pt modelId="{F7F77542-BEBF-41C0-B96D-B68C641A953D}" type="parTrans" cxnId="{DEA98233-7FE1-4245-A319-B28073786190}">
-      <dgm:prSet/>
-      <dgm:spPr/>
-      <dgm:t>
-        <a:bodyPr/>
-        <a:lstStyle/>
-        <a:p>
-          <a:endParaRPr lang="en-US"/>
-        </a:p>
-      </dgm:t>
-    </dgm:pt>
-    <dgm:pt modelId="{E971DB89-68A5-4C52-8EED-179DE4BB06A3}" type="sibTrans" cxnId="{DEA98233-7FE1-4245-A319-B28073786190}">
-      <dgm:prSet/>
-      <dgm:spPr/>
-      <dgm:t>
-        <a:bodyPr/>
-        <a:lstStyle/>
-        <a:p>
-          <a:endParaRPr lang="en-US"/>
-        </a:p>
-      </dgm:t>
-    </dgm:pt>
-    <dgm:pt modelId="{E2F5CBFC-74BF-4B09-9D26-C15914FEFC87}">
-      <dgm:prSet phldrT="[Text]" custT="1"/>
-      <dgm:spPr>
-        <a:solidFill>
-          <a:srgbClr val="E80554"/>
-        </a:solidFill>
-      </dgm:spPr>
-      <dgm:t>
-        <a:bodyPr/>
-        <a:lstStyle/>
-        <a:p>
-          <a:r>
-            <a:rPr lang="en-US" sz="2000" dirty="0">
-              <a:solidFill>
-                <a:schemeClr val="bg1"/>
-              </a:solidFill>
-            </a:rPr>
-            <a:t>Architecture Blueprint</a:t>
-          </a:r>
-        </a:p>
-      </dgm:t>
-    </dgm:pt>
-    <dgm:pt modelId="{DC6B145A-E270-4311-94ED-7F1177FE1E7A}" type="parTrans" cxnId="{E1658B02-CCEE-4A86-8322-78E95CDB22F1}">
-      <dgm:prSet/>
-      <dgm:spPr/>
-      <dgm:t>
-        <a:bodyPr/>
-        <a:lstStyle/>
-        <a:p>
-          <a:endParaRPr lang="en-US"/>
-        </a:p>
-      </dgm:t>
-    </dgm:pt>
-    <dgm:pt modelId="{F7085810-232C-409A-8DB1-87946F50CECE}" type="sibTrans" cxnId="{E1658B02-CCEE-4A86-8322-78E95CDB22F1}">
-      <dgm:prSet/>
-      <dgm:spPr/>
-      <dgm:t>
-        <a:bodyPr/>
-        <a:lstStyle/>
-        <a:p>
-          <a:endParaRPr lang="en-US"/>
-        </a:p>
-      </dgm:t>
-    </dgm:pt>
-    <dgm:pt modelId="{6DE82475-D11E-4673-9899-C19A8E9466A3}">
-      <dgm:prSet phldrT="[Text]" custT="1"/>
-      <dgm:spPr>
-        <a:solidFill>
-          <a:srgbClr val="00B050"/>
-        </a:solidFill>
-      </dgm:spPr>
-      <dgm:t>
-        <a:bodyPr/>
-        <a:lstStyle/>
-        <a:p>
-          <a:r>
-            <a:rPr lang="en-US" sz="2000" dirty="0"/>
-            <a:t>Success Criteria</a:t>
-          </a:r>
-        </a:p>
-      </dgm:t>
-    </dgm:pt>
-    <dgm:pt modelId="{20F3A25E-8768-4665-9D25-C6528CD8C59F}" type="parTrans" cxnId="{E9026D85-0232-415A-91A5-B279F3C44759}">
-      <dgm:prSet/>
-      <dgm:spPr/>
-      <dgm:t>
-        <a:bodyPr/>
-        <a:lstStyle/>
-        <a:p>
-          <a:endParaRPr lang="en-US"/>
-        </a:p>
-      </dgm:t>
-    </dgm:pt>
-    <dgm:pt modelId="{D7DB1B9F-ED9D-4751-AB3B-BCE717F2BED8}" type="sibTrans" cxnId="{E9026D85-0232-415A-91A5-B279F3C44759}">
-      <dgm:prSet/>
-      <dgm:spPr/>
-      <dgm:t>
-        <a:bodyPr/>
-        <a:lstStyle/>
-        <a:p>
-          <a:endParaRPr lang="en-US"/>
-        </a:p>
-      </dgm:t>
-    </dgm:pt>
-    <dgm:pt modelId="{E2C816C6-5557-439C-93D2-2609DD31261D}" type="pres">
-      <dgm:prSet presAssocID="{DAE18C0C-B4B6-4987-BE8F-F0817E1DDB06}" presName="Name0" presStyleCnt="0">
-        <dgm:presLayoutVars>
-          <dgm:chMax val="7"/>
-          <dgm:chPref val="7"/>
-          <dgm:dir/>
-        </dgm:presLayoutVars>
-      </dgm:prSet>
-      <dgm:spPr/>
-    </dgm:pt>
-    <dgm:pt modelId="{6295C2EC-7C14-4AF7-8237-80BE04195A01}" type="pres">
-      <dgm:prSet presAssocID="{DAE18C0C-B4B6-4987-BE8F-F0817E1DDB06}" presName="Name1" presStyleCnt="0"/>
-      <dgm:spPr/>
-    </dgm:pt>
-    <dgm:pt modelId="{1896D534-3804-4EBA-A87C-F22B5E5B8D62}" type="pres">
-      <dgm:prSet presAssocID="{DAE18C0C-B4B6-4987-BE8F-F0817E1DDB06}" presName="cycle" presStyleCnt="0"/>
-      <dgm:spPr/>
-    </dgm:pt>
-    <dgm:pt modelId="{CD4A8122-9DC2-40C3-8C0F-26F6B43A433B}" type="pres">
-      <dgm:prSet presAssocID="{DAE18C0C-B4B6-4987-BE8F-F0817E1DDB06}" presName="srcNode" presStyleLbl="node1" presStyleIdx="0" presStyleCnt="3"/>
-      <dgm:spPr/>
-    </dgm:pt>
-    <dgm:pt modelId="{910EAB7F-D05D-45ED-9676-E8DFAD613FC7}" type="pres">
-      <dgm:prSet presAssocID="{DAE18C0C-B4B6-4987-BE8F-F0817E1DDB06}" presName="conn" presStyleLbl="parChTrans1D2" presStyleIdx="0" presStyleCnt="1"/>
-      <dgm:spPr/>
-    </dgm:pt>
-    <dgm:pt modelId="{121CA0D4-2B4C-4D00-B08D-4A4126C818DE}" type="pres">
-      <dgm:prSet presAssocID="{DAE18C0C-B4B6-4987-BE8F-F0817E1DDB06}" presName="extraNode" presStyleLbl="node1" presStyleIdx="0" presStyleCnt="3"/>
-      <dgm:spPr/>
-    </dgm:pt>
-    <dgm:pt modelId="{686AE3B7-9B5C-4C61-A596-C59065621747}" type="pres">
-      <dgm:prSet presAssocID="{DAE18C0C-B4B6-4987-BE8F-F0817E1DDB06}" presName="dstNode" presStyleLbl="node1" presStyleIdx="0" presStyleCnt="3"/>
-      <dgm:spPr/>
-    </dgm:pt>
-    <dgm:pt modelId="{A7807734-E6CD-45DA-B95C-404BE0271360}" type="pres">
-      <dgm:prSet presAssocID="{77CEC9C4-0EAF-4943-8AC0-9D376A16ED58}" presName="text_1" presStyleLbl="node1" presStyleIdx="0" presStyleCnt="3">
-        <dgm:presLayoutVars>
-          <dgm:bulletEnabled val="1"/>
-        </dgm:presLayoutVars>
-      </dgm:prSet>
-      <dgm:spPr/>
-    </dgm:pt>
-    <dgm:pt modelId="{8F069D32-AEC4-4244-BCBB-848887FBE97A}" type="pres">
-      <dgm:prSet presAssocID="{77CEC9C4-0EAF-4943-8AC0-9D376A16ED58}" presName="accent_1" presStyleCnt="0"/>
-      <dgm:spPr/>
-    </dgm:pt>
-    <dgm:pt modelId="{5C4CF72E-561D-4717-BB85-BDF13B128028}" type="pres">
-      <dgm:prSet presAssocID="{77CEC9C4-0EAF-4943-8AC0-9D376A16ED58}" presName="accentRepeatNode" presStyleLbl="solidFgAcc1" presStyleIdx="0" presStyleCnt="3"/>
-      <dgm:spPr/>
-    </dgm:pt>
-    <dgm:pt modelId="{A467D382-5AB3-4DDD-A1B3-6497AFF2A95A}" type="pres">
-      <dgm:prSet presAssocID="{E2F5CBFC-74BF-4B09-9D26-C15914FEFC87}" presName="text_2" presStyleLbl="node1" presStyleIdx="1" presStyleCnt="3">
-        <dgm:presLayoutVars>
-          <dgm:bulletEnabled val="1"/>
-        </dgm:presLayoutVars>
-      </dgm:prSet>
-      <dgm:spPr/>
-    </dgm:pt>
-    <dgm:pt modelId="{461BF1E1-E2A1-4E3B-AAE0-EA8D68B59A0D}" type="pres">
-      <dgm:prSet presAssocID="{E2F5CBFC-74BF-4B09-9D26-C15914FEFC87}" presName="accent_2" presStyleCnt="0"/>
-      <dgm:spPr/>
-    </dgm:pt>
-    <dgm:pt modelId="{DE5FF626-44BA-4402-A37B-F3D648D4C396}" type="pres">
-      <dgm:prSet presAssocID="{E2F5CBFC-74BF-4B09-9D26-C15914FEFC87}" presName="accentRepeatNode" presStyleLbl="solidFgAcc1" presStyleIdx="1" presStyleCnt="3"/>
-      <dgm:spPr/>
-    </dgm:pt>
-    <dgm:pt modelId="{120542C5-A070-47B7-9B14-964501EDC063}" type="pres">
-      <dgm:prSet presAssocID="{6DE82475-D11E-4673-9899-C19A8E9466A3}" presName="text_3" presStyleLbl="node1" presStyleIdx="2" presStyleCnt="3">
-        <dgm:presLayoutVars>
-          <dgm:bulletEnabled val="1"/>
-        </dgm:presLayoutVars>
-      </dgm:prSet>
-      <dgm:spPr/>
-    </dgm:pt>
-    <dgm:pt modelId="{A1AB8C9F-B6CD-4066-B65D-1C93BF7E4B49}" type="pres">
-      <dgm:prSet presAssocID="{6DE82475-D11E-4673-9899-C19A8E9466A3}" presName="accent_3" presStyleCnt="0"/>
-      <dgm:spPr/>
-    </dgm:pt>
-    <dgm:pt modelId="{268A5DB2-0A5E-40C2-B729-E01A9EC5BC17}" type="pres">
-      <dgm:prSet presAssocID="{6DE82475-D11E-4673-9899-C19A8E9466A3}" presName="accentRepeatNode" presStyleLbl="solidFgAcc1" presStyleIdx="2" presStyleCnt="3"/>
-      <dgm:spPr/>
-    </dgm:pt>
-  </dgm:ptLst>
-  <dgm:cxnLst>
-    <dgm:cxn modelId="{E1658B02-CCEE-4A86-8322-78E95CDB22F1}" srcId="{DAE18C0C-B4B6-4987-BE8F-F0817E1DDB06}" destId="{E2F5CBFC-74BF-4B09-9D26-C15914FEFC87}" srcOrd="1" destOrd="0" parTransId="{DC6B145A-E270-4311-94ED-7F1177FE1E7A}" sibTransId="{F7085810-232C-409A-8DB1-87946F50CECE}"/>
-    <dgm:cxn modelId="{DD458911-7BD8-4A8A-86B2-91DF909EC63D}" type="presOf" srcId="{6DE82475-D11E-4673-9899-C19A8E9466A3}" destId="{120542C5-A070-47B7-9B14-964501EDC063}" srcOrd="0" destOrd="0" presId="urn:microsoft.com/office/officeart/2008/layout/VerticalCurvedList"/>
-    <dgm:cxn modelId="{6787BA12-7E18-416F-87D1-0A74F0DC3344}" type="presOf" srcId="{E2F5CBFC-74BF-4B09-9D26-C15914FEFC87}" destId="{A467D382-5AB3-4DDD-A1B3-6497AFF2A95A}" srcOrd="0" destOrd="0" presId="urn:microsoft.com/office/officeart/2008/layout/VerticalCurvedList"/>
-    <dgm:cxn modelId="{DEA98233-7FE1-4245-A319-B28073786190}" srcId="{DAE18C0C-B4B6-4987-BE8F-F0817E1DDB06}" destId="{77CEC9C4-0EAF-4943-8AC0-9D376A16ED58}" srcOrd="0" destOrd="0" parTransId="{F7F77542-BEBF-41C0-B96D-B68C641A953D}" sibTransId="{E971DB89-68A5-4C52-8EED-179DE4BB06A3}"/>
-    <dgm:cxn modelId="{FD4FC05A-1A00-4BA2-954A-956A020C4D3E}" type="presOf" srcId="{DAE18C0C-B4B6-4987-BE8F-F0817E1DDB06}" destId="{E2C816C6-5557-439C-93D2-2609DD31261D}" srcOrd="0" destOrd="0" presId="urn:microsoft.com/office/officeart/2008/layout/VerticalCurvedList"/>
-    <dgm:cxn modelId="{E9026D85-0232-415A-91A5-B279F3C44759}" srcId="{DAE18C0C-B4B6-4987-BE8F-F0817E1DDB06}" destId="{6DE82475-D11E-4673-9899-C19A8E9466A3}" srcOrd="2" destOrd="0" parTransId="{20F3A25E-8768-4665-9D25-C6528CD8C59F}" sibTransId="{D7DB1B9F-ED9D-4751-AB3B-BCE717F2BED8}"/>
-    <dgm:cxn modelId="{21EB46A2-62FE-476A-B5F4-1EF0EA809704}" type="presOf" srcId="{E971DB89-68A5-4C52-8EED-179DE4BB06A3}" destId="{910EAB7F-D05D-45ED-9676-E8DFAD613FC7}" srcOrd="0" destOrd="0" presId="urn:microsoft.com/office/officeart/2008/layout/VerticalCurvedList"/>
-    <dgm:cxn modelId="{3A9920B2-005E-4B10-BD37-6FC9A7DD64B4}" type="presOf" srcId="{77CEC9C4-0EAF-4943-8AC0-9D376A16ED58}" destId="{A7807734-E6CD-45DA-B95C-404BE0271360}" srcOrd="0" destOrd="0" presId="urn:microsoft.com/office/officeart/2008/layout/VerticalCurvedList"/>
-    <dgm:cxn modelId="{0A3C135D-BB8C-4C84-9041-19EA9BBF7390}" type="presParOf" srcId="{E2C816C6-5557-439C-93D2-2609DD31261D}" destId="{6295C2EC-7C14-4AF7-8237-80BE04195A01}" srcOrd="0" destOrd="0" presId="urn:microsoft.com/office/officeart/2008/layout/VerticalCurvedList"/>
-    <dgm:cxn modelId="{4CBD081F-4164-4A57-9D10-B201518EC433}" type="presParOf" srcId="{6295C2EC-7C14-4AF7-8237-80BE04195A01}" destId="{1896D534-3804-4EBA-A87C-F22B5E5B8D62}" srcOrd="0" destOrd="0" presId="urn:microsoft.com/office/officeart/2008/layout/VerticalCurvedList"/>
-    <dgm:cxn modelId="{636F285E-6CFB-4565-8EA6-5D08E2338B71}" type="presParOf" srcId="{1896D534-3804-4EBA-A87C-F22B5E5B8D62}" destId="{CD4A8122-9DC2-40C3-8C0F-26F6B43A433B}" srcOrd="0" destOrd="0" presId="urn:microsoft.com/office/officeart/2008/layout/VerticalCurvedList"/>
-    <dgm:cxn modelId="{55921A91-150D-4BFE-BFEA-767E94FA26CC}" type="presParOf" srcId="{1896D534-3804-4EBA-A87C-F22B5E5B8D62}" destId="{910EAB7F-D05D-45ED-9676-E8DFAD613FC7}" srcOrd="1" destOrd="0" presId="urn:microsoft.com/office/officeart/2008/layout/VerticalCurvedList"/>
-    <dgm:cxn modelId="{5DE7DB62-6942-4A89-9EA0-BB7402DBE93C}" type="presParOf" srcId="{1896D534-3804-4EBA-A87C-F22B5E5B8D62}" destId="{121CA0D4-2B4C-4D00-B08D-4A4126C818DE}" srcOrd="2" destOrd="0" presId="urn:microsoft.com/office/officeart/2008/layout/VerticalCurvedList"/>
-    <dgm:cxn modelId="{59ACD9B5-DFC7-4C01-9617-730667E4BD49}" type="presParOf" srcId="{1896D534-3804-4EBA-A87C-F22B5E5B8D62}" destId="{686AE3B7-9B5C-4C61-A596-C59065621747}" srcOrd="3" destOrd="0" presId="urn:microsoft.com/office/officeart/2008/layout/VerticalCurvedList"/>
-    <dgm:cxn modelId="{2D08EEF4-3D90-4FC9-B049-19A20A79EF78}" type="presParOf" srcId="{6295C2EC-7C14-4AF7-8237-80BE04195A01}" destId="{A7807734-E6CD-45DA-B95C-404BE0271360}" srcOrd="1" destOrd="0" presId="urn:microsoft.com/office/officeart/2008/layout/VerticalCurvedList"/>
-    <dgm:cxn modelId="{FC26237C-C892-4FEB-A869-9A1FEA7AED65}" type="presParOf" srcId="{6295C2EC-7C14-4AF7-8237-80BE04195A01}" destId="{8F069D32-AEC4-4244-BCBB-848887FBE97A}" srcOrd="2" destOrd="0" presId="urn:microsoft.com/office/officeart/2008/layout/VerticalCurvedList"/>
-    <dgm:cxn modelId="{AD023E25-0CD8-45ED-A0E4-AD3A3BA338EE}" type="presParOf" srcId="{8F069D32-AEC4-4244-BCBB-848887FBE97A}" destId="{5C4CF72E-561D-4717-BB85-BDF13B128028}" srcOrd="0" destOrd="0" presId="urn:microsoft.com/office/officeart/2008/layout/VerticalCurvedList"/>
-    <dgm:cxn modelId="{02C91C94-1F7D-48F2-9696-D7796A1DCDFD}" type="presParOf" srcId="{6295C2EC-7C14-4AF7-8237-80BE04195A01}" destId="{A467D382-5AB3-4DDD-A1B3-6497AFF2A95A}" srcOrd="3" destOrd="0" presId="urn:microsoft.com/office/officeart/2008/layout/VerticalCurvedList"/>
-    <dgm:cxn modelId="{4D9BF196-AE0D-47DF-AEA5-81D48990BC33}" type="presParOf" srcId="{6295C2EC-7C14-4AF7-8237-80BE04195A01}" destId="{461BF1E1-E2A1-4E3B-AAE0-EA8D68B59A0D}" srcOrd="4" destOrd="0" presId="urn:microsoft.com/office/officeart/2008/layout/VerticalCurvedList"/>
-    <dgm:cxn modelId="{8CB4F688-6BDE-446E-8EA7-161E545DDAED}" type="presParOf" srcId="{461BF1E1-E2A1-4E3B-AAE0-EA8D68B59A0D}" destId="{DE5FF626-44BA-4402-A37B-F3D648D4C396}" srcOrd="0" destOrd="0" presId="urn:microsoft.com/office/officeart/2008/layout/VerticalCurvedList"/>
-    <dgm:cxn modelId="{23620BB2-EF2B-4FAE-AED9-7CF411F0A5BB}" type="presParOf" srcId="{6295C2EC-7C14-4AF7-8237-80BE04195A01}" destId="{120542C5-A070-47B7-9B14-964501EDC063}" srcOrd="5" destOrd="0" presId="urn:microsoft.com/office/officeart/2008/layout/VerticalCurvedList"/>
-    <dgm:cxn modelId="{563BA8E6-1097-496D-9EC5-32F5F3A6357E}" type="presParOf" srcId="{6295C2EC-7C14-4AF7-8237-80BE04195A01}" destId="{A1AB8C9F-B6CD-4066-B65D-1C93BF7E4B49}" srcOrd="6" destOrd="0" presId="urn:microsoft.com/office/officeart/2008/layout/VerticalCurvedList"/>
-    <dgm:cxn modelId="{F92C6C57-FBA5-4575-8672-CCC9CBF59959}" type="presParOf" srcId="{A1AB8C9F-B6CD-4066-B65D-1C93BF7E4B49}" destId="{268A5DB2-0A5E-40C2-B729-E01A9EC5BC17}" srcOrd="0" destOrd="0" presId="urn:microsoft.com/office/officeart/2008/layout/VerticalCurvedList"/>
-  </dgm:cxnLst>
-  <dgm:bg/>
-  <dgm:whole/>
-  <dgm:extLst>
-    <a:ext uri="http://schemas.microsoft.com/office/drawing/2008/diagram">
-      <dsp:dataModelExt xmlns:dsp="http://schemas.microsoft.com/office/drawing/2008/diagram" relId="rId7" minVer="http://schemas.openxmlformats.org/drawingml/2006/diagram"/>
-    </a:ext>
-  </dgm:extLst>
-</dgm:dataModel>
-</file>
-
 <file path=ppt/diagrams/drawing1.xml><?xml version="1.0" encoding="utf-8"?>
 <dsp:drawing xmlns:dgm="http://schemas.openxmlformats.org/drawingml/2006/diagram" xmlns:dsp="http://schemas.microsoft.com/office/drawing/2008/diagram" xmlns:a="http://schemas.openxmlformats.org/drawingml/2006/main">
   <dsp:spTree>
@@ -2161,447 +1163,7 @@
         <a:noFill/>
         <a:ln w="12700" cap="flat" cmpd="sng" algn="ctr">
           <a:solidFill>
-            <a:schemeClr val="accent1">
-              <a:shade val="60000"/>
-              <a:hueOff val="0"/>
-              <a:satOff val="0"/>
-              <a:lumOff val="0"/>
-              <a:alphaOff val="0"/>
-            </a:schemeClr>
-          </a:solidFill>
-          <a:prstDash val="solid"/>
-          <a:miter lim="800000"/>
-        </a:ln>
-        <a:effectLst/>
-      </dsp:spPr>
-      <dsp:style>
-        <a:lnRef idx="2">
-          <a:scrgbClr r="0" g="0" b="0"/>
-        </a:lnRef>
-        <a:fillRef idx="0">
-          <a:scrgbClr r="0" g="0" b="0"/>
-        </a:fillRef>
-        <a:effectRef idx="0">
-          <a:scrgbClr r="0" g="0" b="0"/>
-        </a:effectRef>
-        <a:fontRef idx="minor"/>
-      </dsp:style>
-    </dsp:sp>
-    <dsp:sp modelId="{A7807734-E6CD-45DA-B95C-404BE0271360}">
-      <dsp:nvSpPr>
-        <dsp:cNvPr id="0" name=""/>
-        <dsp:cNvSpPr/>
-      </dsp:nvSpPr>
-      <dsp:spPr>
-        <a:xfrm>
-          <a:off x="345596" y="246039"/>
-          <a:ext cx="3707957" cy="492078"/>
-        </a:xfrm>
-        <a:prstGeom prst="rect">
-          <a:avLst/>
-        </a:prstGeom>
-        <a:solidFill>
-          <a:schemeClr val="accent1">
-            <a:hueOff val="0"/>
-            <a:satOff val="0"/>
-            <a:lumOff val="0"/>
-            <a:alphaOff val="0"/>
-          </a:schemeClr>
-        </a:solidFill>
-        <a:ln w="12700" cap="flat" cmpd="sng" algn="ctr">
-          <a:solidFill>
-            <a:schemeClr val="lt1">
-              <a:hueOff val="0"/>
-              <a:satOff val="0"/>
-              <a:lumOff val="0"/>
-              <a:alphaOff val="0"/>
-            </a:schemeClr>
-          </a:solidFill>
-          <a:prstDash val="solid"/>
-          <a:miter lim="800000"/>
-        </a:ln>
-        <a:effectLst/>
-      </dsp:spPr>
-      <dsp:style>
-        <a:lnRef idx="2">
-          <a:scrgbClr r="0" g="0" b="0"/>
-        </a:lnRef>
-        <a:fillRef idx="1">
-          <a:scrgbClr r="0" g="0" b="0"/>
-        </a:fillRef>
-        <a:effectRef idx="0">
-          <a:scrgbClr r="0" g="0" b="0"/>
-        </a:effectRef>
-        <a:fontRef idx="minor">
-          <a:schemeClr val="lt1"/>
-        </a:fontRef>
-      </dsp:style>
-      <dsp:txBody>
-        <a:bodyPr spcFirstLastPara="0" vert="horz" wrap="square" lIns="390587" tIns="50800" rIns="50800" bIns="50800" numCol="1" spcCol="1270" anchor="ctr" anchorCtr="0">
-          <a:noAutofit/>
-        </a:bodyPr>
-        <a:lstStyle/>
-        <a:p>
-          <a:pPr marL="0" lvl="0" indent="0" algn="l" defTabSz="889000">
-            <a:lnSpc>
-              <a:spcPct val="90000"/>
-            </a:lnSpc>
-            <a:spcBef>
-              <a:spcPct val="0"/>
-            </a:spcBef>
-            <a:spcAft>
-              <a:spcPct val="35000"/>
-            </a:spcAft>
-            <a:buNone/>
-          </a:pPr>
-          <a:r>
-            <a:rPr lang="en-US" sz="2000" kern="1200" dirty="0">
-              <a:solidFill>
-                <a:schemeClr val="bg1"/>
-              </a:solidFill>
-            </a:rPr>
-            <a:t>Building Team</a:t>
-          </a:r>
-        </a:p>
-      </dsp:txBody>
-      <dsp:txXfrm>
-        <a:off x="345596" y="246039"/>
-        <a:ext cx="3707957" cy="492078"/>
-      </dsp:txXfrm>
-    </dsp:sp>
-    <dsp:sp modelId="{5C4CF72E-561D-4717-BB85-BDF13B128028}">
-      <dsp:nvSpPr>
-        <dsp:cNvPr id="0" name=""/>
-        <dsp:cNvSpPr/>
-      </dsp:nvSpPr>
-      <dsp:spPr>
-        <a:xfrm>
-          <a:off x="38047" y="184529"/>
-          <a:ext cx="615098" cy="615098"/>
-        </a:xfrm>
-        <a:prstGeom prst="ellipse">
-          <a:avLst/>
-        </a:prstGeom>
-        <a:solidFill>
-          <a:schemeClr val="lt1">
-            <a:hueOff val="0"/>
-            <a:satOff val="0"/>
-            <a:lumOff val="0"/>
-            <a:alphaOff val="0"/>
-          </a:schemeClr>
-        </a:solidFill>
-        <a:ln w="12700" cap="flat" cmpd="sng" algn="ctr">
-          <a:solidFill>
-            <a:schemeClr val="accent1">
-              <a:hueOff val="0"/>
-              <a:satOff val="0"/>
-              <a:lumOff val="0"/>
-              <a:alphaOff val="0"/>
-            </a:schemeClr>
-          </a:solidFill>
-          <a:prstDash val="solid"/>
-          <a:miter lim="800000"/>
-        </a:ln>
-        <a:effectLst/>
-      </dsp:spPr>
-      <dsp:style>
-        <a:lnRef idx="2">
-          <a:scrgbClr r="0" g="0" b="0"/>
-        </a:lnRef>
-        <a:fillRef idx="1">
-          <a:scrgbClr r="0" g="0" b="0"/>
-        </a:fillRef>
-        <a:effectRef idx="0">
-          <a:scrgbClr r="0" g="0" b="0"/>
-        </a:effectRef>
-        <a:fontRef idx="minor"/>
-      </dsp:style>
-    </dsp:sp>
-    <dsp:sp modelId="{A467D382-5AB3-4DDD-A1B3-6497AFF2A95A}">
-      <dsp:nvSpPr>
-        <dsp:cNvPr id="0" name=""/>
-        <dsp:cNvSpPr/>
-      </dsp:nvSpPr>
-      <dsp:spPr>
-        <a:xfrm>
-          <a:off x="524467" y="984157"/>
-          <a:ext cx="3529086" cy="492078"/>
-        </a:xfrm>
-        <a:prstGeom prst="rect">
-          <a:avLst/>
-        </a:prstGeom>
-        <a:solidFill>
-          <a:srgbClr val="E80554"/>
-        </a:solidFill>
-        <a:ln w="12700" cap="flat" cmpd="sng" algn="ctr">
-          <a:solidFill>
-            <a:schemeClr val="lt1">
-              <a:hueOff val="0"/>
-              <a:satOff val="0"/>
-              <a:lumOff val="0"/>
-              <a:alphaOff val="0"/>
-            </a:schemeClr>
-          </a:solidFill>
-          <a:prstDash val="solid"/>
-          <a:miter lim="800000"/>
-        </a:ln>
-        <a:effectLst/>
-      </dsp:spPr>
-      <dsp:style>
-        <a:lnRef idx="2">
-          <a:scrgbClr r="0" g="0" b="0"/>
-        </a:lnRef>
-        <a:fillRef idx="1">
-          <a:scrgbClr r="0" g="0" b="0"/>
-        </a:fillRef>
-        <a:effectRef idx="0">
-          <a:scrgbClr r="0" g="0" b="0"/>
-        </a:effectRef>
-        <a:fontRef idx="minor">
-          <a:schemeClr val="lt1"/>
-        </a:fontRef>
-      </dsp:style>
-      <dsp:txBody>
-        <a:bodyPr spcFirstLastPara="0" vert="horz" wrap="square" lIns="390587" tIns="50800" rIns="50800" bIns="50800" numCol="1" spcCol="1270" anchor="ctr" anchorCtr="0">
-          <a:noAutofit/>
-        </a:bodyPr>
-        <a:lstStyle/>
-        <a:p>
-          <a:pPr marL="0" lvl="0" indent="0" algn="l" defTabSz="889000">
-            <a:lnSpc>
-              <a:spcPct val="90000"/>
-            </a:lnSpc>
-            <a:spcBef>
-              <a:spcPct val="0"/>
-            </a:spcBef>
-            <a:spcAft>
-              <a:spcPct val="35000"/>
-            </a:spcAft>
-            <a:buNone/>
-          </a:pPr>
-          <a:r>
-            <a:rPr lang="en-US" sz="2000" kern="1200" dirty="0">
-              <a:solidFill>
-                <a:schemeClr val="bg1"/>
-              </a:solidFill>
-            </a:rPr>
-            <a:t>Architecture Blueprint</a:t>
-          </a:r>
-        </a:p>
-      </dsp:txBody>
-      <dsp:txXfrm>
-        <a:off x="524467" y="984157"/>
-        <a:ext cx="3529086" cy="492078"/>
-      </dsp:txXfrm>
-    </dsp:sp>
-    <dsp:sp modelId="{DE5FF626-44BA-4402-A37B-F3D648D4C396}">
-      <dsp:nvSpPr>
-        <dsp:cNvPr id="0" name=""/>
-        <dsp:cNvSpPr/>
-      </dsp:nvSpPr>
-      <dsp:spPr>
-        <a:xfrm>
-          <a:off x="216918" y="922647"/>
-          <a:ext cx="615098" cy="615098"/>
-        </a:xfrm>
-        <a:prstGeom prst="ellipse">
-          <a:avLst/>
-        </a:prstGeom>
-        <a:solidFill>
-          <a:schemeClr val="lt1">
-            <a:hueOff val="0"/>
-            <a:satOff val="0"/>
-            <a:lumOff val="0"/>
-            <a:alphaOff val="0"/>
-          </a:schemeClr>
-        </a:solidFill>
-        <a:ln w="12700" cap="flat" cmpd="sng" algn="ctr">
-          <a:solidFill>
-            <a:schemeClr val="accent1">
-              <a:hueOff val="0"/>
-              <a:satOff val="0"/>
-              <a:lumOff val="0"/>
-              <a:alphaOff val="0"/>
-            </a:schemeClr>
-          </a:solidFill>
-          <a:prstDash val="solid"/>
-          <a:miter lim="800000"/>
-        </a:ln>
-        <a:effectLst/>
-      </dsp:spPr>
-      <dsp:style>
-        <a:lnRef idx="2">
-          <a:scrgbClr r="0" g="0" b="0"/>
-        </a:lnRef>
-        <a:fillRef idx="1">
-          <a:scrgbClr r="0" g="0" b="0"/>
-        </a:fillRef>
-        <a:effectRef idx="0">
-          <a:scrgbClr r="0" g="0" b="0"/>
-        </a:effectRef>
-        <a:fontRef idx="minor"/>
-      </dsp:style>
-    </dsp:sp>
-    <dsp:sp modelId="{120542C5-A070-47B7-9B14-964501EDC063}">
-      <dsp:nvSpPr>
-        <dsp:cNvPr id="0" name=""/>
-        <dsp:cNvSpPr/>
-      </dsp:nvSpPr>
-      <dsp:spPr>
-        <a:xfrm>
-          <a:off x="345596" y="1722275"/>
-          <a:ext cx="3707957" cy="492078"/>
-        </a:xfrm>
-        <a:prstGeom prst="rect">
-          <a:avLst/>
-        </a:prstGeom>
-        <a:solidFill>
-          <a:srgbClr val="00B050"/>
-        </a:solidFill>
-        <a:ln w="12700" cap="flat" cmpd="sng" algn="ctr">
-          <a:solidFill>
-            <a:schemeClr val="lt1">
-              <a:hueOff val="0"/>
-              <a:satOff val="0"/>
-              <a:lumOff val="0"/>
-              <a:alphaOff val="0"/>
-            </a:schemeClr>
-          </a:solidFill>
-          <a:prstDash val="solid"/>
-          <a:miter lim="800000"/>
-        </a:ln>
-        <a:effectLst/>
-      </dsp:spPr>
-      <dsp:style>
-        <a:lnRef idx="2">
-          <a:scrgbClr r="0" g="0" b="0"/>
-        </a:lnRef>
-        <a:fillRef idx="1">
-          <a:scrgbClr r="0" g="0" b="0"/>
-        </a:fillRef>
-        <a:effectRef idx="0">
-          <a:scrgbClr r="0" g="0" b="0"/>
-        </a:effectRef>
-        <a:fontRef idx="minor">
-          <a:schemeClr val="lt1"/>
-        </a:fontRef>
-      </dsp:style>
-      <dsp:txBody>
-        <a:bodyPr spcFirstLastPara="0" vert="horz" wrap="square" lIns="390587" tIns="50800" rIns="50800" bIns="50800" numCol="1" spcCol="1270" anchor="ctr" anchorCtr="0">
-          <a:noAutofit/>
-        </a:bodyPr>
-        <a:lstStyle/>
-        <a:p>
-          <a:pPr marL="0" lvl="0" indent="0" algn="l" defTabSz="889000">
-            <a:lnSpc>
-              <a:spcPct val="90000"/>
-            </a:lnSpc>
-            <a:spcBef>
-              <a:spcPct val="0"/>
-            </a:spcBef>
-            <a:spcAft>
-              <a:spcPct val="35000"/>
-            </a:spcAft>
-            <a:buNone/>
-          </a:pPr>
-          <a:r>
-            <a:rPr lang="en-US" sz="2000" kern="1200" dirty="0"/>
-            <a:t>Success Criteria</a:t>
-          </a:r>
-        </a:p>
-      </dsp:txBody>
-      <dsp:txXfrm>
-        <a:off x="345596" y="1722275"/>
-        <a:ext cx="3707957" cy="492078"/>
-      </dsp:txXfrm>
-    </dsp:sp>
-    <dsp:sp modelId="{268A5DB2-0A5E-40C2-B729-E01A9EC5BC17}">
-      <dsp:nvSpPr>
-        <dsp:cNvPr id="0" name=""/>
-        <dsp:cNvSpPr/>
-      </dsp:nvSpPr>
-      <dsp:spPr>
-        <a:xfrm>
-          <a:off x="38047" y="1660765"/>
-          <a:ext cx="615098" cy="615098"/>
-        </a:xfrm>
-        <a:prstGeom prst="ellipse">
-          <a:avLst/>
-        </a:prstGeom>
-        <a:solidFill>
-          <a:schemeClr val="lt1">
-            <a:hueOff val="0"/>
-            <a:satOff val="0"/>
-            <a:lumOff val="0"/>
-            <a:alphaOff val="0"/>
-          </a:schemeClr>
-        </a:solidFill>
-        <a:ln w="12700" cap="flat" cmpd="sng" algn="ctr">
-          <a:solidFill>
-            <a:schemeClr val="accent1">
-              <a:hueOff val="0"/>
-              <a:satOff val="0"/>
-              <a:lumOff val="0"/>
-              <a:alphaOff val="0"/>
-            </a:schemeClr>
-          </a:solidFill>
-          <a:prstDash val="solid"/>
-          <a:miter lim="800000"/>
-        </a:ln>
-        <a:effectLst/>
-      </dsp:spPr>
-      <dsp:style>
-        <a:lnRef idx="2">
-          <a:scrgbClr r="0" g="0" b="0"/>
-        </a:lnRef>
-        <a:fillRef idx="1">
-          <a:scrgbClr r="0" g="0" b="0"/>
-        </a:fillRef>
-        <a:effectRef idx="0">
-          <a:scrgbClr r="0" g="0" b="0"/>
-        </a:effectRef>
-        <a:fontRef idx="minor"/>
-      </dsp:style>
-    </dsp:sp>
-  </dsp:spTree>
-</dsp:drawing>
-</file>
-
-<file path=ppt/diagrams/drawing2.xml><?xml version="1.0" encoding="utf-8"?>
-<dsp:drawing xmlns:dgm="http://schemas.openxmlformats.org/drawingml/2006/diagram" xmlns:dsp="http://schemas.microsoft.com/office/drawing/2008/diagram" xmlns:a="http://schemas.openxmlformats.org/drawingml/2006/main">
-  <dsp:spTree>
-    <dsp:nvGrpSpPr>
-      <dsp:cNvPr id="0" name=""/>
-      <dsp:cNvGrpSpPr/>
-    </dsp:nvGrpSpPr>
-    <dsp:grpSpPr/>
-    <dsp:sp modelId="{910EAB7F-D05D-45ED-9676-E8DFAD613FC7}">
-      <dsp:nvSpPr>
-        <dsp:cNvPr id="0" name=""/>
-        <dsp:cNvSpPr/>
-      </dsp:nvSpPr>
-      <dsp:spPr>
-        <a:xfrm>
-          <a:off x="-2780043" y="-428587"/>
-          <a:ext cx="3317568" cy="3317568"/>
-        </a:xfrm>
-        <a:prstGeom prst="blockArc">
-          <a:avLst>
-            <a:gd name="adj1" fmla="val 18900000"/>
-            <a:gd name="adj2" fmla="val 2700000"/>
-            <a:gd name="adj3" fmla="val 651"/>
-          </a:avLst>
-        </a:prstGeom>
-        <a:noFill/>
-        <a:ln w="12700" cap="flat" cmpd="sng" algn="ctr">
-          <a:solidFill>
-            <a:schemeClr val="accent1">
-              <a:shade val="60000"/>
-              <a:hueOff val="0"/>
-              <a:satOff val="0"/>
-              <a:lumOff val="0"/>
-              <a:alphaOff val="0"/>
-            </a:schemeClr>
+            <a:srgbClr val="FFC000"/>
           </a:solidFill>
           <a:prstDash val="solid"/>
           <a:miter lim="800000"/>
@@ -3002,1284 +1564,6 @@
 </file>
 
 <file path=ppt/diagrams/layout1.xml><?xml version="1.0" encoding="utf-8"?>
-<dgm:layoutDef xmlns:dgm="http://schemas.openxmlformats.org/drawingml/2006/diagram" xmlns:a="http://schemas.openxmlformats.org/drawingml/2006/main" uniqueId="urn:microsoft.com/office/officeart/2008/layout/VerticalCurvedList">
-  <dgm:title val=""/>
-  <dgm:desc val=""/>
-  <dgm:catLst>
-    <dgm:cat type="list" pri="20000"/>
-  </dgm:catLst>
-  <dgm:sampData>
-    <dgm:dataModel>
-      <dgm:ptLst>
-        <dgm:pt modelId="0" type="doc"/>
-        <dgm:pt modelId="1">
-          <dgm:prSet phldr="1"/>
-        </dgm:pt>
-        <dgm:pt modelId="2">
-          <dgm:prSet phldr="1"/>
-        </dgm:pt>
-        <dgm:pt modelId="3">
-          <dgm:prSet phldr="1"/>
-        </dgm:pt>
-      </dgm:ptLst>
-      <dgm:cxnLst>
-        <dgm:cxn modelId="4" srcId="0" destId="1" srcOrd="0" destOrd="0"/>
-        <dgm:cxn modelId="5" srcId="0" destId="2" srcOrd="1" destOrd="0"/>
-        <dgm:cxn modelId="6" srcId="0" destId="3" srcOrd="2" destOrd="0"/>
-      </dgm:cxnLst>
-      <dgm:bg/>
-      <dgm:whole/>
-    </dgm:dataModel>
-  </dgm:sampData>
-  <dgm:styleData>
-    <dgm:dataModel>
-      <dgm:ptLst>
-        <dgm:pt modelId="0" type="doc"/>
-        <dgm:pt modelId="1">
-          <dgm:prSet phldr="1"/>
-        </dgm:pt>
-        <dgm:pt modelId="2">
-          <dgm:prSet phldr="1"/>
-        </dgm:pt>
-      </dgm:ptLst>
-      <dgm:cxnLst>
-        <dgm:cxn modelId="3" srcId="0" destId="1" srcOrd="0" destOrd="0"/>
-        <dgm:cxn modelId="4" srcId="0" destId="2" srcOrd="1" destOrd="0"/>
-      </dgm:cxnLst>
-      <dgm:bg/>
-      <dgm:whole/>
-    </dgm:dataModel>
-  </dgm:styleData>
-  <dgm:clrData>
-    <dgm:dataModel>
-      <dgm:ptLst>
-        <dgm:pt modelId="0" type="doc"/>
-        <dgm:pt modelId="1">
-          <dgm:prSet phldr="1"/>
-        </dgm:pt>
-        <dgm:pt modelId="2">
-          <dgm:prSet phldr="1"/>
-        </dgm:pt>
-        <dgm:pt modelId="3">
-          <dgm:prSet phldr="1"/>
-        </dgm:pt>
-        <dgm:pt modelId="4">
-          <dgm:prSet phldr="1"/>
-        </dgm:pt>
-      </dgm:ptLst>
-      <dgm:cxnLst>
-        <dgm:cxn modelId="5" srcId="0" destId="1" srcOrd="0" destOrd="0"/>
-        <dgm:cxn modelId="6" srcId="0" destId="2" srcOrd="1" destOrd="0"/>
-        <dgm:cxn modelId="7" srcId="0" destId="3" srcOrd="2" destOrd="0"/>
-        <dgm:cxn modelId="8" srcId="0" destId="4" srcOrd="3" destOrd="0"/>
-      </dgm:cxnLst>
-      <dgm:bg/>
-      <dgm:whole/>
-    </dgm:dataModel>
-  </dgm:clrData>
-  <dgm:layoutNode name="Name0">
-    <dgm:varLst>
-      <dgm:chMax val="7"/>
-      <dgm:chPref val="7"/>
-      <dgm:dir/>
-    </dgm:varLst>
-    <dgm:alg type="composite"/>
-    <dgm:shape xmlns:r="http://schemas.openxmlformats.org/officeDocument/2006/relationships" r:blip="">
-      <dgm:adjLst/>
-    </dgm:shape>
-    <dgm:constrLst>
-      <dgm:constr type="w" for="ch" refType="h" refFor="ch" op="gte" fact="0.8"/>
-    </dgm:constrLst>
-    <dgm:layoutNode name="Name1">
-      <dgm:alg type="composite"/>
-      <dgm:shape xmlns:r="http://schemas.openxmlformats.org/officeDocument/2006/relationships" r:blip="">
-        <dgm:adjLst/>
-      </dgm:shape>
-      <dgm:choose name="Name2">
-        <dgm:if name="Name3" func="var" arg="dir" op="equ" val="norm">
-          <dgm:choose name="Name4">
-            <dgm:if name="Name5" axis="ch" ptType="node" func="cnt" op="equ" val="1">
-              <dgm:constrLst>
-                <dgm:constr type="h" for="ch" forName="cycle" refType="h"/>
-                <dgm:constr type="w" for="ch" forName="cycle" refType="h" refFor="ch" refForName="cycle" fact="0.26"/>
-                <dgm:constr type="l" for="ch" forName="cycle"/>
-                <dgm:constr type="ctrY" for="ch" forName="cycle" refType="h" fact="0.5"/>
-                <dgm:constr type="diam" for="ch" forName="cycle" refType="h" fact="1.344"/>
-                <dgm:constr type="h" for="ch" forName="accent_1" refType="h" fact="0.625"/>
-                <dgm:constr type="w" for="ch" forName="accent_1" refType="h" refFor="ch" refForName="accent_1" op="equ"/>
-                <dgm:constr type="ctrY" for="ch" forName="accent_1" refType="h" fact="0.5"/>
-                <dgm:constr type="ctrX" for="ch" forName="accent_1" refType="h" fact="0.2253"/>
-                <dgm:constr type="l" for="ch" forName="text_1" refType="ctrX" refFor="ch" refForName="accent_1"/>
-                <dgm:constr type="r" for="ch" forName="text_1" refType="w"/>
-                <dgm:constr type="w" for="ch" forName="text_1" refType="h" refFor="ch" refForName="text_1" op="gte"/>
-                <dgm:constr type="h" for="ch" forName="text_1" refType="h" refFor="ch" refForName="accent_1" fact="0.8"/>
-                <dgm:constr type="ctrY" for="ch" forName="text_1" refType="ctrY" refFor="ch" refForName="accent_1"/>
-                <dgm:constr type="lMarg" for="ch" forName="text_1" refType="w" refFor="ch" refForName="accent_1" fact="1.8"/>
-                <dgm:constr type="primFontSz" for="ch" ptType="node" op="equ" val="65"/>
-              </dgm:constrLst>
-            </dgm:if>
-            <dgm:if name="Name6" axis="ch" ptType="node" func="cnt" op="equ" val="2">
-              <dgm:constrLst>
-                <dgm:constr type="h" for="ch" forName="cycle" refType="h"/>
-                <dgm:constr type="w" for="ch" forName="cycle" refType="h" refFor="ch" refForName="cycle" fact="0.26"/>
-                <dgm:constr type="l" for="ch" forName="cycle"/>
-                <dgm:constr type="ctrY" for="ch" forName="cycle" refType="h" fact="0.5"/>
-                <dgm:constr type="diam" for="ch" forName="cycle" refType="h" fact="1.344"/>
-                <dgm:constr type="h" for="ch" forName="accent_1" refType="h" fact="0.3571"/>
-                <dgm:constr type="w" for="ch" forName="accent_1" refType="h" refFor="ch" refForName="accent_1" op="equ"/>
-                <dgm:constr type="ctrY" for="ch" forName="accent_1" refType="h" fact="0.2857"/>
-                <dgm:constr type="ctrX" for="ch" forName="accent_1" refType="h" fact="0.1891"/>
-                <dgm:constr type="l" for="ch" forName="text_1" refType="ctrX" refFor="ch" refForName="accent_1"/>
-                <dgm:constr type="r" for="ch" forName="text_1" refType="w"/>
-                <dgm:constr type="w" for="ch" forName="text_1" refType="h" refFor="ch" refForName="text_1" op="gte"/>
-                <dgm:constr type="h" for="ch" forName="text_1" refType="h" refFor="ch" refForName="accent_1" fact="0.8"/>
-                <dgm:constr type="ctrY" for="ch" forName="text_1" refType="ctrY" refFor="ch" refForName="accent_1"/>
-                <dgm:constr type="lMarg" for="ch" forName="text_1" refType="w" refFor="ch" refForName="accent_1" fact="1.8"/>
-                <dgm:constr type="h" for="ch" forName="accent_2" refType="h" fact="0.3571"/>
-                <dgm:constr type="w" for="ch" forName="accent_2" refType="h" refFor="ch" refForName="accent_2" op="equ"/>
-                <dgm:constr type="ctrY" for="ch" forName="accent_2" refType="h" fact="0.7143"/>
-                <dgm:constr type="ctrX" for="ch" forName="accent_2" refType="h" fact="0.1891"/>
-                <dgm:constr type="l" for="ch" forName="text_2" refType="ctrX" refFor="ch" refForName="accent_2"/>
-                <dgm:constr type="r" for="ch" forName="text_2" refType="w"/>
-                <dgm:constr type="w" for="ch" forName="text_2" refType="h" refFor="ch" refForName="text_2" op="gte"/>
-                <dgm:constr type="h" for="ch" forName="text_2" refType="h" refFor="ch" refForName="accent_2" fact="0.8"/>
-                <dgm:constr type="ctrY" for="ch" forName="text_2" refType="ctrY" refFor="ch" refForName="accent_2"/>
-                <dgm:constr type="lMarg" for="ch" forName="text_2" refType="w" refFor="ch" refForName="accent_2" fact="1.8"/>
-                <dgm:constr type="primFontSz" for="ch" ptType="node" op="equ" val="65"/>
-              </dgm:constrLst>
-            </dgm:if>
-            <dgm:if name="Name7" axis="ch" ptType="node" func="cnt" op="equ" val="3">
-              <dgm:constrLst>
-                <dgm:constr type="h" for="ch" forName="cycle" refType="h"/>
-                <dgm:constr type="w" for="ch" forName="cycle" refType="h" refFor="ch" refForName="cycle" fact="0.26"/>
-                <dgm:constr type="l" for="ch" forName="cycle"/>
-                <dgm:constr type="ctrY" for="ch" forName="cycle" refType="h" fact="0.5"/>
-                <dgm:constr type="diam" for="ch" forName="cycle" refType="h" fact="1.344"/>
-                <dgm:constr type="h" for="ch" forName="accent_1" refType="h" fact="0.25"/>
-                <dgm:constr type="w" for="ch" forName="accent_1" refType="h" refFor="ch" refForName="accent_1" op="equ"/>
-                <dgm:constr type="ctrY" for="ch" forName="accent_1" refType="h" fact="0.2"/>
-                <dgm:constr type="ctrX" for="ch" forName="accent_1" refType="h" fact="0.1526"/>
-                <dgm:constr type="l" for="ch" forName="text_1" refType="ctrX" refFor="ch" refForName="accent_1"/>
-                <dgm:constr type="r" for="ch" forName="text_1" refType="w"/>
-                <dgm:constr type="w" for="ch" forName="text_1" refType="h" refFor="ch" refForName="text_1" op="gte"/>
-                <dgm:constr type="h" for="ch" forName="text_1" refType="h" refFor="ch" refForName="accent_1" fact="0.8"/>
-                <dgm:constr type="ctrY" for="ch" forName="text_1" refType="ctrY" refFor="ch" refForName="accent_1"/>
-                <dgm:constr type="lMarg" for="ch" forName="text_1" refType="w" refFor="ch" refForName="accent_1" fact="1.8"/>
-                <dgm:constr type="h" for="ch" forName="accent_2" refType="h" fact="0.25"/>
-                <dgm:constr type="w" for="ch" forName="accent_2" refType="h" refFor="ch" refForName="accent_2" op="equ"/>
-                <dgm:constr type="ctrY" for="ch" forName="accent_2" refType="h" fact="0.5"/>
-                <dgm:constr type="ctrX" for="ch" forName="accent_2" refType="h" fact="0.2253"/>
-                <dgm:constr type="l" for="ch" forName="text_2" refType="ctrX" refFor="ch" refForName="accent_2"/>
-                <dgm:constr type="r" for="ch" forName="text_2" refType="w"/>
-                <dgm:constr type="w" for="ch" forName="text_2" refType="h" refFor="ch" refForName="text_2" op="gte"/>
-                <dgm:constr type="h" for="ch" forName="text_2" refType="h" refFor="ch" refForName="accent_2" fact="0.8"/>
-                <dgm:constr type="ctrY" for="ch" forName="text_2" refType="ctrY" refFor="ch" refForName="accent_2"/>
-                <dgm:constr type="lMarg" for="ch" forName="text_2" refType="w" refFor="ch" refForName="accent_2" fact="1.8"/>
-                <dgm:constr type="h" for="ch" forName="accent_3" refType="h" fact="0.25"/>
-                <dgm:constr type="w" for="ch" forName="accent_3" refType="h" refFor="ch" refForName="accent_3" op="equ"/>
-                <dgm:constr type="ctrY" for="ch" forName="accent_3" refType="h" fact="0.8"/>
-                <dgm:constr type="ctrX" for="ch" forName="accent_3" refType="h" fact="0.1526"/>
-                <dgm:constr type="l" for="ch" forName="text_3" refType="ctrX" refFor="ch" refForName="accent_3"/>
-                <dgm:constr type="r" for="ch" forName="text_3" refType="w"/>
-                <dgm:constr type="w" for="ch" forName="text_3" refType="h" refFor="ch" refForName="text_3" op="gte"/>
-                <dgm:constr type="h" for="ch" forName="text_3" refType="h" refFor="ch" refForName="accent_3" fact="0.8"/>
-                <dgm:constr type="ctrY" for="ch" forName="text_3" refType="ctrY" refFor="ch" refForName="accent_3"/>
-                <dgm:constr type="lMarg" for="ch" forName="text_3" refType="w" refFor="ch" refForName="accent_3" fact="1.8"/>
-                <dgm:constr type="primFontSz" for="ch" ptType="node" op="equ" val="65"/>
-              </dgm:constrLst>
-            </dgm:if>
-            <dgm:if name="Name8" axis="ch" ptType="node" func="cnt" op="equ" val="4">
-              <dgm:constrLst>
-                <dgm:constr type="h" for="ch" forName="cycle" refType="h"/>
-                <dgm:constr type="w" for="ch" forName="cycle" refType="h" refFor="ch" refForName="cycle" fact="0.26"/>
-                <dgm:constr type="l" for="ch" forName="cycle"/>
-                <dgm:constr type="ctrY" for="ch" forName="cycle" refType="h" fact="0.5"/>
-                <dgm:constr type="diam" for="ch" forName="cycle" refType="h" fact="1.344"/>
-                <dgm:constr type="h" for="ch" forName="accent_1" refType="h" fact="0.1923"/>
-                <dgm:constr type="w" for="ch" forName="accent_1" refType="h" refFor="ch" refForName="accent_1" op="equ"/>
-                <dgm:constr type="ctrY" for="ch" forName="accent_1" refType="h" fact="0.1538"/>
-                <dgm:constr type="ctrX" for="ch" forName="accent_1" refType="h" fact="0.1268"/>
-                <dgm:constr type="l" for="ch" forName="text_1" refType="ctrX" refFor="ch" refForName="accent_1"/>
-                <dgm:constr type="r" for="ch" forName="text_1" refType="w"/>
-                <dgm:constr type="w" for="ch" forName="text_1" refType="h" refFor="ch" refForName="text_1" op="gte"/>
-                <dgm:constr type="h" for="ch" forName="text_1" refType="h" refFor="ch" refForName="accent_1" fact="0.8"/>
-                <dgm:constr type="ctrY" for="ch" forName="text_1" refType="ctrY" refFor="ch" refForName="accent_1"/>
-                <dgm:constr type="lMarg" for="ch" forName="text_1" refType="w" refFor="ch" refForName="accent_1" fact="1.8"/>
-                <dgm:constr type="h" for="ch" forName="accent_2" refType="h" fact="0.1923"/>
-                <dgm:constr type="w" for="ch" forName="accent_2" refType="h" refFor="ch" refForName="accent_2" op="equ"/>
-                <dgm:constr type="ctrY" for="ch" forName="accent_2" refType="h" fact="0.3846"/>
-                <dgm:constr type="ctrX" for="ch" forName="accent_2" refType="h" fact="0.215"/>
-                <dgm:constr type="l" for="ch" forName="text_2" refType="ctrX" refFor="ch" refForName="accent_2"/>
-                <dgm:constr type="r" for="ch" forName="text_2" refType="w"/>
-                <dgm:constr type="w" for="ch" forName="text_2" refType="h" refFor="ch" refForName="text_2" op="gte"/>
-                <dgm:constr type="h" for="ch" forName="text_2" refType="h" refFor="ch" refForName="accent_2" fact="0.8"/>
-                <dgm:constr type="ctrY" for="ch" forName="text_2" refType="ctrY" refFor="ch" refForName="accent_2"/>
-                <dgm:constr type="lMarg" for="ch" forName="text_2" refType="w" refFor="ch" refForName="accent_2" fact="1.8"/>
-                <dgm:constr type="h" for="ch" forName="accent_3" refType="h" fact="0.1923"/>
-                <dgm:constr type="w" for="ch" forName="accent_3" refType="h" refFor="ch" refForName="accent_3" op="equ"/>
-                <dgm:constr type="ctrY" for="ch" forName="accent_3" refType="h" fact="0.6154"/>
-                <dgm:constr type="ctrX" for="ch" forName="accent_3" refType="h" fact="0.215"/>
-                <dgm:constr type="l" for="ch" forName="text_3" refType="ctrX" refFor="ch" refForName="accent_3"/>
-                <dgm:constr type="r" for="ch" forName="text_3" refType="w"/>
-                <dgm:constr type="w" for="ch" forName="text_3" refType="h" refFor="ch" refForName="text_3" op="gte"/>
-                <dgm:constr type="h" for="ch" forName="text_3" refType="h" refFor="ch" refForName="accent_3" fact="0.8"/>
-                <dgm:constr type="ctrY" for="ch" forName="text_3" refType="ctrY" refFor="ch" refForName="accent_3"/>
-                <dgm:constr type="lMarg" for="ch" forName="text_3" refType="w" refFor="ch" refForName="accent_3" fact="1.8"/>
-                <dgm:constr type="h" for="ch" forName="accent_4" refType="h" fact="0.1923"/>
-                <dgm:constr type="w" for="ch" forName="accent_4" refType="h" refFor="ch" refForName="accent_4" op="equ"/>
-                <dgm:constr type="ctrY" for="ch" forName="accent_4" refType="h" fact="0.8462"/>
-                <dgm:constr type="ctrX" for="ch" forName="accent_4" refType="h" fact="0.1268"/>
-                <dgm:constr type="l" for="ch" forName="text_4" refType="ctrX" refFor="ch" refForName="accent_4"/>
-                <dgm:constr type="r" for="ch" forName="text_4" refType="w"/>
-                <dgm:constr type="w" for="ch" forName="text_4" refType="h" refFor="ch" refForName="text_4" op="gte"/>
-                <dgm:constr type="h" for="ch" forName="text_4" refType="h" refFor="ch" refForName="accent_4" fact="0.8"/>
-                <dgm:constr type="ctrY" for="ch" forName="text_4" refType="ctrY" refFor="ch" refForName="accent_4"/>
-                <dgm:constr type="lMarg" for="ch" forName="text_4" refType="w" refFor="ch" refForName="accent_4" fact="1.8"/>
-                <dgm:constr type="primFontSz" for="ch" ptType="node" op="equ" val="65"/>
-              </dgm:constrLst>
-            </dgm:if>
-            <dgm:if name="Name9" axis="ch" ptType="node" func="cnt" op="equ" val="5">
-              <dgm:constrLst>
-                <dgm:constr type="h" for="ch" forName="cycle" refType="h"/>
-                <dgm:constr type="w" for="ch" forName="cycle" refType="h" refFor="ch" refForName="cycle" fact="0.26"/>
-                <dgm:constr type="l" for="ch" forName="cycle"/>
-                <dgm:constr type="ctrY" for="ch" forName="cycle" refType="h" fact="0.5"/>
-                <dgm:constr type="diam" for="ch" forName="cycle" refType="h" fact="1.344"/>
-                <dgm:constr type="h" for="ch" forName="accent_1" refType="h" fact="0.1563"/>
-                <dgm:constr type="w" for="ch" forName="accent_1" refType="h" refFor="ch" refForName="accent_1" op="equ"/>
-                <dgm:constr type="ctrY" for="ch" forName="accent_1" refType="h" fact="0.125"/>
-                <dgm:constr type="ctrX" for="ch" forName="accent_1" refType="h" fact="0.1082"/>
-                <dgm:constr type="l" for="ch" forName="text_1" refType="ctrX" refFor="ch" refForName="accent_1"/>
-                <dgm:constr type="r" for="ch" forName="text_1" refType="w"/>
-                <dgm:constr type="w" for="ch" forName="text_1" refType="h" refFor="ch" refForName="text_1" op="gte"/>
-                <dgm:constr type="h" for="ch" forName="text_1" refType="h" refFor="ch" refForName="accent_1" fact="0.8"/>
-                <dgm:constr type="ctrY" for="ch" forName="text_1" refType="ctrY" refFor="ch" refForName="accent_1"/>
-                <dgm:constr type="lMarg" for="ch" forName="text_1" refType="w" refFor="ch" refForName="accent_1" fact="1.8"/>
-                <dgm:constr type="h" for="ch" forName="accent_2" refType="h" fact="0.1563"/>
-                <dgm:constr type="w" for="ch" forName="accent_2" refType="h" refFor="ch" refForName="accent_2" op="equ"/>
-                <dgm:constr type="ctrY" for="ch" forName="accent_2" refType="h" fact="0.3125"/>
-                <dgm:constr type="ctrX" for="ch" forName="accent_2" refType="h" fact="0.1978"/>
-                <dgm:constr type="l" for="ch" forName="text_2" refType="ctrX" refFor="ch" refForName="accent_2"/>
-                <dgm:constr type="r" for="ch" forName="text_2" refType="w"/>
-                <dgm:constr type="w" for="ch" forName="text_2" refType="h" refFor="ch" refForName="text_2" op="gte"/>
-                <dgm:constr type="h" for="ch" forName="text_2" refType="h" refFor="ch" refForName="accent_2" fact="0.8"/>
-                <dgm:constr type="ctrY" for="ch" forName="text_2" refType="ctrY" refFor="ch" refForName="accent_2"/>
-                <dgm:constr type="lMarg" for="ch" forName="text_2" refType="w" refFor="ch" refForName="accent_2" fact="1.8"/>
-                <dgm:constr type="h" for="ch" forName="accent_3" refType="h" fact="0.1563"/>
-                <dgm:constr type="w" for="ch" forName="accent_3" refType="h" refFor="ch" refForName="accent_3" op="equ"/>
-                <dgm:constr type="ctrY" for="ch" forName="accent_3" refType="h" fact="0.5"/>
-                <dgm:constr type="ctrX" for="ch" forName="accent_3" refType="h" fact="0.2253"/>
-                <dgm:constr type="l" for="ch" forName="text_3" refType="ctrX" refFor="ch" refForName="accent_3"/>
-                <dgm:constr type="r" for="ch" forName="text_3" refType="w"/>
-                <dgm:constr type="w" for="ch" forName="text_3" refType="h" refFor="ch" refForName="text_3" op="gte"/>
-                <dgm:constr type="h" for="ch" forName="text_3" refType="h" refFor="ch" refForName="accent_3" fact="0.8"/>
-                <dgm:constr type="ctrY" for="ch" forName="text_3" refType="ctrY" refFor="ch" refForName="accent_3"/>
-                <dgm:constr type="lMarg" for="ch" forName="text_3" refType="w" refFor="ch" refForName="accent_3" fact="1.8"/>
-                <dgm:constr type="h" for="ch" forName="accent_4" refType="h" fact="0.1563"/>
-                <dgm:constr type="w" for="ch" forName="accent_4" refType="h" refFor="ch" refForName="accent_4" op="equ"/>
-                <dgm:constr type="ctrY" for="ch" forName="accent_4" refType="h" fact="0.6875"/>
-                <dgm:constr type="ctrX" for="ch" forName="accent_4" refType="h" fact="0.1978"/>
-                <dgm:constr type="l" for="ch" forName="text_4" refType="ctrX" refFor="ch" refForName="accent_4"/>
-                <dgm:constr type="r" for="ch" forName="text_4" refType="w"/>
-                <dgm:constr type="w" for="ch" forName="text_4" refType="h" refFor="ch" refForName="text_4" op="gte"/>
-                <dgm:constr type="h" for="ch" forName="text_4" refType="h" refFor="ch" refForName="accent_4" fact="0.8"/>
-                <dgm:constr type="ctrY" for="ch" forName="text_4" refType="ctrY" refFor="ch" refForName="accent_4"/>
-                <dgm:constr type="lMarg" for="ch" forName="text_4" refType="w" refFor="ch" refForName="accent_4" fact="1.8"/>
-                <dgm:constr type="h" for="ch" forName="accent_5" refType="h" fact="0.1563"/>
-                <dgm:constr type="w" for="ch" forName="accent_5" refType="h" refFor="ch" refForName="accent_5" op="equ"/>
-                <dgm:constr type="ctrY" for="ch" forName="accent_5" refType="h" fact="0.875"/>
-                <dgm:constr type="ctrX" for="ch" forName="accent_5" refType="h" fact="0.1082"/>
-                <dgm:constr type="l" for="ch" forName="text_5" refType="ctrX" refFor="ch" refForName="accent_5"/>
-                <dgm:constr type="r" for="ch" forName="text_5" refType="w"/>
-                <dgm:constr type="w" for="ch" forName="text_5" refType="h" refFor="ch" refForName="text_5" op="gte"/>
-                <dgm:constr type="h" for="ch" forName="text_5" refType="h" refFor="ch" refForName="accent_5" fact="0.8"/>
-                <dgm:constr type="ctrY" for="ch" forName="text_5" refType="ctrY" refFor="ch" refForName="accent_5"/>
-                <dgm:constr type="lMarg" for="ch" forName="text_5" refType="w" refFor="ch" refForName="accent_5" fact="1.8"/>
-                <dgm:constr type="primFontSz" for="ch" ptType="node" op="equ" val="65"/>
-              </dgm:constrLst>
-            </dgm:if>
-            <dgm:if name="Name10" axis="ch" ptType="node" func="cnt" op="equ" val="6">
-              <dgm:constrLst>
-                <dgm:constr type="h" for="ch" forName="cycle" refType="h"/>
-                <dgm:constr type="w" for="ch" forName="cycle" refType="h" refFor="ch" refForName="cycle" fact="0.26"/>
-                <dgm:constr type="l" for="ch" forName="cycle"/>
-                <dgm:constr type="ctrY" for="ch" forName="cycle" refType="h" fact="0.5"/>
-                <dgm:constr type="diam" for="ch" forName="cycle" refType="h" fact="1.344"/>
-                <dgm:constr type="h" for="ch" forName="accent_1" refType="h" fact="0.1316"/>
-                <dgm:constr type="w" for="ch" forName="accent_1" refType="h" refFor="ch" refForName="accent_1" op="equ"/>
-                <dgm:constr type="ctrY" for="ch" forName="accent_1" refType="h" fact="0.1053"/>
-                <dgm:constr type="ctrX" for="ch" forName="accent_1" refType="h" fact="0.0943"/>
-                <dgm:constr type="l" for="ch" forName="text_1" refType="ctrX" refFor="ch" refForName="accent_1"/>
-                <dgm:constr type="r" for="ch" forName="text_1" refType="w"/>
-                <dgm:constr type="w" for="ch" forName="text_1" refType="h" refFor="ch" refForName="text_1" op="gte"/>
-                <dgm:constr type="h" for="ch" forName="text_1" refType="h" refFor="ch" refForName="accent_1" fact="0.8"/>
-                <dgm:constr type="ctrY" for="ch" forName="text_1" refType="ctrY" refFor="ch" refForName="accent_1"/>
-                <dgm:constr type="lMarg" for="ch" forName="text_1" refType="w" refFor="ch" refForName="accent_1" fact="1.8"/>
-                <dgm:constr type="h" for="ch" forName="accent_2" refType="h" fact="0.1316"/>
-                <dgm:constr type="w" for="ch" forName="accent_2" refType="h" refFor="ch" refForName="accent_2" op="equ"/>
-                <dgm:constr type="ctrY" for="ch" forName="accent_2" refType="h" fact="0.2632"/>
-                <dgm:constr type="ctrX" for="ch" forName="accent_2" refType="h" fact="0.1809"/>
-                <dgm:constr type="l" for="ch" forName="text_2" refType="ctrX" refFor="ch" refForName="accent_2"/>
-                <dgm:constr type="r" for="ch" forName="text_2" refType="w"/>
-                <dgm:constr type="w" for="ch" forName="text_2" refType="h" refFor="ch" refForName="text_2" op="gte"/>
-                <dgm:constr type="h" for="ch" forName="text_2" refType="h" refFor="ch" refForName="accent_2" fact="0.8"/>
-                <dgm:constr type="ctrY" for="ch" forName="text_2" refType="ctrY" refFor="ch" refForName="accent_2"/>
-                <dgm:constr type="lMarg" for="ch" forName="text_2" refType="w" refFor="ch" refForName="accent_2" fact="1.8"/>
-                <dgm:constr type="h" for="ch" forName="accent_3" refType="h" fact="0.1316"/>
-                <dgm:constr type="w" for="ch" forName="accent_3" refType="h" refFor="ch" refForName="accent_3" op="equ"/>
-                <dgm:constr type="ctrY" for="ch" forName="accent_3" refType="h" fact="0.4211"/>
-                <dgm:constr type="ctrX" for="ch" forName="accent_3" refType="h" fact="0.2205"/>
-                <dgm:constr type="l" for="ch" forName="text_3" refType="ctrX" refFor="ch" refForName="accent_3"/>
-                <dgm:constr type="r" for="ch" forName="text_3" refType="w"/>
-                <dgm:constr type="w" for="ch" forName="text_3" refType="h" refFor="ch" refForName="text_3" op="gte"/>
-                <dgm:constr type="h" for="ch" forName="text_3" refType="h" refFor="ch" refForName="accent_3" fact="0.8"/>
-                <dgm:constr type="ctrY" for="ch" forName="text_3" refType="ctrY" refFor="ch" refForName="accent_3"/>
-                <dgm:constr type="lMarg" for="ch" forName="text_3" refType="w" refFor="ch" refForName="accent_3" fact="1.8"/>
-                <dgm:constr type="h" for="ch" forName="accent_4" refType="h" fact="0.1316"/>
-                <dgm:constr type="w" for="ch" forName="accent_4" refType="h" refFor="ch" refForName="accent_4" op="equ"/>
-                <dgm:constr type="ctrY" for="ch" forName="accent_4" refType="h" fact="0.5789"/>
-                <dgm:constr type="ctrX" for="ch" forName="accent_4" refType="h" fact="0.2205"/>
-                <dgm:constr type="l" for="ch" forName="text_4" refType="ctrX" refFor="ch" refForName="accent_4"/>
-                <dgm:constr type="r" for="ch" forName="text_4" refType="w"/>
-                <dgm:constr type="w" for="ch" forName="text_4" refType="h" refFor="ch" refForName="text_4" op="gte"/>
-                <dgm:constr type="h" for="ch" forName="text_4" refType="h" refFor="ch" refForName="accent_4" fact="0.8"/>
-                <dgm:constr type="ctrY" for="ch" forName="text_4" refType="ctrY" refFor="ch" refForName="accent_4"/>
-                <dgm:constr type="lMarg" for="ch" forName="text_4" refType="w" refFor="ch" refForName="accent_4" fact="1.8"/>
-                <dgm:constr type="h" for="ch" forName="accent_5" refType="h" fact="0.1316"/>
-                <dgm:constr type="w" for="ch" forName="accent_5" refType="h" refFor="ch" refForName="accent_5" op="equ"/>
-                <dgm:constr type="ctrY" for="ch" forName="accent_5" refType="h" fact="0.7368"/>
-                <dgm:constr type="ctrX" for="ch" forName="accent_5" refType="h" fact="0.1809"/>
-                <dgm:constr type="l" for="ch" forName="text_5" refType="ctrX" refFor="ch" refForName="accent_5"/>
-                <dgm:constr type="r" for="ch" forName="text_5" refType="w"/>
-                <dgm:constr type="w" for="ch" forName="text_5" refType="h" refFor="ch" refForName="text_5" op="gte"/>
-                <dgm:constr type="h" for="ch" forName="text_5" refType="h" refFor="ch" refForName="accent_5" fact="0.8"/>
-                <dgm:constr type="ctrY" for="ch" forName="text_5" refType="ctrY" refFor="ch" refForName="accent_5"/>
-                <dgm:constr type="lMarg" for="ch" forName="text_5" refType="w" refFor="ch" refForName="accent_5" fact="1.8"/>
-                <dgm:constr type="h" for="ch" forName="accent_6" refType="h" fact="0.1316"/>
-                <dgm:constr type="w" for="ch" forName="accent_6" refType="h" refFor="ch" refForName="accent_6" op="equ"/>
-                <dgm:constr type="ctrY" for="ch" forName="accent_6" refType="h" fact="0.8947"/>
-                <dgm:constr type="ctrX" for="ch" forName="accent_6" refType="h" fact="0.0943"/>
-                <dgm:constr type="l" for="ch" forName="text_6" refType="ctrX" refFor="ch" refForName="accent_6"/>
-                <dgm:constr type="r" for="ch" forName="text_6" refType="w"/>
-                <dgm:constr type="w" for="ch" forName="text_6" refType="h" refFor="ch" refForName="text_6" op="gte"/>
-                <dgm:constr type="h" for="ch" forName="text_6" refType="h" refFor="ch" refForName="accent_6" fact="0.8"/>
-                <dgm:constr type="ctrY" for="ch" forName="text_6" refType="ctrY" refFor="ch" refForName="accent_6"/>
-                <dgm:constr type="lMarg" for="ch" forName="text_6" refType="w" refFor="ch" refForName="accent_6" fact="1.8"/>
-                <dgm:constr type="primFontSz" for="ch" ptType="node" op="equ" val="65"/>
-              </dgm:constrLst>
-            </dgm:if>
-            <dgm:else name="Name11">
-              <dgm:constrLst>
-                <dgm:constr type="h" for="ch" forName="cycle" refType="h"/>
-                <dgm:constr type="w" for="ch" forName="cycle" refType="h" refFor="ch" refForName="cycle" fact="0.26"/>
-                <dgm:constr type="l" for="ch" forName="cycle"/>
-                <dgm:constr type="ctrY" for="ch" forName="cycle" refType="h" fact="0.5"/>
-                <dgm:constr type="diam" for="ch" forName="cycle" refType="h" fact="1.344"/>
-                <dgm:constr type="h" for="ch" forName="accent_1" refType="h" fact="0.1136"/>
-                <dgm:constr type="w" for="ch" forName="accent_1" refType="h" refFor="ch" refForName="accent_1" op="equ"/>
-                <dgm:constr type="ctrY" for="ch" forName="accent_1" refType="h" fact="0.0909"/>
-                <dgm:constr type="ctrX" for="ch" forName="accent_1" refType="h" fact="0.0835"/>
-                <dgm:constr type="l" for="ch" forName="text_1" refType="ctrX" refFor="ch" refForName="accent_1"/>
-                <dgm:constr type="r" for="ch" forName="text_1" refType="w"/>
-                <dgm:constr type="w" for="ch" forName="text_1" refType="h" refFor="ch" refForName="text_1" op="gte"/>
-                <dgm:constr type="h" for="ch" forName="text_1" refType="h" refFor="ch" refForName="accent_1" fact="0.8"/>
-                <dgm:constr type="ctrY" for="ch" forName="text_1" refType="ctrY" refFor="ch" refForName="accent_1"/>
-                <dgm:constr type="lMarg" for="ch" forName="text_1" refType="w" refFor="ch" refForName="accent_1" fact="1.8"/>
-                <dgm:constr type="h" for="ch" forName="accent_2" refType="h" fact="0.1136"/>
-                <dgm:constr type="w" for="ch" forName="accent_2" refType="h" refFor="ch" refForName="accent_2" op="equ"/>
-                <dgm:constr type="ctrY" for="ch" forName="accent_2" refType="h" fact="0.2273"/>
-                <dgm:constr type="ctrX" for="ch" forName="accent_2" refType="h" fact="0.1658"/>
-                <dgm:constr type="l" for="ch" forName="text_2" refType="ctrX" refFor="ch" refForName="accent_2"/>
-                <dgm:constr type="r" for="ch" forName="text_2" refType="w"/>
-                <dgm:constr type="w" for="ch" forName="text_2" refType="h" refFor="ch" refForName="text_2" op="gte"/>
-                <dgm:constr type="h" for="ch" forName="text_2" refType="h" refFor="ch" refForName="accent_2" fact="0.8"/>
-                <dgm:constr type="ctrY" for="ch" forName="text_2" refType="ctrY" refFor="ch" refForName="accent_2"/>
-                <dgm:constr type="lMarg" for="ch" forName="text_2" refType="w" refFor="ch" refForName="accent_2" fact="1.8"/>
-                <dgm:constr type="h" for="ch" forName="accent_3" refType="h" fact="0.1136"/>
-                <dgm:constr type="w" for="ch" forName="accent_3" refType="h" refFor="ch" refForName="accent_3" op="equ"/>
-                <dgm:constr type="ctrY" for="ch" forName="accent_3" refType="h" fact="0.3636"/>
-                <dgm:constr type="ctrX" for="ch" forName="accent_3" refType="h" fact="0.2109"/>
-                <dgm:constr type="l" for="ch" forName="text_3" refType="ctrX" refFor="ch" refForName="accent_3"/>
-                <dgm:constr type="r" for="ch" forName="text_3" refType="w"/>
-                <dgm:constr type="w" for="ch" forName="text_3" refType="h" refFor="ch" refForName="text_3" op="gte"/>
-                <dgm:constr type="h" for="ch" forName="text_3" refType="h" refFor="ch" refForName="accent_3" fact="0.8"/>
-                <dgm:constr type="ctrY" for="ch" forName="text_3" refType="ctrY" refFor="ch" refForName="accent_3"/>
-                <dgm:constr type="lMarg" for="ch" forName="text_3" refType="w" refFor="ch" refForName="accent_3" fact="1.8"/>
-                <dgm:constr type="h" for="ch" forName="accent_4" refType="h" fact="0.1136"/>
-                <dgm:constr type="w" for="ch" forName="accent_4" refType="h" refFor="ch" refForName="accent_4" op="equ"/>
-                <dgm:constr type="ctrY" for="ch" forName="accent_4" refType="h" fact="0.5"/>
-                <dgm:constr type="ctrX" for="ch" forName="accent_4" refType="h" fact="0.2253"/>
-                <dgm:constr type="l" for="ch" forName="text_4" refType="ctrX" refFor="ch" refForName="accent_4"/>
-                <dgm:constr type="r" for="ch" forName="text_4" refType="w"/>
-                <dgm:constr type="w" for="ch" forName="text_4" refType="h" refFor="ch" refForName="text_4" op="gte"/>
-                <dgm:constr type="h" for="ch" forName="text_4" refType="h" refFor="ch" refForName="accent_4" fact="0.8"/>
-                <dgm:constr type="ctrY" for="ch" forName="text_4" refType="ctrY" refFor="ch" refForName="accent_4"/>
-                <dgm:constr type="lMarg" for="ch" forName="text_4" refType="w" refFor="ch" refForName="accent_4" fact="1.8"/>
-                <dgm:constr type="h" for="ch" forName="accent_5" refType="h" fact="0.1136"/>
-                <dgm:constr type="w" for="ch" forName="accent_5" refType="h" refFor="ch" refForName="accent_5" op="equ"/>
-                <dgm:constr type="ctrY" for="ch" forName="accent_5" refType="h" fact="0.6364"/>
-                <dgm:constr type="ctrX" for="ch" forName="accent_5" refType="h" fact="0.2109"/>
-                <dgm:constr type="l" for="ch" forName="text_5" refType="ctrX" refFor="ch" refForName="accent_5"/>
-                <dgm:constr type="r" for="ch" forName="text_5" refType="w"/>
-                <dgm:constr type="w" for="ch" forName="text_5" refType="h" refFor="ch" refForName="text_5" op="gte"/>
-                <dgm:constr type="h" for="ch" forName="text_5" refType="h" refFor="ch" refForName="accent_5" fact="0.8"/>
-                <dgm:constr type="ctrY" for="ch" forName="text_5" refType="ctrY" refFor="ch" refForName="accent_5"/>
-                <dgm:constr type="lMarg" for="ch" forName="text_5" refType="w" refFor="ch" refForName="accent_5" fact="1.8"/>
-                <dgm:constr type="h" for="ch" forName="accent_6" refType="h" fact="0.1136"/>
-                <dgm:constr type="w" for="ch" forName="accent_6" refType="h" refFor="ch" refForName="accent_6" op="equ"/>
-                <dgm:constr type="ctrY" for="ch" forName="accent_6" refType="h" fact="0.7727"/>
-                <dgm:constr type="ctrX" for="ch" forName="accent_6" refType="h" fact="0.1658"/>
-                <dgm:constr type="l" for="ch" forName="text_6" refType="ctrX" refFor="ch" refForName="accent_6"/>
-                <dgm:constr type="r" for="ch" forName="text_6" refType="w"/>
-                <dgm:constr type="w" for="ch" forName="text_6" refType="h" refFor="ch" refForName="text_6" op="gte"/>
-                <dgm:constr type="h" for="ch" forName="text_6" refType="h" refFor="ch" refForName="accent_6" fact="0.8"/>
-                <dgm:constr type="ctrY" for="ch" forName="text_6" refType="ctrY" refFor="ch" refForName="accent_6"/>
-                <dgm:constr type="lMarg" for="ch" forName="text_6" refType="w" refFor="ch" refForName="accent_6" fact="1.8"/>
-                <dgm:constr type="h" for="ch" forName="accent_7" refType="h" fact="0.1136"/>
-                <dgm:constr type="w" for="ch" forName="accent_7" refType="h" refFor="ch" refForName="accent_7" op="equ"/>
-                <dgm:constr type="ctrY" for="ch" forName="accent_7" refType="h" fact="0.9091"/>
-                <dgm:constr type="ctrX" for="ch" forName="accent_7" refType="h" fact="0.0835"/>
-                <dgm:constr type="l" for="ch" forName="text_7" refType="ctrX" refFor="ch" refForName="accent_7"/>
-                <dgm:constr type="r" for="ch" forName="text_7" refType="w"/>
-                <dgm:constr type="w" for="ch" forName="text_7" refType="h" refFor="ch" refForName="text_7" op="gte"/>
-                <dgm:constr type="h" for="ch" forName="text_7" refType="h" refFor="ch" refForName="accent_7" fact="0.8"/>
-                <dgm:constr type="ctrY" for="ch" forName="text_7" refType="ctrY" refFor="ch" refForName="accent_7"/>
-                <dgm:constr type="lMarg" for="ch" forName="text_7" refType="w" refFor="ch" refForName="accent_7" fact="1.8"/>
-                <dgm:constr type="primFontSz" for="ch" ptType="node" op="equ" val="65"/>
-              </dgm:constrLst>
-            </dgm:else>
-          </dgm:choose>
-        </dgm:if>
-        <dgm:else name="Name12">
-          <dgm:choose name="Name13">
-            <dgm:if name="Name14" axis="ch" ptType="node" func="cnt" op="equ" val="1">
-              <dgm:constrLst>
-                <dgm:constr type="h" for="ch" forName="cycle" refType="h"/>
-                <dgm:constr type="w" for="ch" forName="cycle" refType="h" refFor="ch" refForName="cycle" fact="0.26"/>
-                <dgm:constr type="r" for="ch" forName="cycle" refType="w"/>
-                <dgm:constr type="ctrY" for="ch" forName="cycle" refType="h" fact="0.5"/>
-                <dgm:constr type="diam" for="ch" forName="cycle" refType="h" fact="1.344"/>
-                <dgm:constr type="h" for="ch" forName="accent_1" refType="h" fact="0.625"/>
-                <dgm:constr type="w" for="ch" forName="accent_1" refType="h" refFor="ch" refForName="accent_1" op="equ"/>
-                <dgm:constr type="ctrY" for="ch" forName="accent_1" refType="h" fact="0.5"/>
-                <dgm:constr type="ctrX" for="ch" forName="accent_1" refType="w"/>
-                <dgm:constr type="ctrXOff" for="ch" forName="accent_1" refType="h" fact="-0.2253"/>
-                <dgm:constr type="r" for="ch" forName="text_1" refType="ctrX" refFor="ch" refForName="accent_1"/>
-                <dgm:constr type="rOff" for="ch" forName="text_1" refType="ctrXOff" refFor="ch" refForName="accent_1"/>
-                <dgm:constr type="l" for="ch" forName="text_1"/>
-                <dgm:constr type="w" for="ch" forName="text_1" refType="h" refFor="ch" refForName="text_1" op="gte"/>
-                <dgm:constr type="h" for="ch" forName="text_1" refType="h" refFor="ch" refForName="accent_1" fact="0.8"/>
-                <dgm:constr type="ctrY" for="ch" forName="text_1" refType="ctrY" refFor="ch" refForName="accent_1"/>
-                <dgm:constr type="rMarg" for="ch" forName="text_1" refType="w" refFor="ch" refForName="accent_1" fact="1.8"/>
-                <dgm:constr type="primFontSz" for="ch" ptType="node" op="equ" val="65"/>
-              </dgm:constrLst>
-            </dgm:if>
-            <dgm:if name="Name15" axis="ch" ptType="node" func="cnt" op="equ" val="2">
-              <dgm:constrLst>
-                <dgm:constr type="h" for="ch" forName="cycle" refType="h"/>
-                <dgm:constr type="w" for="ch" forName="cycle" refType="h" refFor="ch" refForName="cycle" fact="0.26"/>
-                <dgm:constr type="r" for="ch" forName="cycle" refType="w"/>
-                <dgm:constr type="ctrY" for="ch" forName="cycle" refType="h" fact="0.5"/>
-                <dgm:constr type="diam" for="ch" forName="cycle" refType="h" fact="1.344"/>
-                <dgm:constr type="h" for="ch" forName="accent_1" refType="h" fact="0.3571"/>
-                <dgm:constr type="w" for="ch" forName="accent_1" refType="h" refFor="ch" refForName="accent_1" op="equ"/>
-                <dgm:constr type="ctrY" for="ch" forName="accent_1" refType="h" fact="0.2857"/>
-                <dgm:constr type="ctrX" for="ch" forName="accent_1" refType="w"/>
-                <dgm:constr type="ctrXOff" for="ch" forName="accent_1" refType="h" fact="-0.1891"/>
-                <dgm:constr type="r" for="ch" forName="text_1" refType="ctrX" refFor="ch" refForName="accent_1"/>
-                <dgm:constr type="rOff" for="ch" forName="text_1" refType="ctrXOff" refFor="ch" refForName="accent_1"/>
-                <dgm:constr type="l" for="ch" forName="text_1"/>
-                <dgm:constr type="w" for="ch" forName="text_1" refType="h" refFor="ch" refForName="text_1" op="gte"/>
-                <dgm:constr type="h" for="ch" forName="text_1" refType="h" refFor="ch" refForName="accent_1" fact="0.8"/>
-                <dgm:constr type="ctrY" for="ch" forName="text_1" refType="ctrY" refFor="ch" refForName="accent_1"/>
-                <dgm:constr type="rMarg" for="ch" forName="text_1" refType="w" refFor="ch" refForName="accent_1" fact="1.8"/>
-                <dgm:constr type="h" for="ch" forName="accent_2" refType="h" fact="0.3571"/>
-                <dgm:constr type="w" for="ch" forName="accent_2" refType="h" refFor="ch" refForName="accent_2" op="equ"/>
-                <dgm:constr type="ctrY" for="ch" forName="accent_2" refType="h" fact="0.7143"/>
-                <dgm:constr type="ctrX" for="ch" forName="accent_2" refType="w"/>
-                <dgm:constr type="ctrXOff" for="ch" forName="accent_2" refType="h" fact="-0.1891"/>
-                <dgm:constr type="r" for="ch" forName="text_2" refType="ctrX" refFor="ch" refForName="accent_2"/>
-                <dgm:constr type="rOff" for="ch" forName="text_2" refType="ctrXOff" refFor="ch" refForName="accent_2"/>
-                <dgm:constr type="l" for="ch" forName="text_2"/>
-                <dgm:constr type="w" for="ch" forName="text_2" refType="h" refFor="ch" refForName="text_2" op="gte"/>
-                <dgm:constr type="h" for="ch" forName="text_2" refType="h" refFor="ch" refForName="accent_2" fact="0.8"/>
-                <dgm:constr type="ctrY" for="ch" forName="text_2" refType="ctrY" refFor="ch" refForName="accent_2"/>
-                <dgm:constr type="rMarg" for="ch" forName="text_2" refType="w" refFor="ch" refForName="accent_2" fact="1.8"/>
-                <dgm:constr type="primFontSz" for="ch" ptType="node" op="equ" val="65"/>
-              </dgm:constrLst>
-            </dgm:if>
-            <dgm:if name="Name16" axis="ch" ptType="node" func="cnt" op="equ" val="3">
-              <dgm:constrLst>
-                <dgm:constr type="h" for="ch" forName="cycle" refType="h"/>
-                <dgm:constr type="w" for="ch" forName="cycle" refType="h" refFor="ch" refForName="cycle" fact="0.26"/>
-                <dgm:constr type="r" for="ch" forName="cycle" refType="w"/>
-                <dgm:constr type="ctrY" for="ch" forName="cycle" refType="h" fact="0.5"/>
-                <dgm:constr type="diam" for="ch" forName="cycle" refType="h" fact="1.344"/>
-                <dgm:constr type="h" for="ch" forName="accent_1" refType="h" fact="0.25"/>
-                <dgm:constr type="w" for="ch" forName="accent_1" refType="h" refFor="ch" refForName="accent_1" op="equ"/>
-                <dgm:constr type="ctrY" for="ch" forName="accent_1" refType="h" fact="0.2"/>
-                <dgm:constr type="ctrX" for="ch" forName="accent_1" refType="w"/>
-                <dgm:constr type="ctrXOff" for="ch" forName="accent_1" refType="h" fact="-0.1526"/>
-                <dgm:constr type="r" for="ch" forName="text_1" refType="ctrX" refFor="ch" refForName="accent_1"/>
-                <dgm:constr type="rOff" for="ch" forName="text_1" refType="ctrXOff" refFor="ch" refForName="accent_1"/>
-                <dgm:constr type="l" for="ch" forName="text_1"/>
-                <dgm:constr type="w" for="ch" forName="text_1" refType="h" refFor="ch" refForName="text_1" op="gte"/>
-                <dgm:constr type="h" for="ch" forName="text_1" refType="h" refFor="ch" refForName="accent_1" fact="0.8"/>
-                <dgm:constr type="ctrY" for="ch" forName="text_1" refType="ctrY" refFor="ch" refForName="accent_1"/>
-                <dgm:constr type="rMarg" for="ch" forName="text_1" refType="w" refFor="ch" refForName="accent_1" fact="1.8"/>
-                <dgm:constr type="h" for="ch" forName="accent_2" refType="h" fact="0.25"/>
-                <dgm:constr type="w" for="ch" forName="accent_2" refType="h" refFor="ch" refForName="accent_2" op="equ"/>
-                <dgm:constr type="ctrY" for="ch" forName="accent_2" refType="h" fact="0.5"/>
-                <dgm:constr type="ctrX" for="ch" forName="accent_2" refType="w"/>
-                <dgm:constr type="ctrXOff" for="ch" forName="accent_2" refType="h" fact="-0.2253"/>
-                <dgm:constr type="r" for="ch" forName="text_2" refType="ctrX" refFor="ch" refForName="accent_2"/>
-                <dgm:constr type="rOff" for="ch" forName="text_2" refType="ctrXOff" refFor="ch" refForName="accent_2"/>
-                <dgm:constr type="l" for="ch" forName="text_2"/>
-                <dgm:constr type="w" for="ch" forName="text_2" refType="h" refFor="ch" refForName="text_2" op="gte"/>
-                <dgm:constr type="h" for="ch" forName="text_2" refType="h" refFor="ch" refForName="accent_2" fact="0.8"/>
-                <dgm:constr type="ctrY" for="ch" forName="text_2" refType="ctrY" refFor="ch" refForName="accent_2"/>
-                <dgm:constr type="rMarg" for="ch" forName="text_2" refType="w" refFor="ch" refForName="accent_2" fact="1.8"/>
-                <dgm:constr type="h" for="ch" forName="accent_3" refType="h" fact="0.25"/>
-                <dgm:constr type="w" for="ch" forName="accent_3" refType="h" refFor="ch" refForName="accent_3" op="equ"/>
-                <dgm:constr type="ctrY" for="ch" forName="accent_3" refType="h" fact="0.8"/>
-                <dgm:constr type="ctrX" for="ch" forName="accent_3" refType="w"/>
-                <dgm:constr type="ctrXOff" for="ch" forName="accent_3" refType="h" fact="-0.1526"/>
-                <dgm:constr type="r" for="ch" forName="text_3" refType="ctrX" refFor="ch" refForName="accent_3"/>
-                <dgm:constr type="rOff" for="ch" forName="text_3" refType="ctrXOff" refFor="ch" refForName="accent_3"/>
-                <dgm:constr type="l" for="ch" forName="text_3"/>
-                <dgm:constr type="w" for="ch" forName="text_3" refType="h" refFor="ch" refForName="text_3" op="gte"/>
-                <dgm:constr type="h" for="ch" forName="text_3" refType="h" refFor="ch" refForName="accent_3" fact="0.8"/>
-                <dgm:constr type="ctrY" for="ch" forName="text_3" refType="ctrY" refFor="ch" refForName="accent_3"/>
-                <dgm:constr type="rMarg" for="ch" forName="text_3" refType="w" refFor="ch" refForName="accent_3" fact="1.8"/>
-                <dgm:constr type="primFontSz" for="ch" ptType="node" op="equ" val="65"/>
-              </dgm:constrLst>
-            </dgm:if>
-            <dgm:if name="Name17" axis="ch" ptType="node" func="cnt" op="equ" val="4">
-              <dgm:constrLst>
-                <dgm:constr type="h" for="ch" forName="cycle" refType="h"/>
-                <dgm:constr type="w" for="ch" forName="cycle" refType="h" refFor="ch" refForName="cycle" fact="0.26"/>
-                <dgm:constr type="r" for="ch" forName="cycle" refType="w"/>
-                <dgm:constr type="ctrY" for="ch" forName="cycle" refType="h" fact="0.5"/>
-                <dgm:constr type="diam" for="ch" forName="cycle" refType="h" fact="1.344"/>
-                <dgm:constr type="h" for="ch" forName="accent_1" refType="h" fact="0.1923"/>
-                <dgm:constr type="w" for="ch" forName="accent_1" refType="h" refFor="ch" refForName="accent_1" op="equ"/>
-                <dgm:constr type="ctrY" for="ch" forName="accent_1" refType="h" fact="0.1538"/>
-                <dgm:constr type="ctrX" for="ch" forName="accent_1" refType="w"/>
-                <dgm:constr type="ctrXOff" for="ch" forName="accent_1" refType="h" fact="-0.1268"/>
-                <dgm:constr type="r" for="ch" forName="text_1" refType="ctrX" refFor="ch" refForName="accent_1"/>
-                <dgm:constr type="rOff" for="ch" forName="text_1" refType="ctrXOff" refFor="ch" refForName="accent_1"/>
-                <dgm:constr type="l" for="ch" forName="text_1"/>
-                <dgm:constr type="w" for="ch" forName="text_1" refType="h" refFor="ch" refForName="text_1" op="gte"/>
-                <dgm:constr type="h" for="ch" forName="text_1" refType="h" refFor="ch" refForName="accent_1" fact="0.8"/>
-                <dgm:constr type="ctrY" for="ch" forName="text_1" refType="ctrY" refFor="ch" refForName="accent_1"/>
-                <dgm:constr type="rMarg" for="ch" forName="text_1" refType="w" refFor="ch" refForName="accent_1" fact="1.8"/>
-                <dgm:constr type="h" for="ch" forName="accent_2" refType="h" fact="0.1923"/>
-                <dgm:constr type="w" for="ch" forName="accent_2" refType="h" refFor="ch" refForName="accent_2" op="equ"/>
-                <dgm:constr type="ctrY" for="ch" forName="accent_2" refType="h" fact="0.3846"/>
-                <dgm:constr type="ctrX" for="ch" forName="accent_2" refType="w"/>
-                <dgm:constr type="ctrXOff" for="ch" forName="accent_2" refType="h" fact="-0.215"/>
-                <dgm:constr type="r" for="ch" forName="text_2" refType="ctrX" refFor="ch" refForName="accent_2"/>
-                <dgm:constr type="rOff" for="ch" forName="text_2" refType="ctrXOff" refFor="ch" refForName="accent_2"/>
-                <dgm:constr type="l" for="ch" forName="text_2"/>
-                <dgm:constr type="w" for="ch" forName="text_2" refType="h" refFor="ch" refForName="text_2" op="gte"/>
-                <dgm:constr type="h" for="ch" forName="text_2" refType="h" refFor="ch" refForName="accent_2" fact="0.8"/>
-                <dgm:constr type="ctrY" for="ch" forName="text_2" refType="ctrY" refFor="ch" refForName="accent_2"/>
-                <dgm:constr type="rMarg" for="ch" forName="text_2" refType="w" refFor="ch" refForName="accent_2" fact="1.8"/>
-                <dgm:constr type="h" for="ch" forName="accent_3" refType="h" fact="0.1923"/>
-                <dgm:constr type="w" for="ch" forName="accent_3" refType="h" refFor="ch" refForName="accent_3" op="equ"/>
-                <dgm:constr type="ctrY" for="ch" forName="accent_3" refType="h" fact="0.6154"/>
-                <dgm:constr type="ctrX" for="ch" forName="accent_3" refType="w"/>
-                <dgm:constr type="ctrXOff" for="ch" forName="accent_3" refType="h" fact="-0.215"/>
-                <dgm:constr type="r" for="ch" forName="text_3" refType="ctrX" refFor="ch" refForName="accent_3"/>
-                <dgm:constr type="rOff" for="ch" forName="text_3" refType="ctrXOff" refFor="ch" refForName="accent_3"/>
-                <dgm:constr type="l" for="ch" forName="text_3"/>
-                <dgm:constr type="w" for="ch" forName="text_3" refType="h" refFor="ch" refForName="text_3" op="gte"/>
-                <dgm:constr type="h" for="ch" forName="text_3" refType="h" refFor="ch" refForName="accent_3" fact="0.8"/>
-                <dgm:constr type="ctrY" for="ch" forName="text_3" refType="ctrY" refFor="ch" refForName="accent_3"/>
-                <dgm:constr type="rMarg" for="ch" forName="text_3" refType="w" refFor="ch" refForName="accent_3" fact="1.8"/>
-                <dgm:constr type="h" for="ch" forName="accent_4" refType="h" fact="0.1923"/>
-                <dgm:constr type="w" for="ch" forName="accent_4" refType="h" refFor="ch" refForName="accent_4" op="equ"/>
-                <dgm:constr type="ctrY" for="ch" forName="accent_4" refType="h" fact="0.8462"/>
-                <dgm:constr type="ctrX" for="ch" forName="accent_4" refType="w"/>
-                <dgm:constr type="ctrXOff" for="ch" forName="accent_4" refType="h" fact="-0.1268"/>
-                <dgm:constr type="r" for="ch" forName="text_4" refType="ctrX" refFor="ch" refForName="accent_4"/>
-                <dgm:constr type="rOff" for="ch" forName="text_4" refType="ctrXOff" refFor="ch" refForName="accent_4"/>
-                <dgm:constr type="l" for="ch" forName="text_4"/>
-                <dgm:constr type="w" for="ch" forName="text_4" refType="h" refFor="ch" refForName="text_4" op="gte"/>
-                <dgm:constr type="h" for="ch" forName="text_4" refType="h" refFor="ch" refForName="accent_4" fact="0.8"/>
-                <dgm:constr type="ctrY" for="ch" forName="text_4" refType="ctrY" refFor="ch" refForName="accent_4"/>
-                <dgm:constr type="rMarg" for="ch" forName="text_4" refType="w" refFor="ch" refForName="accent_4" fact="1.8"/>
-                <dgm:constr type="primFontSz" for="ch" ptType="node" op="equ" val="65"/>
-              </dgm:constrLst>
-            </dgm:if>
-            <dgm:if name="Name18" axis="ch" ptType="node" func="cnt" op="equ" val="5">
-              <dgm:constrLst>
-                <dgm:constr type="h" for="ch" forName="cycle" refType="h"/>
-                <dgm:constr type="w" for="ch" forName="cycle" refType="h" refFor="ch" refForName="cycle" fact="0.26"/>
-                <dgm:constr type="r" for="ch" forName="cycle" refType="w"/>
-                <dgm:constr type="ctrY" for="ch" forName="cycle" refType="h" fact="0.5"/>
-                <dgm:constr type="diam" for="ch" forName="cycle" refType="h" fact="1.344"/>
-                <dgm:constr type="h" for="ch" forName="accent_1" refType="h" fact="0.1563"/>
-                <dgm:constr type="w" for="ch" forName="accent_1" refType="h" refFor="ch" refForName="accent_1" op="equ"/>
-                <dgm:constr type="ctrY" for="ch" forName="accent_1" refType="h" fact="0.125"/>
-                <dgm:constr type="ctrX" for="ch" forName="accent_1" refType="w"/>
-                <dgm:constr type="ctrXOff" for="ch" forName="accent_1" refType="h" fact="-0.1082"/>
-                <dgm:constr type="r" for="ch" forName="text_1" refType="ctrX" refFor="ch" refForName="accent_1"/>
-                <dgm:constr type="rOff" for="ch" forName="text_1" refType="ctrXOff" refFor="ch" refForName="accent_1"/>
-                <dgm:constr type="l" for="ch" forName="text_1"/>
-                <dgm:constr type="w" for="ch" forName="text_1" refType="h" refFor="ch" refForName="text_1" op="gte"/>
-                <dgm:constr type="h" for="ch" forName="text_1" refType="h" refFor="ch" refForName="accent_1" fact="0.8"/>
-                <dgm:constr type="ctrY" for="ch" forName="text_1" refType="ctrY" refFor="ch" refForName="accent_1"/>
-                <dgm:constr type="rMarg" for="ch" forName="text_1" refType="w" refFor="ch" refForName="accent_1" fact="1.8"/>
-                <dgm:constr type="h" for="ch" forName="accent_2" refType="h" fact="0.1563"/>
-                <dgm:constr type="w" for="ch" forName="accent_2" refType="h" refFor="ch" refForName="accent_2" op="equ"/>
-                <dgm:constr type="ctrY" for="ch" forName="accent_2" refType="h" fact="0.3125"/>
-                <dgm:constr type="ctrX" for="ch" forName="accent_2" refType="w"/>
-                <dgm:constr type="ctrXOff" for="ch" forName="accent_2" refType="h" fact="-0.1978"/>
-                <dgm:constr type="r" for="ch" forName="text_2" refType="ctrX" refFor="ch" refForName="accent_2"/>
-                <dgm:constr type="rOff" for="ch" forName="text_2" refType="ctrXOff" refFor="ch" refForName="accent_2"/>
-                <dgm:constr type="l" for="ch" forName="text_2"/>
-                <dgm:constr type="w" for="ch" forName="text_2" refType="h" refFor="ch" refForName="text_2" op="gte"/>
-                <dgm:constr type="h" for="ch" forName="text_2" refType="h" refFor="ch" refForName="accent_2" fact="0.8"/>
-                <dgm:constr type="ctrY" for="ch" forName="text_2" refType="ctrY" refFor="ch" refForName="accent_2"/>
-                <dgm:constr type="rMarg" for="ch" forName="text_2" refType="w" refFor="ch" refForName="accent_2" fact="1.8"/>
-                <dgm:constr type="h" for="ch" forName="accent_3" refType="h" fact="0.1563"/>
-                <dgm:constr type="w" for="ch" forName="accent_3" refType="h" refFor="ch" refForName="accent_3" op="equ"/>
-                <dgm:constr type="ctrY" for="ch" forName="accent_3" refType="h" fact="0.5"/>
-                <dgm:constr type="ctrX" for="ch" forName="accent_3" refType="w"/>
-                <dgm:constr type="ctrXOff" for="ch" forName="accent_3" refType="h" fact="-0.2253"/>
-                <dgm:constr type="r" for="ch" forName="text_3" refType="ctrX" refFor="ch" refForName="accent_3"/>
-                <dgm:constr type="rOff" for="ch" forName="text_3" refType="ctrXOff" refFor="ch" refForName="accent_3"/>
-                <dgm:constr type="l" for="ch" forName="text_3"/>
-                <dgm:constr type="w" for="ch" forName="text_3" refType="h" refFor="ch" refForName="text_3" op="gte"/>
-                <dgm:constr type="h" for="ch" forName="text_3" refType="h" refFor="ch" refForName="accent_3" fact="0.8"/>
-                <dgm:constr type="ctrY" for="ch" forName="text_3" refType="ctrY" refFor="ch" refForName="accent_3"/>
-                <dgm:constr type="rMarg" for="ch" forName="text_3" refType="w" refFor="ch" refForName="accent_3" fact="1.8"/>
-                <dgm:constr type="h" for="ch" forName="accent_4" refType="h" fact="0.1563"/>
-                <dgm:constr type="w" for="ch" forName="accent_4" refType="h" refFor="ch" refForName="accent_4" op="equ"/>
-                <dgm:constr type="ctrY" for="ch" forName="accent_4" refType="h" fact="0.6875"/>
-                <dgm:constr type="ctrX" for="ch" forName="accent_4" refType="w"/>
-                <dgm:constr type="ctrXOff" for="ch" forName="accent_4" refType="h" fact="-0.1978"/>
-                <dgm:constr type="r" for="ch" forName="text_4" refType="ctrX" refFor="ch" refForName="accent_4"/>
-                <dgm:constr type="rOff" for="ch" forName="text_4" refType="ctrXOff" refFor="ch" refForName="accent_4"/>
-                <dgm:constr type="l" for="ch" forName="text_4"/>
-                <dgm:constr type="w" for="ch" forName="text_4" refType="h" refFor="ch" refForName="text_4" op="gte"/>
-                <dgm:constr type="h" for="ch" forName="text_4" refType="h" refFor="ch" refForName="accent_4" fact="0.8"/>
-                <dgm:constr type="ctrY" for="ch" forName="text_4" refType="ctrY" refFor="ch" refForName="accent_4"/>
-                <dgm:constr type="rMarg" for="ch" forName="text_4" refType="w" refFor="ch" refForName="accent_4" fact="1.8"/>
-                <dgm:constr type="h" for="ch" forName="accent_5" refType="h" fact="0.1563"/>
-                <dgm:constr type="w" for="ch" forName="accent_5" refType="h" refFor="ch" refForName="accent_5" op="equ"/>
-                <dgm:constr type="ctrY" for="ch" forName="accent_5" refType="h" fact="0.875"/>
-                <dgm:constr type="ctrX" for="ch" forName="accent_5" refType="w"/>
-                <dgm:constr type="ctrXOff" for="ch" forName="accent_5" refType="h" fact="-0.1082"/>
-                <dgm:constr type="r" for="ch" forName="text_5" refType="ctrX" refFor="ch" refForName="accent_5"/>
-                <dgm:constr type="rOff" for="ch" forName="text_5" refType="ctrXOff" refFor="ch" refForName="accent_5"/>
-                <dgm:constr type="l" for="ch" forName="text_5"/>
-                <dgm:constr type="w" for="ch" forName="text_5" refType="h" refFor="ch" refForName="text_5" op="gte"/>
-                <dgm:constr type="h" for="ch" forName="text_5" refType="h" refFor="ch" refForName="accent_5" fact="0.8"/>
-                <dgm:constr type="ctrY" for="ch" forName="text_5" refType="ctrY" refFor="ch" refForName="accent_5"/>
-                <dgm:constr type="rMarg" for="ch" forName="text_5" refType="w" refFor="ch" refForName="accent_5" fact="1.8"/>
-                <dgm:constr type="primFontSz" for="ch" ptType="node" op="equ" val="65"/>
-              </dgm:constrLst>
-            </dgm:if>
-            <dgm:if name="Name19" axis="ch" ptType="node" func="cnt" op="equ" val="6">
-              <dgm:constrLst>
-                <dgm:constr type="h" for="ch" forName="cycle" refType="h"/>
-                <dgm:constr type="w" for="ch" forName="cycle" refType="h" refFor="ch" refForName="cycle" fact="0.26"/>
-                <dgm:constr type="r" for="ch" forName="cycle" refType="w"/>
-                <dgm:constr type="ctrY" for="ch" forName="cycle" refType="h" fact="0.5"/>
-                <dgm:constr type="diam" for="ch" forName="cycle" refType="h" fact="1.344"/>
-                <dgm:constr type="h" for="ch" forName="accent_1" refType="h" fact="0.1316"/>
-                <dgm:constr type="w" for="ch" forName="accent_1" refType="h" refFor="ch" refForName="accent_1" op="equ"/>
-                <dgm:constr type="ctrY" for="ch" forName="accent_1" refType="h" fact="0.1053"/>
-                <dgm:constr type="ctrX" for="ch" forName="accent_1" refType="w"/>
-                <dgm:constr type="ctrXOff" for="ch" forName="accent_1" refType="h" fact="-0.0943"/>
-                <dgm:constr type="r" for="ch" forName="text_1" refType="ctrX" refFor="ch" refForName="accent_1"/>
-                <dgm:constr type="rOff" for="ch" forName="text_1" refType="ctrXOff" refFor="ch" refForName="accent_1"/>
-                <dgm:constr type="l" for="ch" forName="text_1"/>
-                <dgm:constr type="w" for="ch" forName="text_1" refType="h" refFor="ch" refForName="text_1" op="gte"/>
-                <dgm:constr type="h" for="ch" forName="text_1" refType="h" refFor="ch" refForName="accent_1" fact="0.8"/>
-                <dgm:constr type="ctrY" for="ch" forName="text_1" refType="ctrY" refFor="ch" refForName="accent_1"/>
-                <dgm:constr type="rMarg" for="ch" forName="text_1" refType="w" refFor="ch" refForName="accent_1" fact="1.8"/>
-                <dgm:constr type="h" for="ch" forName="accent_2" refType="h" fact="0.1316"/>
-                <dgm:constr type="w" for="ch" forName="accent_2" refType="h" refFor="ch" refForName="accent_2" op="equ"/>
-                <dgm:constr type="ctrY" for="ch" forName="accent_2" refType="h" fact="0.2632"/>
-                <dgm:constr type="ctrX" for="ch" forName="accent_2" refType="w"/>
-                <dgm:constr type="ctrXOff" for="ch" forName="accent_2" refType="h" fact="-0.1809"/>
-                <dgm:constr type="r" for="ch" forName="text_2" refType="ctrX" refFor="ch" refForName="accent_2"/>
-                <dgm:constr type="rOff" for="ch" forName="text_2" refType="ctrXOff" refFor="ch" refForName="accent_2"/>
-                <dgm:constr type="l" for="ch" forName="text_2"/>
-                <dgm:constr type="w" for="ch" forName="text_2" refType="h" refFor="ch" refForName="text_2" op="gte"/>
-                <dgm:constr type="h" for="ch" forName="text_2" refType="h" refFor="ch" refForName="accent_2" fact="0.8"/>
-                <dgm:constr type="ctrY" for="ch" forName="text_2" refType="ctrY" refFor="ch" refForName="accent_2"/>
-                <dgm:constr type="rMarg" for="ch" forName="text_2" refType="w" refFor="ch" refForName="accent_2" fact="1.8"/>
-                <dgm:constr type="h" for="ch" forName="accent_3" refType="h" fact="0.1316"/>
-                <dgm:constr type="w" for="ch" forName="accent_3" refType="h" refFor="ch" refForName="accent_3" op="equ"/>
-                <dgm:constr type="ctrY" for="ch" forName="accent_3" refType="h" fact="0.4211"/>
-                <dgm:constr type="ctrX" for="ch" forName="accent_3" refType="w"/>
-                <dgm:constr type="ctrXOff" for="ch" forName="accent_3" refType="h" fact="-0.2205"/>
-                <dgm:constr type="r" for="ch" forName="text_3" refType="ctrX" refFor="ch" refForName="accent_3"/>
-                <dgm:constr type="rOff" for="ch" forName="text_3" refType="ctrXOff" refFor="ch" refForName="accent_3"/>
-                <dgm:constr type="l" for="ch" forName="text_3"/>
-                <dgm:constr type="w" for="ch" forName="text_3" refType="h" refFor="ch" refForName="text_3" op="gte"/>
-                <dgm:constr type="h" for="ch" forName="text_3" refType="h" refFor="ch" refForName="accent_3" fact="0.8"/>
-                <dgm:constr type="ctrY" for="ch" forName="text_3" refType="ctrY" refFor="ch" refForName="accent_3"/>
-                <dgm:constr type="rMarg" for="ch" forName="text_3" refType="w" refFor="ch" refForName="accent_3" fact="1.8"/>
-                <dgm:constr type="h" for="ch" forName="accent_4" refType="h" fact="0.1316"/>
-                <dgm:constr type="w" for="ch" forName="accent_4" refType="h" refFor="ch" refForName="accent_4" op="equ"/>
-                <dgm:constr type="ctrY" for="ch" forName="accent_4" refType="h" fact="0.5789"/>
-                <dgm:constr type="ctrX" for="ch" forName="accent_4" refType="w"/>
-                <dgm:constr type="ctrXOff" for="ch" forName="accent_4" refType="h" fact="-0.2205"/>
-                <dgm:constr type="r" for="ch" forName="text_4" refType="ctrX" refFor="ch" refForName="accent_4"/>
-                <dgm:constr type="rOff" for="ch" forName="text_4" refType="ctrXOff" refFor="ch" refForName="accent_4"/>
-                <dgm:constr type="l" for="ch" forName="text_4"/>
-                <dgm:constr type="w" for="ch" forName="text_4" refType="h" refFor="ch" refForName="text_4" op="gte"/>
-                <dgm:constr type="h" for="ch" forName="text_4" refType="h" refFor="ch" refForName="accent_4" fact="0.8"/>
-                <dgm:constr type="ctrY" for="ch" forName="text_4" refType="ctrY" refFor="ch" refForName="accent_4"/>
-                <dgm:constr type="rMarg" for="ch" forName="text_4" refType="w" refFor="ch" refForName="accent_4" fact="1.8"/>
-                <dgm:constr type="h" for="ch" forName="accent_5" refType="h" fact="0.1316"/>
-                <dgm:constr type="w" for="ch" forName="accent_5" refType="h" refFor="ch" refForName="accent_5" op="equ"/>
-                <dgm:constr type="ctrY" for="ch" forName="accent_5" refType="h" fact="0.7368"/>
-                <dgm:constr type="ctrX" for="ch" forName="accent_5" refType="w"/>
-                <dgm:constr type="ctrXOff" for="ch" forName="accent_5" refType="h" fact="-0.1809"/>
-                <dgm:constr type="r" for="ch" forName="text_5" refType="ctrX" refFor="ch" refForName="accent_5"/>
-                <dgm:constr type="rOff" for="ch" forName="text_5" refType="ctrXOff" refFor="ch" refForName="accent_5"/>
-                <dgm:constr type="l" for="ch" forName="text_5"/>
-                <dgm:constr type="w" for="ch" forName="text_5" refType="h" refFor="ch" refForName="text_5" op="gte"/>
-                <dgm:constr type="h" for="ch" forName="text_5" refType="h" refFor="ch" refForName="accent_5" fact="0.8"/>
-                <dgm:constr type="ctrY" for="ch" forName="text_5" refType="ctrY" refFor="ch" refForName="accent_5"/>
-                <dgm:constr type="rMarg" for="ch" forName="text_5" refType="w" refFor="ch" refForName="accent_5" fact="1.8"/>
-                <dgm:constr type="h" for="ch" forName="accent_6" refType="h" fact="0.1316"/>
-                <dgm:constr type="w" for="ch" forName="accent_6" refType="h" refFor="ch" refForName="accent_6" op="equ"/>
-                <dgm:constr type="ctrY" for="ch" forName="accent_6" refType="h" fact="0.8947"/>
-                <dgm:constr type="ctrX" for="ch" forName="accent_6" refType="w"/>
-                <dgm:constr type="ctrXOff" for="ch" forName="accent_6" refType="h" fact="-0.0943"/>
-                <dgm:constr type="r" for="ch" forName="text_6" refType="ctrX" refFor="ch" refForName="accent_6"/>
-                <dgm:constr type="rOff" for="ch" forName="text_6" refType="ctrXOff" refFor="ch" refForName="accent_6"/>
-                <dgm:constr type="l" for="ch" forName="text_6"/>
-                <dgm:constr type="w" for="ch" forName="text_6" refType="h" refFor="ch" refForName="text_6" op="gte"/>
-                <dgm:constr type="h" for="ch" forName="text_6" refType="h" refFor="ch" refForName="accent_6" fact="0.8"/>
-                <dgm:constr type="ctrY" for="ch" forName="text_6" refType="ctrY" refFor="ch" refForName="accent_6"/>
-                <dgm:constr type="rMarg" for="ch" forName="text_6" refType="w" refFor="ch" refForName="accent_6" fact="1.8"/>
-                <dgm:constr type="primFontSz" for="ch" ptType="node" op="equ" val="65"/>
-              </dgm:constrLst>
-            </dgm:if>
-            <dgm:else name="Name20">
-              <dgm:constrLst>
-                <dgm:constr type="h" for="ch" forName="cycle" refType="h"/>
-                <dgm:constr type="w" for="ch" forName="cycle" refType="h" refFor="ch" refForName="cycle" fact="0.26"/>
-                <dgm:constr type="r" for="ch" forName="cycle" refType="w"/>
-                <dgm:constr type="ctrY" for="ch" forName="cycle" refType="h" fact="0.5"/>
-                <dgm:constr type="diam" for="ch" forName="cycle" refType="h" fact="1.344"/>
-                <dgm:constr type="h" for="ch" forName="accent_1" refType="h" fact="0.1136"/>
-                <dgm:constr type="w" for="ch" forName="accent_1" refType="h" refFor="ch" refForName="accent_1" op="equ"/>
-                <dgm:constr type="ctrY" for="ch" forName="accent_1" refType="h" fact="0.0909"/>
-                <dgm:constr type="ctrX" for="ch" forName="accent_1" refType="w"/>
-                <dgm:constr type="ctrXOff" for="ch" forName="accent_1" refType="h" fact="-0.0835"/>
-                <dgm:constr type="r" for="ch" forName="text_1" refType="ctrX" refFor="ch" refForName="accent_1"/>
-                <dgm:constr type="rOff" for="ch" forName="text_1" refType="ctrXOff" refFor="ch" refForName="accent_1"/>
-                <dgm:constr type="l" for="ch" forName="text_1"/>
-                <dgm:constr type="w" for="ch" forName="text_1" refType="h" refFor="ch" refForName="text_1" op="gte"/>
-                <dgm:constr type="h" for="ch" forName="text_1" refType="h" refFor="ch" refForName="accent_1" fact="0.8"/>
-                <dgm:constr type="ctrY" for="ch" forName="text_1" refType="ctrY" refFor="ch" refForName="accent_1"/>
-                <dgm:constr type="rMarg" for="ch" forName="text_1" refType="w" refFor="ch" refForName="accent_1" fact="1.8"/>
-                <dgm:constr type="h" for="ch" forName="accent_2" refType="h" fact="0.1136"/>
-                <dgm:constr type="w" for="ch" forName="accent_2" refType="h" refFor="ch" refForName="accent_2" op="equ"/>
-                <dgm:constr type="ctrY" for="ch" forName="accent_2" refType="h" fact="0.2273"/>
-                <dgm:constr type="ctrX" for="ch" forName="accent_2" refType="w"/>
-                <dgm:constr type="ctrXOff" for="ch" forName="accent_2" refType="h" fact="-0.1658"/>
-                <dgm:constr type="r" for="ch" forName="text_2" refType="ctrX" refFor="ch" refForName="accent_2"/>
-                <dgm:constr type="rOff" for="ch" forName="text_2" refType="ctrXOff" refFor="ch" refForName="accent_2"/>
-                <dgm:constr type="l" for="ch" forName="text_2"/>
-                <dgm:constr type="w" for="ch" forName="text_2" refType="h" refFor="ch" refForName="text_2" op="gte"/>
-                <dgm:constr type="h" for="ch" forName="text_2" refType="h" refFor="ch" refForName="accent_2" fact="0.8"/>
-                <dgm:constr type="ctrY" for="ch" forName="text_2" refType="ctrY" refFor="ch" refForName="accent_2"/>
-                <dgm:constr type="rMarg" for="ch" forName="text_2" refType="w" refFor="ch" refForName="accent_2" fact="1.8"/>
-                <dgm:constr type="h" for="ch" forName="accent_3" refType="h" fact="0.1136"/>
-                <dgm:constr type="w" for="ch" forName="accent_3" refType="h" refFor="ch" refForName="accent_3" op="equ"/>
-                <dgm:constr type="ctrY" for="ch" forName="accent_3" refType="h" fact="0.3636"/>
-                <dgm:constr type="ctrX" for="ch" forName="accent_3" refType="w"/>
-                <dgm:constr type="ctrXOff" for="ch" forName="accent_3" refType="h" fact="-0.2109"/>
-                <dgm:constr type="r" for="ch" forName="text_3" refType="ctrX" refFor="ch" refForName="accent_3"/>
-                <dgm:constr type="rOff" for="ch" forName="text_3" refType="ctrXOff" refFor="ch" refForName="accent_3"/>
-                <dgm:constr type="l" for="ch" forName="text_3"/>
-                <dgm:constr type="w" for="ch" forName="text_3" refType="h" refFor="ch" refForName="text_3" op="gte"/>
-                <dgm:constr type="h" for="ch" forName="text_3" refType="h" refFor="ch" refForName="accent_3" fact="0.8"/>
-                <dgm:constr type="ctrY" for="ch" forName="text_3" refType="ctrY" refFor="ch" refForName="accent_3"/>
-                <dgm:constr type="rMarg" for="ch" forName="text_3" refType="w" refFor="ch" refForName="accent_3" fact="1.8"/>
-                <dgm:constr type="h" for="ch" forName="accent_4" refType="h" fact="0.1136"/>
-                <dgm:constr type="w" for="ch" forName="accent_4" refType="h" refFor="ch" refForName="accent_4" op="equ"/>
-                <dgm:constr type="ctrY" for="ch" forName="accent_4" refType="h" fact="0.5"/>
-                <dgm:constr type="ctrX" for="ch" forName="accent_4" refType="w"/>
-                <dgm:constr type="ctrXOff" for="ch" forName="accent_4" refType="h" fact="-0.2253"/>
-                <dgm:constr type="r" for="ch" forName="text_4" refType="ctrX" refFor="ch" refForName="accent_4"/>
-                <dgm:constr type="rOff" for="ch" forName="text_4" refType="ctrXOff" refFor="ch" refForName="accent_4"/>
-                <dgm:constr type="l" for="ch" forName="text_4"/>
-                <dgm:constr type="w" for="ch" forName="text_4" refType="h" refFor="ch" refForName="text_4" op="gte"/>
-                <dgm:constr type="h" for="ch" forName="text_4" refType="h" refFor="ch" refForName="accent_4" fact="0.8"/>
-                <dgm:constr type="ctrY" for="ch" forName="text_4" refType="ctrY" refFor="ch" refForName="accent_4"/>
-                <dgm:constr type="rMarg" for="ch" forName="text_4" refType="w" refFor="ch" refForName="accent_4" fact="1.8"/>
-                <dgm:constr type="h" for="ch" forName="accent_5" refType="h" fact="0.1136"/>
-                <dgm:constr type="w" for="ch" forName="accent_5" refType="h" refFor="ch" refForName="accent_5" op="equ"/>
-                <dgm:constr type="ctrY" for="ch" forName="accent_5" refType="h" fact="0.6364"/>
-                <dgm:constr type="ctrX" for="ch" forName="accent_5" refType="w"/>
-                <dgm:constr type="ctrXOff" for="ch" forName="accent_5" refType="h" fact="-0.2109"/>
-                <dgm:constr type="r" for="ch" forName="text_5" refType="ctrX" refFor="ch" refForName="accent_5"/>
-                <dgm:constr type="rOff" for="ch" forName="text_5" refType="ctrXOff" refFor="ch" refForName="accent_5"/>
-                <dgm:constr type="l" for="ch" forName="text_5"/>
-                <dgm:constr type="w" for="ch" forName="text_5" refType="h" refFor="ch" refForName="text_5" op="gte"/>
-                <dgm:constr type="h" for="ch" forName="text_5" refType="h" refFor="ch" refForName="accent_5" fact="0.8"/>
-                <dgm:constr type="ctrY" for="ch" forName="text_5" refType="ctrY" refFor="ch" refForName="accent_5"/>
-                <dgm:constr type="rMarg" for="ch" forName="text_5" refType="w" refFor="ch" refForName="accent_5" fact="1.8"/>
-                <dgm:constr type="h" for="ch" forName="accent_6" refType="h" fact="0.1136"/>
-                <dgm:constr type="w" for="ch" forName="accent_6" refType="h" refFor="ch" refForName="accent_6" op="equ"/>
-                <dgm:constr type="ctrY" for="ch" forName="accent_6" refType="h" fact="0.7727"/>
-                <dgm:constr type="ctrX" for="ch" forName="accent_6" refType="w"/>
-                <dgm:constr type="ctrXOff" for="ch" forName="accent_6" refType="h" fact="-0.1658"/>
-                <dgm:constr type="r" for="ch" forName="text_6" refType="ctrX" refFor="ch" refForName="accent_6"/>
-                <dgm:constr type="rOff" for="ch" forName="text_6" refType="ctrXOff" refFor="ch" refForName="accent_6"/>
-                <dgm:constr type="l" for="ch" forName="text_6"/>
-                <dgm:constr type="w" for="ch" forName="text_6" refType="h" refFor="ch" refForName="text_6" op="gte"/>
-                <dgm:constr type="h" for="ch" forName="text_6" refType="h" refFor="ch" refForName="accent_6" fact="0.8"/>
-                <dgm:constr type="ctrY" for="ch" forName="text_6" refType="ctrY" refFor="ch" refForName="accent_6"/>
-                <dgm:constr type="rMarg" for="ch" forName="text_6" refType="w" refFor="ch" refForName="accent_6" fact="1.8"/>
-                <dgm:constr type="h" for="ch" forName="accent_7" refType="h" fact="0.1136"/>
-                <dgm:constr type="w" for="ch" forName="accent_7" refType="h" refFor="ch" refForName="accent_7" op="equ"/>
-                <dgm:constr type="ctrY" for="ch" forName="accent_7" refType="h" fact="0.9091"/>
-                <dgm:constr type="ctrX" for="ch" forName="accent_7" refType="w"/>
-                <dgm:constr type="ctrXOff" for="ch" forName="accent_7" refType="h" fact="-0.0835"/>
-                <dgm:constr type="r" for="ch" forName="text_7" refType="ctrX" refFor="ch" refForName="accent_7"/>
-                <dgm:constr type="rOff" for="ch" forName="text_7" refType="ctrXOff" refFor="ch" refForName="accent_7"/>
-                <dgm:constr type="l" for="ch" forName="text_7"/>
-                <dgm:constr type="w" for="ch" forName="text_7" refType="h" refFor="ch" refForName="text_7" op="gte"/>
-                <dgm:constr type="h" for="ch" forName="text_7" refType="h" refFor="ch" refForName="accent_7" fact="0.8"/>
-                <dgm:constr type="ctrY" for="ch" forName="text_7" refType="ctrY" refFor="ch" refForName="accent_7"/>
-                <dgm:constr type="rMarg" for="ch" forName="text_7" refType="w" refFor="ch" refForName="accent_7" fact="1.8"/>
-                <dgm:constr type="primFontSz" for="ch" ptType="node" op="equ" val="65"/>
-              </dgm:constrLst>
-            </dgm:else>
-          </dgm:choose>
-        </dgm:else>
-      </dgm:choose>
-      <dgm:layoutNode name="cycle">
-        <dgm:choose name="Name21">
-          <dgm:if name="Name22" func="var" arg="dir" op="equ" val="norm">
-            <dgm:alg type="cycle">
-              <dgm:param type="stAng" val="45"/>
-              <dgm:param type="spanAng" val="90"/>
-            </dgm:alg>
-          </dgm:if>
-          <dgm:else name="Name23">
-            <dgm:alg type="cycle">
-              <dgm:param type="stAng" val="225"/>
-              <dgm:param type="spanAng" val="90"/>
-            </dgm:alg>
-          </dgm:else>
-        </dgm:choose>
-        <dgm:shape xmlns:r="http://schemas.openxmlformats.org/officeDocument/2006/relationships" r:blip="">
-          <dgm:adjLst/>
-        </dgm:shape>
-        <dgm:presOf/>
-        <dgm:constrLst>
-          <dgm:constr type="w" for="ch" val="1"/>
-          <dgm:constr type="h" for="ch" val="1"/>
-          <dgm:constr type="diam" for="ch" forName="conn" refType="diam"/>
-        </dgm:constrLst>
-        <dgm:layoutNode name="srcNode">
-          <dgm:alg type="sp"/>
-          <dgm:shape xmlns:r="http://schemas.openxmlformats.org/officeDocument/2006/relationships" type="rect" r:blip="" hideGeom="1">
-            <dgm:adjLst/>
-          </dgm:shape>
-          <dgm:presOf/>
-        </dgm:layoutNode>
-        <dgm:layoutNode name="conn" styleLbl="parChTrans1D2">
-          <dgm:alg type="conn">
-            <dgm:param type="connRout" val="curve"/>
-            <dgm:param type="srcNode" val="srcNode"/>
-            <dgm:param type="dstNode" val="dstNode"/>
-            <dgm:param type="begPts" val="ctr"/>
-            <dgm:param type="endPts" val="ctr"/>
-            <dgm:param type="endSty" val="noArr"/>
-          </dgm:alg>
-          <dgm:shape xmlns:r="http://schemas.openxmlformats.org/officeDocument/2006/relationships" type="conn" r:blip="">
-            <dgm:adjLst/>
-          </dgm:shape>
-          <dgm:presOf axis="desOrSelf" ptType="sibTrans" hideLastTrans="0" st="0" cnt="1"/>
-          <dgm:constrLst>
-            <dgm:constr type="begPad"/>
-            <dgm:constr type="endPad"/>
-          </dgm:constrLst>
-        </dgm:layoutNode>
-        <dgm:layoutNode name="extraNode">
-          <dgm:alg type="sp"/>
-          <dgm:shape xmlns:r="http://schemas.openxmlformats.org/officeDocument/2006/relationships" type="rect" r:blip="" hideGeom="1">
-            <dgm:adjLst/>
-          </dgm:shape>
-          <dgm:presOf/>
-        </dgm:layoutNode>
-        <dgm:layoutNode name="dstNode">
-          <dgm:alg type="sp"/>
-          <dgm:shape xmlns:r="http://schemas.openxmlformats.org/officeDocument/2006/relationships" type="rect" r:blip="" hideGeom="1">
-            <dgm:adjLst/>
-          </dgm:shape>
-          <dgm:presOf/>
-        </dgm:layoutNode>
-      </dgm:layoutNode>
-      <dgm:forEach name="wrapper" axis="self" ptType="parTrans">
-        <dgm:forEach name="wrapper2" axis="self" ptType="sibTrans" st="2">
-          <dgm:forEach name="accentRepeat" axis="self">
-            <dgm:layoutNode name="accentRepeatNode" styleLbl="solidFgAcc1">
-              <dgm:alg type="sp"/>
-              <dgm:shape xmlns:r="http://schemas.openxmlformats.org/officeDocument/2006/relationships" type="ellipse" r:blip="">
-                <dgm:adjLst/>
-              </dgm:shape>
-              <dgm:presOf/>
-            </dgm:layoutNode>
-          </dgm:forEach>
-        </dgm:forEach>
-      </dgm:forEach>
-      <dgm:forEach name="Name24" axis="ch" ptType="node" cnt="1">
-        <dgm:layoutNode name="text_1" styleLbl="node1">
-          <dgm:varLst>
-            <dgm:bulletEnabled val="1"/>
-          </dgm:varLst>
-          <dgm:choose name="Name25">
-            <dgm:if name="Name26" func="var" arg="dir" op="equ" val="norm">
-              <dgm:alg type="tx">
-                <dgm:param type="parTxLTRAlign" val="l"/>
-                <dgm:param type="shpTxLTRAlignCh" val="l"/>
-                <dgm:param type="parTxRTLAlign" val="l"/>
-                <dgm:param type="shpTxRTLAlignCh" val="l"/>
-              </dgm:alg>
-            </dgm:if>
-            <dgm:else name="Name27">
-              <dgm:alg type="tx">
-                <dgm:param type="parTxLTRAlign" val="r"/>
-                <dgm:param type="shpTxLTRAlignCh" val="r"/>
-                <dgm:param type="parTxRTLAlign" val="r"/>
-                <dgm:param type="shpTxRTLAlignCh" val="r"/>
-              </dgm:alg>
-            </dgm:else>
-          </dgm:choose>
-          <dgm:shape xmlns:r="http://schemas.openxmlformats.org/officeDocument/2006/relationships" type="rect" r:blip="">
-            <dgm:adjLst/>
-          </dgm:shape>
-          <dgm:presOf axis="desOrSelf" ptType="node"/>
-          <dgm:constrLst>
-            <dgm:constr type="primFontSz" val="65"/>
-            <dgm:constr type="lMarg" refType="primFontSz" fact="0.2"/>
-            <dgm:constr type="rMarg" refType="primFontSz" fact="0.2"/>
-            <dgm:constr type="tMarg" refType="primFontSz" fact="0.2"/>
-            <dgm:constr type="bMarg" refType="primFontSz" fact="0.2"/>
-          </dgm:constrLst>
-          <dgm:ruleLst>
-            <dgm:rule type="primFontSz" val="5" fact="NaN" max="NaN"/>
-          </dgm:ruleLst>
-        </dgm:layoutNode>
-        <dgm:layoutNode name="accent_1">
-          <dgm:alg type="sp"/>
-          <dgm:shape xmlns:r="http://schemas.openxmlformats.org/officeDocument/2006/relationships" r:blip="">
-            <dgm:adjLst/>
-          </dgm:shape>
-          <dgm:presOf/>
-          <dgm:constrLst/>
-          <dgm:forEach name="Name28" ref="accentRepeat"/>
-        </dgm:layoutNode>
-      </dgm:forEach>
-      <dgm:forEach name="Name29" axis="ch" ptType="node" st="2" cnt="1">
-        <dgm:layoutNode name="text_2" styleLbl="node1">
-          <dgm:varLst>
-            <dgm:bulletEnabled val="1"/>
-          </dgm:varLst>
-          <dgm:choose name="Name30">
-            <dgm:if name="Name31" func="var" arg="dir" op="equ" val="norm">
-              <dgm:alg type="tx">
-                <dgm:param type="parTxLTRAlign" val="l"/>
-                <dgm:param type="shpTxLTRAlignCh" val="l"/>
-                <dgm:param type="parTxRTLAlign" val="l"/>
-                <dgm:param type="shpTxRTLAlignCh" val="l"/>
-              </dgm:alg>
-            </dgm:if>
-            <dgm:else name="Name32">
-              <dgm:alg type="tx">
-                <dgm:param type="parTxLTRAlign" val="r"/>
-                <dgm:param type="shpTxLTRAlignCh" val="r"/>
-                <dgm:param type="parTxRTLAlign" val="r"/>
-                <dgm:param type="shpTxRTLAlignCh" val="r"/>
-              </dgm:alg>
-            </dgm:else>
-          </dgm:choose>
-          <dgm:shape xmlns:r="http://schemas.openxmlformats.org/officeDocument/2006/relationships" type="rect" r:blip="">
-            <dgm:adjLst/>
-          </dgm:shape>
-          <dgm:presOf axis="desOrSelf" ptType="node"/>
-          <dgm:constrLst>
-            <dgm:constr type="primFontSz" val="65"/>
-            <dgm:constr type="lMarg" refType="primFontSz" fact="0.2"/>
-            <dgm:constr type="rMarg" refType="primFontSz" fact="0.2"/>
-            <dgm:constr type="tMarg" refType="primFontSz" fact="0.2"/>
-            <dgm:constr type="bMarg" refType="primFontSz" fact="0.2"/>
-          </dgm:constrLst>
-          <dgm:ruleLst>
-            <dgm:rule type="primFontSz" val="5" fact="NaN" max="NaN"/>
-          </dgm:ruleLst>
-        </dgm:layoutNode>
-        <dgm:layoutNode name="accent_2">
-          <dgm:alg type="sp"/>
-          <dgm:shape xmlns:r="http://schemas.openxmlformats.org/officeDocument/2006/relationships" r:blip="">
-            <dgm:adjLst/>
-          </dgm:shape>
-          <dgm:presOf/>
-          <dgm:constrLst/>
-          <dgm:forEach name="Name33" ref="accentRepeat"/>
-        </dgm:layoutNode>
-      </dgm:forEach>
-      <dgm:forEach name="Name34" axis="ch" ptType="node" st="3" cnt="1">
-        <dgm:layoutNode name="text_3" styleLbl="node1">
-          <dgm:varLst>
-            <dgm:bulletEnabled val="1"/>
-          </dgm:varLst>
-          <dgm:choose name="Name35">
-            <dgm:if name="Name36" func="var" arg="dir" op="equ" val="norm">
-              <dgm:alg type="tx">
-                <dgm:param type="parTxLTRAlign" val="l"/>
-                <dgm:param type="shpTxLTRAlignCh" val="l"/>
-                <dgm:param type="parTxRTLAlign" val="l"/>
-                <dgm:param type="shpTxRTLAlignCh" val="l"/>
-              </dgm:alg>
-            </dgm:if>
-            <dgm:else name="Name37">
-              <dgm:alg type="tx">
-                <dgm:param type="parTxLTRAlign" val="r"/>
-                <dgm:param type="shpTxLTRAlignCh" val="r"/>
-                <dgm:param type="parTxRTLAlign" val="r"/>
-                <dgm:param type="shpTxRTLAlignCh" val="r"/>
-              </dgm:alg>
-            </dgm:else>
-          </dgm:choose>
-          <dgm:shape xmlns:r="http://schemas.openxmlformats.org/officeDocument/2006/relationships" type="rect" r:blip="">
-            <dgm:adjLst/>
-          </dgm:shape>
-          <dgm:presOf axis="desOrSelf" ptType="node"/>
-          <dgm:constrLst>
-            <dgm:constr type="primFontSz" val="65"/>
-            <dgm:constr type="lMarg" refType="primFontSz" fact="0.2"/>
-            <dgm:constr type="rMarg" refType="primFontSz" fact="0.2"/>
-            <dgm:constr type="tMarg" refType="primFontSz" fact="0.2"/>
-            <dgm:constr type="bMarg" refType="primFontSz" fact="0.2"/>
-          </dgm:constrLst>
-          <dgm:ruleLst>
-            <dgm:rule type="primFontSz" val="5" fact="NaN" max="NaN"/>
-          </dgm:ruleLst>
-        </dgm:layoutNode>
-        <dgm:layoutNode name="accent_3">
-          <dgm:alg type="sp"/>
-          <dgm:shape xmlns:r="http://schemas.openxmlformats.org/officeDocument/2006/relationships" r:blip="">
-            <dgm:adjLst/>
-          </dgm:shape>
-          <dgm:presOf/>
-          <dgm:constrLst/>
-          <dgm:forEach name="Name38" ref="accentRepeat"/>
-        </dgm:layoutNode>
-      </dgm:forEach>
-      <dgm:forEach name="Name39" axis="ch" ptType="node" st="4" cnt="1">
-        <dgm:layoutNode name="text_4" styleLbl="node1">
-          <dgm:varLst>
-            <dgm:bulletEnabled val="1"/>
-          </dgm:varLst>
-          <dgm:choose name="Name40">
-            <dgm:if name="Name41" func="var" arg="dir" op="equ" val="norm">
-              <dgm:alg type="tx">
-                <dgm:param type="parTxLTRAlign" val="l"/>
-                <dgm:param type="shpTxLTRAlignCh" val="l"/>
-                <dgm:param type="parTxRTLAlign" val="l"/>
-                <dgm:param type="shpTxRTLAlignCh" val="l"/>
-              </dgm:alg>
-            </dgm:if>
-            <dgm:else name="Name42">
-              <dgm:alg type="tx">
-                <dgm:param type="parTxLTRAlign" val="r"/>
-                <dgm:param type="shpTxLTRAlignCh" val="r"/>
-                <dgm:param type="parTxRTLAlign" val="r"/>
-                <dgm:param type="shpTxRTLAlignCh" val="r"/>
-              </dgm:alg>
-            </dgm:else>
-          </dgm:choose>
-          <dgm:shape xmlns:r="http://schemas.openxmlformats.org/officeDocument/2006/relationships" type="rect" r:blip="">
-            <dgm:adjLst/>
-          </dgm:shape>
-          <dgm:presOf axis="desOrSelf" ptType="node"/>
-          <dgm:constrLst>
-            <dgm:constr type="primFontSz" val="65"/>
-            <dgm:constr type="lMarg" refType="primFontSz" fact="0.2"/>
-            <dgm:constr type="rMarg" refType="primFontSz" fact="0.2"/>
-            <dgm:constr type="tMarg" refType="primFontSz" fact="0.2"/>
-            <dgm:constr type="bMarg" refType="primFontSz" fact="0.2"/>
-          </dgm:constrLst>
-          <dgm:ruleLst>
-            <dgm:rule type="primFontSz" val="5" fact="NaN" max="NaN"/>
-          </dgm:ruleLst>
-        </dgm:layoutNode>
-        <dgm:layoutNode name="accent_4">
-          <dgm:alg type="sp"/>
-          <dgm:shape xmlns:r="http://schemas.openxmlformats.org/officeDocument/2006/relationships" r:blip="">
-            <dgm:adjLst/>
-          </dgm:shape>
-          <dgm:presOf/>
-          <dgm:constrLst/>
-          <dgm:forEach name="Name43" ref="accentRepeat"/>
-        </dgm:layoutNode>
-      </dgm:forEach>
-      <dgm:forEach name="Name44" axis="ch" ptType="node" st="5" cnt="1">
-        <dgm:layoutNode name="text_5" styleLbl="node1">
-          <dgm:varLst>
-            <dgm:bulletEnabled val="1"/>
-          </dgm:varLst>
-          <dgm:choose name="Name45">
-            <dgm:if name="Name46" func="var" arg="dir" op="equ" val="norm">
-              <dgm:alg type="tx">
-                <dgm:param type="parTxLTRAlign" val="l"/>
-                <dgm:param type="shpTxLTRAlignCh" val="l"/>
-                <dgm:param type="parTxRTLAlign" val="l"/>
-                <dgm:param type="shpTxRTLAlignCh" val="l"/>
-              </dgm:alg>
-            </dgm:if>
-            <dgm:else name="Name47">
-              <dgm:alg type="tx">
-                <dgm:param type="parTxLTRAlign" val="r"/>
-                <dgm:param type="shpTxLTRAlignCh" val="r"/>
-                <dgm:param type="parTxRTLAlign" val="r"/>
-                <dgm:param type="shpTxRTLAlignCh" val="r"/>
-              </dgm:alg>
-            </dgm:else>
-          </dgm:choose>
-          <dgm:shape xmlns:r="http://schemas.openxmlformats.org/officeDocument/2006/relationships" type="rect" r:blip="">
-            <dgm:adjLst/>
-          </dgm:shape>
-          <dgm:presOf axis="desOrSelf" ptType="node"/>
-          <dgm:constrLst>
-            <dgm:constr type="primFontSz" val="65"/>
-            <dgm:constr type="lMarg" refType="primFontSz" fact="0.2"/>
-            <dgm:constr type="rMarg" refType="primFontSz" fact="0.2"/>
-            <dgm:constr type="tMarg" refType="primFontSz" fact="0.2"/>
-            <dgm:constr type="bMarg" refType="primFontSz" fact="0.2"/>
-          </dgm:constrLst>
-          <dgm:ruleLst>
-            <dgm:rule type="primFontSz" val="5" fact="NaN" max="NaN"/>
-          </dgm:ruleLst>
-        </dgm:layoutNode>
-        <dgm:layoutNode name="accent_5">
-          <dgm:alg type="sp"/>
-          <dgm:shape xmlns:r="http://schemas.openxmlformats.org/officeDocument/2006/relationships" r:blip="">
-            <dgm:adjLst/>
-          </dgm:shape>
-          <dgm:presOf/>
-          <dgm:constrLst/>
-          <dgm:forEach name="Name48" ref="accentRepeat"/>
-        </dgm:layoutNode>
-      </dgm:forEach>
-      <dgm:forEach name="Name49" axis="ch" ptType="node" st="6" cnt="1">
-        <dgm:layoutNode name="text_6" styleLbl="node1">
-          <dgm:varLst>
-            <dgm:bulletEnabled val="1"/>
-          </dgm:varLst>
-          <dgm:choose name="Name50">
-            <dgm:if name="Name51" func="var" arg="dir" op="equ" val="norm">
-              <dgm:alg type="tx">
-                <dgm:param type="parTxLTRAlign" val="l"/>
-                <dgm:param type="shpTxLTRAlignCh" val="l"/>
-                <dgm:param type="parTxRTLAlign" val="l"/>
-                <dgm:param type="shpTxRTLAlignCh" val="l"/>
-              </dgm:alg>
-            </dgm:if>
-            <dgm:else name="Name52">
-              <dgm:alg type="tx">
-                <dgm:param type="parTxLTRAlign" val="r"/>
-                <dgm:param type="shpTxLTRAlignCh" val="r"/>
-                <dgm:param type="parTxRTLAlign" val="r"/>
-                <dgm:param type="shpTxRTLAlignCh" val="r"/>
-              </dgm:alg>
-            </dgm:else>
-          </dgm:choose>
-          <dgm:shape xmlns:r="http://schemas.openxmlformats.org/officeDocument/2006/relationships" type="rect" r:blip="">
-            <dgm:adjLst/>
-          </dgm:shape>
-          <dgm:presOf axis="desOrSelf" ptType="node"/>
-          <dgm:constrLst>
-            <dgm:constr type="primFontSz" val="65"/>
-            <dgm:constr type="lMarg" refType="primFontSz" fact="0.2"/>
-            <dgm:constr type="rMarg" refType="primFontSz" fact="0.2"/>
-            <dgm:constr type="tMarg" refType="primFontSz" fact="0.2"/>
-            <dgm:constr type="bMarg" refType="primFontSz" fact="0.2"/>
-          </dgm:constrLst>
-          <dgm:ruleLst>
-            <dgm:rule type="primFontSz" val="5" fact="NaN" max="NaN"/>
-          </dgm:ruleLst>
-        </dgm:layoutNode>
-        <dgm:layoutNode name="accent_6">
-          <dgm:alg type="sp"/>
-          <dgm:shape xmlns:r="http://schemas.openxmlformats.org/officeDocument/2006/relationships" r:blip="">
-            <dgm:adjLst/>
-          </dgm:shape>
-          <dgm:presOf/>
-          <dgm:constrLst/>
-          <dgm:forEach name="Name53" ref="accentRepeat"/>
-        </dgm:layoutNode>
-      </dgm:forEach>
-      <dgm:forEach name="Name54" axis="ch" ptType="node" st="7" cnt="1">
-        <dgm:layoutNode name="text_7" styleLbl="node1">
-          <dgm:varLst>
-            <dgm:bulletEnabled val="1"/>
-          </dgm:varLst>
-          <dgm:choose name="Name55">
-            <dgm:if name="Name56" func="var" arg="dir" op="equ" val="norm">
-              <dgm:alg type="tx">
-                <dgm:param type="parTxLTRAlign" val="l"/>
-                <dgm:param type="shpTxLTRAlignCh" val="l"/>
-                <dgm:param type="parTxRTLAlign" val="l"/>
-                <dgm:param type="shpTxRTLAlignCh" val="l"/>
-              </dgm:alg>
-            </dgm:if>
-            <dgm:else name="Name57">
-              <dgm:alg type="tx">
-                <dgm:param type="parTxLTRAlign" val="r"/>
-                <dgm:param type="shpTxLTRAlignCh" val="r"/>
-                <dgm:param type="parTxRTLAlign" val="r"/>
-                <dgm:param type="shpTxRTLAlignCh" val="r"/>
-              </dgm:alg>
-            </dgm:else>
-          </dgm:choose>
-          <dgm:shape xmlns:r="http://schemas.openxmlformats.org/officeDocument/2006/relationships" type="rect" r:blip="">
-            <dgm:adjLst/>
-          </dgm:shape>
-          <dgm:presOf axis="desOrSelf" ptType="node"/>
-          <dgm:constrLst>
-            <dgm:constr type="primFontSz" val="65"/>
-            <dgm:constr type="lMarg" refType="primFontSz" fact="0.2"/>
-            <dgm:constr type="rMarg" refType="primFontSz" fact="0.2"/>
-            <dgm:constr type="tMarg" refType="primFontSz" fact="0.2"/>
-            <dgm:constr type="bMarg" refType="primFontSz" fact="0.2"/>
-          </dgm:constrLst>
-          <dgm:ruleLst>
-            <dgm:rule type="primFontSz" val="5" fact="NaN" max="NaN"/>
-          </dgm:ruleLst>
-        </dgm:layoutNode>
-        <dgm:layoutNode name="accent_7">
-          <dgm:alg type="sp"/>
-          <dgm:shape xmlns:r="http://schemas.openxmlformats.org/officeDocument/2006/relationships" r:blip="">
-            <dgm:adjLst/>
-          </dgm:shape>
-          <dgm:presOf/>
-          <dgm:constrLst/>
-          <dgm:forEach name="Name58" ref="accentRepeat"/>
-        </dgm:layoutNode>
-      </dgm:forEach>
-    </dgm:layoutNode>
-  </dgm:layoutNode>
-</dgm:layoutDef>
-</file>
-
-<file path=ppt/diagrams/layout2.xml><?xml version="1.0" encoding="utf-8"?>
 <dgm:layoutDef xmlns:dgm="http://schemas.openxmlformats.org/drawingml/2006/diagram" xmlns:a="http://schemas.openxmlformats.org/drawingml/2006/main" uniqueId="urn:microsoft.com/office/officeart/2008/layout/VerticalCurvedList">
   <dgm:title val=""/>
   <dgm:desc val=""/>
@@ -6591,1040 +3875,6 @@
 </dgm:styleDef>
 </file>
 
-<file path=ppt/diagrams/quickStyle2.xml><?xml version="1.0" encoding="utf-8"?>
-<dgm:styleDef xmlns:dgm="http://schemas.openxmlformats.org/drawingml/2006/diagram" xmlns:a="http://schemas.openxmlformats.org/drawingml/2006/main" uniqueId="urn:microsoft.com/office/officeart/2005/8/quickstyle/simple1">
-  <dgm:title val=""/>
-  <dgm:desc val=""/>
-  <dgm:catLst>
-    <dgm:cat type="simple" pri="10100"/>
-  </dgm:catLst>
-  <dgm:scene3d>
-    <a:camera prst="orthographicFront"/>
-    <a:lightRig rig="threePt" dir="t"/>
-  </dgm:scene3d>
-  <dgm:styleLbl name="node0">
-    <dgm:scene3d>
-      <a:camera prst="orthographicFront"/>
-      <a:lightRig rig="threePt" dir="t"/>
-    </dgm:scene3d>
-    <dgm:sp3d/>
-    <dgm:txPr/>
-    <dgm:style>
-      <a:lnRef idx="2">
-        <a:scrgbClr r="0" g="0" b="0"/>
-      </a:lnRef>
-      <a:fillRef idx="1">
-        <a:scrgbClr r="0" g="0" b="0"/>
-      </a:fillRef>
-      <a:effectRef idx="0">
-        <a:scrgbClr r="0" g="0" b="0"/>
-      </a:effectRef>
-      <a:fontRef idx="minor">
-        <a:schemeClr val="lt1"/>
-      </a:fontRef>
-    </dgm:style>
-  </dgm:styleLbl>
-  <dgm:styleLbl name="lnNode1">
-    <dgm:scene3d>
-      <a:camera prst="orthographicFront"/>
-      <a:lightRig rig="threePt" dir="t"/>
-    </dgm:scene3d>
-    <dgm:sp3d/>
-    <dgm:txPr/>
-    <dgm:style>
-      <a:lnRef idx="2">
-        <a:scrgbClr r="0" g="0" b="0"/>
-      </a:lnRef>
-      <a:fillRef idx="1">
-        <a:scrgbClr r="0" g="0" b="0"/>
-      </a:fillRef>
-      <a:effectRef idx="0">
-        <a:scrgbClr r="0" g="0" b="0"/>
-      </a:effectRef>
-      <a:fontRef idx="minor">
-        <a:schemeClr val="lt1"/>
-      </a:fontRef>
-    </dgm:style>
-  </dgm:styleLbl>
-  <dgm:styleLbl name="vennNode1">
-    <dgm:scene3d>
-      <a:camera prst="orthographicFront"/>
-      <a:lightRig rig="threePt" dir="t"/>
-    </dgm:scene3d>
-    <dgm:sp3d/>
-    <dgm:txPr/>
-    <dgm:style>
-      <a:lnRef idx="2">
-        <a:scrgbClr r="0" g="0" b="0"/>
-      </a:lnRef>
-      <a:fillRef idx="1">
-        <a:scrgbClr r="0" g="0" b="0"/>
-      </a:fillRef>
-      <a:effectRef idx="0">
-        <a:scrgbClr r="0" g="0" b="0"/>
-      </a:effectRef>
-      <a:fontRef idx="minor">
-        <a:schemeClr val="tx1"/>
-      </a:fontRef>
-    </dgm:style>
-  </dgm:styleLbl>
-  <dgm:styleLbl name="alignNode1">
-    <dgm:scene3d>
-      <a:camera prst="orthographicFront"/>
-      <a:lightRig rig="threePt" dir="t"/>
-    </dgm:scene3d>
-    <dgm:sp3d/>
-    <dgm:txPr/>
-    <dgm:style>
-      <a:lnRef idx="2">
-        <a:scrgbClr r="0" g="0" b="0"/>
-      </a:lnRef>
-      <a:fillRef idx="1">
-        <a:scrgbClr r="0" g="0" b="0"/>
-      </a:fillRef>
-      <a:effectRef idx="0">
-        <a:scrgbClr r="0" g="0" b="0"/>
-      </a:effectRef>
-      <a:fontRef idx="minor">
-        <a:schemeClr val="lt1"/>
-      </a:fontRef>
-    </dgm:style>
-  </dgm:styleLbl>
-  <dgm:styleLbl name="node1">
-    <dgm:scene3d>
-      <a:camera prst="orthographicFront"/>
-      <a:lightRig rig="threePt" dir="t"/>
-    </dgm:scene3d>
-    <dgm:sp3d/>
-    <dgm:txPr/>
-    <dgm:style>
-      <a:lnRef idx="2">
-        <a:scrgbClr r="0" g="0" b="0"/>
-      </a:lnRef>
-      <a:fillRef idx="1">
-        <a:scrgbClr r="0" g="0" b="0"/>
-      </a:fillRef>
-      <a:effectRef idx="0">
-        <a:scrgbClr r="0" g="0" b="0"/>
-      </a:effectRef>
-      <a:fontRef idx="minor">
-        <a:schemeClr val="lt1"/>
-      </a:fontRef>
-    </dgm:style>
-  </dgm:styleLbl>
-  <dgm:styleLbl name="node2">
-    <dgm:scene3d>
-      <a:camera prst="orthographicFront"/>
-      <a:lightRig rig="threePt" dir="t"/>
-    </dgm:scene3d>
-    <dgm:sp3d/>
-    <dgm:txPr/>
-    <dgm:style>
-      <a:lnRef idx="2">
-        <a:scrgbClr r="0" g="0" b="0"/>
-      </a:lnRef>
-      <a:fillRef idx="1">
-        <a:scrgbClr r="0" g="0" b="0"/>
-      </a:fillRef>
-      <a:effectRef idx="0">
-        <a:scrgbClr r="0" g="0" b="0"/>
-      </a:effectRef>
-      <a:fontRef idx="minor">
-        <a:schemeClr val="lt1"/>
-      </a:fontRef>
-    </dgm:style>
-  </dgm:styleLbl>
-  <dgm:styleLbl name="node3">
-    <dgm:scene3d>
-      <a:camera prst="orthographicFront"/>
-      <a:lightRig rig="threePt" dir="t"/>
-    </dgm:scene3d>
-    <dgm:sp3d/>
-    <dgm:txPr/>
-    <dgm:style>
-      <a:lnRef idx="2">
-        <a:scrgbClr r="0" g="0" b="0"/>
-      </a:lnRef>
-      <a:fillRef idx="1">
-        <a:scrgbClr r="0" g="0" b="0"/>
-      </a:fillRef>
-      <a:effectRef idx="0">
-        <a:scrgbClr r="0" g="0" b="0"/>
-      </a:effectRef>
-      <a:fontRef idx="minor">
-        <a:schemeClr val="lt1"/>
-      </a:fontRef>
-    </dgm:style>
-  </dgm:styleLbl>
-  <dgm:styleLbl name="node4">
-    <dgm:scene3d>
-      <a:camera prst="orthographicFront"/>
-      <a:lightRig rig="threePt" dir="t"/>
-    </dgm:scene3d>
-    <dgm:sp3d/>
-    <dgm:txPr/>
-    <dgm:style>
-      <a:lnRef idx="2">
-        <a:scrgbClr r="0" g="0" b="0"/>
-      </a:lnRef>
-      <a:fillRef idx="1">
-        <a:scrgbClr r="0" g="0" b="0"/>
-      </a:fillRef>
-      <a:effectRef idx="0">
-        <a:scrgbClr r="0" g="0" b="0"/>
-      </a:effectRef>
-      <a:fontRef idx="minor">
-        <a:schemeClr val="lt1"/>
-      </a:fontRef>
-    </dgm:style>
-  </dgm:styleLbl>
-  <dgm:styleLbl name="fgImgPlace1">
-    <dgm:scene3d>
-      <a:camera prst="orthographicFront"/>
-      <a:lightRig rig="threePt" dir="t"/>
-    </dgm:scene3d>
-    <dgm:sp3d/>
-    <dgm:txPr/>
-    <dgm:style>
-      <a:lnRef idx="2">
-        <a:scrgbClr r="0" g="0" b="0"/>
-      </a:lnRef>
-      <a:fillRef idx="1">
-        <a:scrgbClr r="0" g="0" b="0"/>
-      </a:fillRef>
-      <a:effectRef idx="0">
-        <a:scrgbClr r="0" g="0" b="0"/>
-      </a:effectRef>
-      <a:fontRef idx="minor"/>
-    </dgm:style>
-  </dgm:styleLbl>
-  <dgm:styleLbl name="alignImgPlace1">
-    <dgm:scene3d>
-      <a:camera prst="orthographicFront"/>
-      <a:lightRig rig="threePt" dir="t"/>
-    </dgm:scene3d>
-    <dgm:sp3d/>
-    <dgm:txPr/>
-    <dgm:style>
-      <a:lnRef idx="2">
-        <a:scrgbClr r="0" g="0" b="0"/>
-      </a:lnRef>
-      <a:fillRef idx="1">
-        <a:scrgbClr r="0" g="0" b="0"/>
-      </a:fillRef>
-      <a:effectRef idx="0">
-        <a:scrgbClr r="0" g="0" b="0"/>
-      </a:effectRef>
-      <a:fontRef idx="minor"/>
-    </dgm:style>
-  </dgm:styleLbl>
-  <dgm:styleLbl name="bgImgPlace1">
-    <dgm:scene3d>
-      <a:camera prst="orthographicFront"/>
-      <a:lightRig rig="threePt" dir="t"/>
-    </dgm:scene3d>
-    <dgm:sp3d/>
-    <dgm:txPr/>
-    <dgm:style>
-      <a:lnRef idx="2">
-        <a:scrgbClr r="0" g="0" b="0"/>
-      </a:lnRef>
-      <a:fillRef idx="1">
-        <a:scrgbClr r="0" g="0" b="0"/>
-      </a:fillRef>
-      <a:effectRef idx="0">
-        <a:scrgbClr r="0" g="0" b="0"/>
-      </a:effectRef>
-      <a:fontRef idx="minor"/>
-    </dgm:style>
-  </dgm:styleLbl>
-  <dgm:styleLbl name="sibTrans2D1">
-    <dgm:scene3d>
-      <a:camera prst="orthographicFront"/>
-      <a:lightRig rig="threePt" dir="t"/>
-    </dgm:scene3d>
-    <dgm:sp3d/>
-    <dgm:txPr/>
-    <dgm:style>
-      <a:lnRef idx="0">
-        <a:scrgbClr r="0" g="0" b="0"/>
-      </a:lnRef>
-      <a:fillRef idx="1">
-        <a:scrgbClr r="0" g="0" b="0"/>
-      </a:fillRef>
-      <a:effectRef idx="0">
-        <a:scrgbClr r="0" g="0" b="0"/>
-      </a:effectRef>
-      <a:fontRef idx="minor">
-        <a:schemeClr val="lt1"/>
-      </a:fontRef>
-    </dgm:style>
-  </dgm:styleLbl>
-  <dgm:styleLbl name="fgSibTrans2D1">
-    <dgm:scene3d>
-      <a:camera prst="orthographicFront"/>
-      <a:lightRig rig="threePt" dir="t"/>
-    </dgm:scene3d>
-    <dgm:sp3d/>
-    <dgm:txPr/>
-    <dgm:style>
-      <a:lnRef idx="0">
-        <a:scrgbClr r="0" g="0" b="0"/>
-      </a:lnRef>
-      <a:fillRef idx="1">
-        <a:scrgbClr r="0" g="0" b="0"/>
-      </a:fillRef>
-      <a:effectRef idx="0">
-        <a:scrgbClr r="0" g="0" b="0"/>
-      </a:effectRef>
-      <a:fontRef idx="minor">
-        <a:schemeClr val="lt1"/>
-      </a:fontRef>
-    </dgm:style>
-  </dgm:styleLbl>
-  <dgm:styleLbl name="bgSibTrans2D1">
-    <dgm:scene3d>
-      <a:camera prst="orthographicFront"/>
-      <a:lightRig rig="threePt" dir="t"/>
-    </dgm:scene3d>
-    <dgm:sp3d/>
-    <dgm:txPr/>
-    <dgm:style>
-      <a:lnRef idx="0">
-        <a:scrgbClr r="0" g="0" b="0"/>
-      </a:lnRef>
-      <a:fillRef idx="1">
-        <a:scrgbClr r="0" g="0" b="0"/>
-      </a:fillRef>
-      <a:effectRef idx="0">
-        <a:scrgbClr r="0" g="0" b="0"/>
-      </a:effectRef>
-      <a:fontRef idx="minor">
-        <a:schemeClr val="lt1"/>
-      </a:fontRef>
-    </dgm:style>
-  </dgm:styleLbl>
-  <dgm:styleLbl name="sibTrans1D1">
-    <dgm:scene3d>
-      <a:camera prst="orthographicFront"/>
-      <a:lightRig rig="threePt" dir="t"/>
-    </dgm:scene3d>
-    <dgm:sp3d/>
-    <dgm:txPr/>
-    <dgm:style>
-      <a:lnRef idx="1">
-        <a:scrgbClr r="0" g="0" b="0"/>
-      </a:lnRef>
-      <a:fillRef idx="0">
-        <a:scrgbClr r="0" g="0" b="0"/>
-      </a:fillRef>
-      <a:effectRef idx="0">
-        <a:scrgbClr r="0" g="0" b="0"/>
-      </a:effectRef>
-      <a:fontRef idx="minor"/>
-    </dgm:style>
-  </dgm:styleLbl>
-  <dgm:styleLbl name="callout">
-    <dgm:scene3d>
-      <a:camera prst="orthographicFront"/>
-      <a:lightRig rig="threePt" dir="t"/>
-    </dgm:scene3d>
-    <dgm:sp3d/>
-    <dgm:txPr/>
-    <dgm:style>
-      <a:lnRef idx="2">
-        <a:scrgbClr r="0" g="0" b="0"/>
-      </a:lnRef>
-      <a:fillRef idx="1">
-        <a:scrgbClr r="0" g="0" b="0"/>
-      </a:fillRef>
-      <a:effectRef idx="0">
-        <a:scrgbClr r="0" g="0" b="0"/>
-      </a:effectRef>
-      <a:fontRef idx="minor"/>
-    </dgm:style>
-  </dgm:styleLbl>
-  <dgm:styleLbl name="asst0">
-    <dgm:scene3d>
-      <a:camera prst="orthographicFront"/>
-      <a:lightRig rig="threePt" dir="t"/>
-    </dgm:scene3d>
-    <dgm:sp3d/>
-    <dgm:txPr/>
-    <dgm:style>
-      <a:lnRef idx="2">
-        <a:scrgbClr r="0" g="0" b="0"/>
-      </a:lnRef>
-      <a:fillRef idx="1">
-        <a:scrgbClr r="0" g="0" b="0"/>
-      </a:fillRef>
-      <a:effectRef idx="0">
-        <a:scrgbClr r="0" g="0" b="0"/>
-      </a:effectRef>
-      <a:fontRef idx="minor">
-        <a:schemeClr val="lt1"/>
-      </a:fontRef>
-    </dgm:style>
-  </dgm:styleLbl>
-  <dgm:styleLbl name="asst1">
-    <dgm:scene3d>
-      <a:camera prst="orthographicFront"/>
-      <a:lightRig rig="threePt" dir="t"/>
-    </dgm:scene3d>
-    <dgm:sp3d/>
-    <dgm:txPr/>
-    <dgm:style>
-      <a:lnRef idx="2">
-        <a:scrgbClr r="0" g="0" b="0"/>
-      </a:lnRef>
-      <a:fillRef idx="1">
-        <a:scrgbClr r="0" g="0" b="0"/>
-      </a:fillRef>
-      <a:effectRef idx="0">
-        <a:scrgbClr r="0" g="0" b="0"/>
-      </a:effectRef>
-      <a:fontRef idx="minor">
-        <a:schemeClr val="lt1"/>
-      </a:fontRef>
-    </dgm:style>
-  </dgm:styleLbl>
-  <dgm:styleLbl name="asst2">
-    <dgm:scene3d>
-      <a:camera prst="orthographicFront"/>
-      <a:lightRig rig="threePt" dir="t"/>
-    </dgm:scene3d>
-    <dgm:sp3d/>
-    <dgm:txPr/>
-    <dgm:style>
-      <a:lnRef idx="2">
-        <a:scrgbClr r="0" g="0" b="0"/>
-      </a:lnRef>
-      <a:fillRef idx="1">
-        <a:scrgbClr r="0" g="0" b="0"/>
-      </a:fillRef>
-      <a:effectRef idx="0">
-        <a:scrgbClr r="0" g="0" b="0"/>
-      </a:effectRef>
-      <a:fontRef idx="minor">
-        <a:schemeClr val="lt1"/>
-      </a:fontRef>
-    </dgm:style>
-  </dgm:styleLbl>
-  <dgm:styleLbl name="asst3">
-    <dgm:scene3d>
-      <a:camera prst="orthographicFront"/>
-      <a:lightRig rig="threePt" dir="t"/>
-    </dgm:scene3d>
-    <dgm:sp3d/>
-    <dgm:txPr/>
-    <dgm:style>
-      <a:lnRef idx="2">
-        <a:scrgbClr r="0" g="0" b="0"/>
-      </a:lnRef>
-      <a:fillRef idx="1">
-        <a:scrgbClr r="0" g="0" b="0"/>
-      </a:fillRef>
-      <a:effectRef idx="0">
-        <a:scrgbClr r="0" g="0" b="0"/>
-      </a:effectRef>
-      <a:fontRef idx="minor">
-        <a:schemeClr val="lt1"/>
-      </a:fontRef>
-    </dgm:style>
-  </dgm:styleLbl>
-  <dgm:styleLbl name="asst4">
-    <dgm:scene3d>
-      <a:camera prst="orthographicFront"/>
-      <a:lightRig rig="threePt" dir="t"/>
-    </dgm:scene3d>
-    <dgm:sp3d/>
-    <dgm:txPr/>
-    <dgm:style>
-      <a:lnRef idx="2">
-        <a:scrgbClr r="0" g="0" b="0"/>
-      </a:lnRef>
-      <a:fillRef idx="1">
-        <a:scrgbClr r="0" g="0" b="0"/>
-      </a:fillRef>
-      <a:effectRef idx="0">
-        <a:scrgbClr r="0" g="0" b="0"/>
-      </a:effectRef>
-      <a:fontRef idx="minor">
-        <a:schemeClr val="lt1"/>
-      </a:fontRef>
-    </dgm:style>
-  </dgm:styleLbl>
-  <dgm:styleLbl name="parChTrans2D1">
-    <dgm:scene3d>
-      <a:camera prst="orthographicFront"/>
-      <a:lightRig rig="threePt" dir="t"/>
-    </dgm:scene3d>
-    <dgm:sp3d/>
-    <dgm:txPr/>
-    <dgm:style>
-      <a:lnRef idx="2">
-        <a:scrgbClr r="0" g="0" b="0"/>
-      </a:lnRef>
-      <a:fillRef idx="1">
-        <a:scrgbClr r="0" g="0" b="0"/>
-      </a:fillRef>
-      <a:effectRef idx="0">
-        <a:scrgbClr r="0" g="0" b="0"/>
-      </a:effectRef>
-      <a:fontRef idx="minor">
-        <a:schemeClr val="lt1"/>
-      </a:fontRef>
-    </dgm:style>
-  </dgm:styleLbl>
-  <dgm:styleLbl name="parChTrans2D2">
-    <dgm:scene3d>
-      <a:camera prst="orthographicFront"/>
-      <a:lightRig rig="threePt" dir="t"/>
-    </dgm:scene3d>
-    <dgm:sp3d/>
-    <dgm:txPr/>
-    <dgm:style>
-      <a:lnRef idx="2">
-        <a:scrgbClr r="0" g="0" b="0"/>
-      </a:lnRef>
-      <a:fillRef idx="1">
-        <a:scrgbClr r="0" g="0" b="0"/>
-      </a:fillRef>
-      <a:effectRef idx="0">
-        <a:scrgbClr r="0" g="0" b="0"/>
-      </a:effectRef>
-      <a:fontRef idx="minor">
-        <a:schemeClr val="lt1"/>
-      </a:fontRef>
-    </dgm:style>
-  </dgm:styleLbl>
-  <dgm:styleLbl name="parChTrans2D3">
-    <dgm:scene3d>
-      <a:camera prst="orthographicFront"/>
-      <a:lightRig rig="threePt" dir="t"/>
-    </dgm:scene3d>
-    <dgm:sp3d/>
-    <dgm:txPr/>
-    <dgm:style>
-      <a:lnRef idx="2">
-        <a:scrgbClr r="0" g="0" b="0"/>
-      </a:lnRef>
-      <a:fillRef idx="1">
-        <a:scrgbClr r="0" g="0" b="0"/>
-      </a:fillRef>
-      <a:effectRef idx="0">
-        <a:scrgbClr r="0" g="0" b="0"/>
-      </a:effectRef>
-      <a:fontRef idx="minor">
-        <a:schemeClr val="lt1"/>
-      </a:fontRef>
-    </dgm:style>
-  </dgm:styleLbl>
-  <dgm:styleLbl name="parChTrans2D4">
-    <dgm:scene3d>
-      <a:camera prst="orthographicFront"/>
-      <a:lightRig rig="threePt" dir="t"/>
-    </dgm:scene3d>
-    <dgm:sp3d/>
-    <dgm:txPr/>
-    <dgm:style>
-      <a:lnRef idx="2">
-        <a:scrgbClr r="0" g="0" b="0"/>
-      </a:lnRef>
-      <a:fillRef idx="1">
-        <a:scrgbClr r="0" g="0" b="0"/>
-      </a:fillRef>
-      <a:effectRef idx="0">
-        <a:scrgbClr r="0" g="0" b="0"/>
-      </a:effectRef>
-      <a:fontRef idx="minor">
-        <a:schemeClr val="lt1"/>
-      </a:fontRef>
-    </dgm:style>
-  </dgm:styleLbl>
-  <dgm:styleLbl name="parChTrans1D1">
-    <dgm:scene3d>
-      <a:camera prst="orthographicFront"/>
-      <a:lightRig rig="threePt" dir="t"/>
-    </dgm:scene3d>
-    <dgm:sp3d/>
-    <dgm:txPr/>
-    <dgm:style>
-      <a:lnRef idx="2">
-        <a:scrgbClr r="0" g="0" b="0"/>
-      </a:lnRef>
-      <a:fillRef idx="0">
-        <a:scrgbClr r="0" g="0" b="0"/>
-      </a:fillRef>
-      <a:effectRef idx="0">
-        <a:scrgbClr r="0" g="0" b="0"/>
-      </a:effectRef>
-      <a:fontRef idx="minor"/>
-    </dgm:style>
-  </dgm:styleLbl>
-  <dgm:styleLbl name="parChTrans1D2">
-    <dgm:scene3d>
-      <a:camera prst="orthographicFront"/>
-      <a:lightRig rig="threePt" dir="t"/>
-    </dgm:scene3d>
-    <dgm:sp3d/>
-    <dgm:txPr/>
-    <dgm:style>
-      <a:lnRef idx="2">
-        <a:scrgbClr r="0" g="0" b="0"/>
-      </a:lnRef>
-      <a:fillRef idx="0">
-        <a:scrgbClr r="0" g="0" b="0"/>
-      </a:fillRef>
-      <a:effectRef idx="0">
-        <a:scrgbClr r="0" g="0" b="0"/>
-      </a:effectRef>
-      <a:fontRef idx="minor"/>
-    </dgm:style>
-  </dgm:styleLbl>
-  <dgm:styleLbl name="parChTrans1D3">
-    <dgm:scene3d>
-      <a:camera prst="orthographicFront"/>
-      <a:lightRig rig="threePt" dir="t"/>
-    </dgm:scene3d>
-    <dgm:sp3d/>
-    <dgm:txPr/>
-    <dgm:style>
-      <a:lnRef idx="2">
-        <a:scrgbClr r="0" g="0" b="0"/>
-      </a:lnRef>
-      <a:fillRef idx="0">
-        <a:scrgbClr r="0" g="0" b="0"/>
-      </a:fillRef>
-      <a:effectRef idx="0">
-        <a:scrgbClr r="0" g="0" b="0"/>
-      </a:effectRef>
-      <a:fontRef idx="minor"/>
-    </dgm:style>
-  </dgm:styleLbl>
-  <dgm:styleLbl name="parChTrans1D4">
-    <dgm:scene3d>
-      <a:camera prst="orthographicFront"/>
-      <a:lightRig rig="threePt" dir="t"/>
-    </dgm:scene3d>
-    <dgm:sp3d/>
-    <dgm:txPr/>
-    <dgm:style>
-      <a:lnRef idx="2">
-        <a:scrgbClr r="0" g="0" b="0"/>
-      </a:lnRef>
-      <a:fillRef idx="0">
-        <a:scrgbClr r="0" g="0" b="0"/>
-      </a:fillRef>
-      <a:effectRef idx="0">
-        <a:scrgbClr r="0" g="0" b="0"/>
-      </a:effectRef>
-      <a:fontRef idx="minor"/>
-    </dgm:style>
-  </dgm:styleLbl>
-  <dgm:styleLbl name="fgAcc1">
-    <dgm:scene3d>
-      <a:camera prst="orthographicFront"/>
-      <a:lightRig rig="threePt" dir="t"/>
-    </dgm:scene3d>
-    <dgm:sp3d/>
-    <dgm:txPr/>
-    <dgm:style>
-      <a:lnRef idx="2">
-        <a:scrgbClr r="0" g="0" b="0"/>
-      </a:lnRef>
-      <a:fillRef idx="1">
-        <a:scrgbClr r="0" g="0" b="0"/>
-      </a:fillRef>
-      <a:effectRef idx="0">
-        <a:scrgbClr r="0" g="0" b="0"/>
-      </a:effectRef>
-      <a:fontRef idx="minor"/>
-    </dgm:style>
-  </dgm:styleLbl>
-  <dgm:styleLbl name="conFgAcc1">
-    <dgm:scene3d>
-      <a:camera prst="orthographicFront"/>
-      <a:lightRig rig="threePt" dir="t"/>
-    </dgm:scene3d>
-    <dgm:sp3d/>
-    <dgm:txPr/>
-    <dgm:style>
-      <a:lnRef idx="2">
-        <a:scrgbClr r="0" g="0" b="0"/>
-      </a:lnRef>
-      <a:fillRef idx="1">
-        <a:scrgbClr r="0" g="0" b="0"/>
-      </a:fillRef>
-      <a:effectRef idx="0">
-        <a:scrgbClr r="0" g="0" b="0"/>
-      </a:effectRef>
-      <a:fontRef idx="minor"/>
-    </dgm:style>
-  </dgm:styleLbl>
-  <dgm:styleLbl name="alignAcc1">
-    <dgm:scene3d>
-      <a:camera prst="orthographicFront"/>
-      <a:lightRig rig="threePt" dir="t"/>
-    </dgm:scene3d>
-    <dgm:sp3d/>
-    <dgm:txPr/>
-    <dgm:style>
-      <a:lnRef idx="2">
-        <a:scrgbClr r="0" g="0" b="0"/>
-      </a:lnRef>
-      <a:fillRef idx="1">
-        <a:scrgbClr r="0" g="0" b="0"/>
-      </a:fillRef>
-      <a:effectRef idx="0">
-        <a:scrgbClr r="0" g="0" b="0"/>
-      </a:effectRef>
-      <a:fontRef idx="minor"/>
-    </dgm:style>
-  </dgm:styleLbl>
-  <dgm:styleLbl name="trAlignAcc1">
-    <dgm:scene3d>
-      <a:camera prst="orthographicFront"/>
-      <a:lightRig rig="threePt" dir="t"/>
-    </dgm:scene3d>
-    <dgm:sp3d/>
-    <dgm:txPr/>
-    <dgm:style>
-      <a:lnRef idx="1">
-        <a:scrgbClr r="0" g="0" b="0"/>
-      </a:lnRef>
-      <a:fillRef idx="1">
-        <a:scrgbClr r="0" g="0" b="0"/>
-      </a:fillRef>
-      <a:effectRef idx="0">
-        <a:scrgbClr r="0" g="0" b="0"/>
-      </a:effectRef>
-      <a:fontRef idx="minor"/>
-    </dgm:style>
-  </dgm:styleLbl>
-  <dgm:styleLbl name="bgAcc1">
-    <dgm:scene3d>
-      <a:camera prst="orthographicFront"/>
-      <a:lightRig rig="threePt" dir="t"/>
-    </dgm:scene3d>
-    <dgm:sp3d/>
-    <dgm:txPr/>
-    <dgm:style>
-      <a:lnRef idx="2">
-        <a:scrgbClr r="0" g="0" b="0"/>
-      </a:lnRef>
-      <a:fillRef idx="1">
-        <a:scrgbClr r="0" g="0" b="0"/>
-      </a:fillRef>
-      <a:effectRef idx="0">
-        <a:scrgbClr r="0" g="0" b="0"/>
-      </a:effectRef>
-      <a:fontRef idx="minor"/>
-    </dgm:style>
-  </dgm:styleLbl>
-  <dgm:styleLbl name="solidFgAcc1">
-    <dgm:scene3d>
-      <a:camera prst="orthographicFront"/>
-      <a:lightRig rig="threePt" dir="t"/>
-    </dgm:scene3d>
-    <dgm:sp3d/>
-    <dgm:txPr/>
-    <dgm:style>
-      <a:lnRef idx="2">
-        <a:scrgbClr r="0" g="0" b="0"/>
-      </a:lnRef>
-      <a:fillRef idx="1">
-        <a:scrgbClr r="0" g="0" b="0"/>
-      </a:fillRef>
-      <a:effectRef idx="0">
-        <a:scrgbClr r="0" g="0" b="0"/>
-      </a:effectRef>
-      <a:fontRef idx="minor"/>
-    </dgm:style>
-  </dgm:styleLbl>
-  <dgm:styleLbl name="solidAlignAcc1">
-    <dgm:scene3d>
-      <a:camera prst="orthographicFront"/>
-      <a:lightRig rig="threePt" dir="t"/>
-    </dgm:scene3d>
-    <dgm:sp3d/>
-    <dgm:txPr/>
-    <dgm:style>
-      <a:lnRef idx="2">
-        <a:scrgbClr r="0" g="0" b="0"/>
-      </a:lnRef>
-      <a:fillRef idx="1">
-        <a:scrgbClr r="0" g="0" b="0"/>
-      </a:fillRef>
-      <a:effectRef idx="0">
-        <a:scrgbClr r="0" g="0" b="0"/>
-      </a:effectRef>
-      <a:fontRef idx="minor"/>
-    </dgm:style>
-  </dgm:styleLbl>
-  <dgm:styleLbl name="solidBgAcc1">
-    <dgm:scene3d>
-      <a:camera prst="orthographicFront"/>
-      <a:lightRig rig="threePt" dir="t"/>
-    </dgm:scene3d>
-    <dgm:sp3d/>
-    <dgm:txPr/>
-    <dgm:style>
-      <a:lnRef idx="2">
-        <a:scrgbClr r="0" g="0" b="0"/>
-      </a:lnRef>
-      <a:fillRef idx="1">
-        <a:scrgbClr r="0" g="0" b="0"/>
-      </a:fillRef>
-      <a:effectRef idx="0">
-        <a:scrgbClr r="0" g="0" b="0"/>
-      </a:effectRef>
-      <a:fontRef idx="minor"/>
-    </dgm:style>
-  </dgm:styleLbl>
-  <dgm:styleLbl name="fgAccFollowNode1">
-    <dgm:scene3d>
-      <a:camera prst="orthographicFront"/>
-      <a:lightRig rig="threePt" dir="t"/>
-    </dgm:scene3d>
-    <dgm:sp3d/>
-    <dgm:txPr/>
-    <dgm:style>
-      <a:lnRef idx="2">
-        <a:scrgbClr r="0" g="0" b="0"/>
-      </a:lnRef>
-      <a:fillRef idx="1">
-        <a:scrgbClr r="0" g="0" b="0"/>
-      </a:fillRef>
-      <a:effectRef idx="0">
-        <a:scrgbClr r="0" g="0" b="0"/>
-      </a:effectRef>
-      <a:fontRef idx="minor"/>
-    </dgm:style>
-  </dgm:styleLbl>
-  <dgm:styleLbl name="alignAccFollowNode1">
-    <dgm:scene3d>
-      <a:camera prst="orthographicFront"/>
-      <a:lightRig rig="threePt" dir="t"/>
-    </dgm:scene3d>
-    <dgm:sp3d/>
-    <dgm:txPr/>
-    <dgm:style>
-      <a:lnRef idx="2">
-        <a:scrgbClr r="0" g="0" b="0"/>
-      </a:lnRef>
-      <a:fillRef idx="1">
-        <a:scrgbClr r="0" g="0" b="0"/>
-      </a:fillRef>
-      <a:effectRef idx="0">
-        <a:scrgbClr r="0" g="0" b="0"/>
-      </a:effectRef>
-      <a:fontRef idx="minor"/>
-    </dgm:style>
-  </dgm:styleLbl>
-  <dgm:styleLbl name="bgAccFollowNode1">
-    <dgm:scene3d>
-      <a:camera prst="orthographicFront"/>
-      <a:lightRig rig="threePt" dir="t"/>
-    </dgm:scene3d>
-    <dgm:sp3d/>
-    <dgm:txPr/>
-    <dgm:style>
-      <a:lnRef idx="2">
-        <a:scrgbClr r="0" g="0" b="0"/>
-      </a:lnRef>
-      <a:fillRef idx="1">
-        <a:scrgbClr r="0" g="0" b="0"/>
-      </a:fillRef>
-      <a:effectRef idx="0">
-        <a:scrgbClr r="0" g="0" b="0"/>
-      </a:effectRef>
-      <a:fontRef idx="minor"/>
-    </dgm:style>
-  </dgm:styleLbl>
-  <dgm:styleLbl name="fgAcc0">
-    <dgm:scene3d>
-      <a:camera prst="orthographicFront"/>
-      <a:lightRig rig="threePt" dir="t"/>
-    </dgm:scene3d>
-    <dgm:sp3d/>
-    <dgm:txPr/>
-    <dgm:style>
-      <a:lnRef idx="2">
-        <a:scrgbClr r="0" g="0" b="0"/>
-      </a:lnRef>
-      <a:fillRef idx="1">
-        <a:scrgbClr r="0" g="0" b="0"/>
-      </a:fillRef>
-      <a:effectRef idx="0">
-        <a:scrgbClr r="0" g="0" b="0"/>
-      </a:effectRef>
-      <a:fontRef idx="minor"/>
-    </dgm:style>
-  </dgm:styleLbl>
-  <dgm:styleLbl name="fgAcc2">
-    <dgm:scene3d>
-      <a:camera prst="orthographicFront"/>
-      <a:lightRig rig="threePt" dir="t"/>
-    </dgm:scene3d>
-    <dgm:sp3d/>
-    <dgm:txPr/>
-    <dgm:style>
-      <a:lnRef idx="2">
-        <a:scrgbClr r="0" g="0" b="0"/>
-      </a:lnRef>
-      <a:fillRef idx="1">
-        <a:scrgbClr r="0" g="0" b="0"/>
-      </a:fillRef>
-      <a:effectRef idx="0">
-        <a:scrgbClr r="0" g="0" b="0"/>
-      </a:effectRef>
-      <a:fontRef idx="minor"/>
-    </dgm:style>
-  </dgm:styleLbl>
-  <dgm:styleLbl name="fgAcc3">
-    <dgm:scene3d>
-      <a:camera prst="orthographicFront"/>
-      <a:lightRig rig="threePt" dir="t"/>
-    </dgm:scene3d>
-    <dgm:sp3d/>
-    <dgm:txPr/>
-    <dgm:style>
-      <a:lnRef idx="2">
-        <a:scrgbClr r="0" g="0" b="0"/>
-      </a:lnRef>
-      <a:fillRef idx="1">
-        <a:scrgbClr r="0" g="0" b="0"/>
-      </a:fillRef>
-      <a:effectRef idx="0">
-        <a:scrgbClr r="0" g="0" b="0"/>
-      </a:effectRef>
-      <a:fontRef idx="minor"/>
-    </dgm:style>
-  </dgm:styleLbl>
-  <dgm:styleLbl name="fgAcc4">
-    <dgm:scene3d>
-      <a:camera prst="orthographicFront"/>
-      <a:lightRig rig="threePt" dir="t"/>
-    </dgm:scene3d>
-    <dgm:sp3d/>
-    <dgm:txPr/>
-    <dgm:style>
-      <a:lnRef idx="2">
-        <a:scrgbClr r="0" g="0" b="0"/>
-      </a:lnRef>
-      <a:fillRef idx="1">
-        <a:scrgbClr r="0" g="0" b="0"/>
-      </a:fillRef>
-      <a:effectRef idx="0">
-        <a:scrgbClr r="0" g="0" b="0"/>
-      </a:effectRef>
-      <a:fontRef idx="minor"/>
-    </dgm:style>
-  </dgm:styleLbl>
-  <dgm:styleLbl name="bgShp">
-    <dgm:scene3d>
-      <a:camera prst="orthographicFront"/>
-      <a:lightRig rig="threePt" dir="t"/>
-    </dgm:scene3d>
-    <dgm:sp3d/>
-    <dgm:txPr/>
-    <dgm:style>
-      <a:lnRef idx="0">
-        <a:scrgbClr r="0" g="0" b="0"/>
-      </a:lnRef>
-      <a:fillRef idx="1">
-        <a:scrgbClr r="0" g="0" b="0"/>
-      </a:fillRef>
-      <a:effectRef idx="0">
-        <a:scrgbClr r="0" g="0" b="0"/>
-      </a:effectRef>
-      <a:fontRef idx="minor"/>
-    </dgm:style>
-  </dgm:styleLbl>
-  <dgm:styleLbl name="dkBgShp">
-    <dgm:scene3d>
-      <a:camera prst="orthographicFront"/>
-      <a:lightRig rig="threePt" dir="t"/>
-    </dgm:scene3d>
-    <dgm:sp3d/>
-    <dgm:txPr/>
-    <dgm:style>
-      <a:lnRef idx="0">
-        <a:scrgbClr r="0" g="0" b="0"/>
-      </a:lnRef>
-      <a:fillRef idx="1">
-        <a:scrgbClr r="0" g="0" b="0"/>
-      </a:fillRef>
-      <a:effectRef idx="0">
-        <a:scrgbClr r="0" g="0" b="0"/>
-      </a:effectRef>
-      <a:fontRef idx="minor"/>
-    </dgm:style>
-  </dgm:styleLbl>
-  <dgm:styleLbl name="trBgShp">
-    <dgm:scene3d>
-      <a:camera prst="orthographicFront"/>
-      <a:lightRig rig="threePt" dir="t"/>
-    </dgm:scene3d>
-    <dgm:sp3d/>
-    <dgm:txPr/>
-    <dgm:style>
-      <a:lnRef idx="0">
-        <a:scrgbClr r="0" g="0" b="0"/>
-      </a:lnRef>
-      <a:fillRef idx="1">
-        <a:scrgbClr r="0" g="0" b="0"/>
-      </a:fillRef>
-      <a:effectRef idx="0">
-        <a:scrgbClr r="0" g="0" b="0"/>
-      </a:effectRef>
-      <a:fontRef idx="minor"/>
-    </dgm:style>
-  </dgm:styleLbl>
-  <dgm:styleLbl name="fgShp">
-    <dgm:scene3d>
-      <a:camera prst="orthographicFront"/>
-      <a:lightRig rig="threePt" dir="t"/>
-    </dgm:scene3d>
-    <dgm:sp3d/>
-    <dgm:txPr/>
-    <dgm:style>
-      <a:lnRef idx="2">
-        <a:scrgbClr r="0" g="0" b="0"/>
-      </a:lnRef>
-      <a:fillRef idx="1">
-        <a:scrgbClr r="0" g="0" b="0"/>
-      </a:fillRef>
-      <a:effectRef idx="0">
-        <a:scrgbClr r="0" g="0" b="0"/>
-      </a:effectRef>
-      <a:fontRef idx="minor"/>
-    </dgm:style>
-  </dgm:styleLbl>
-  <dgm:styleLbl name="revTx">
-    <dgm:scene3d>
-      <a:camera prst="orthographicFront"/>
-      <a:lightRig rig="threePt" dir="t"/>
-    </dgm:scene3d>
-    <dgm:sp3d/>
-    <dgm:txPr/>
-    <dgm:style>
-      <a:lnRef idx="0">
-        <a:scrgbClr r="0" g="0" b="0"/>
-      </a:lnRef>
-      <a:fillRef idx="0">
-        <a:scrgbClr r="0" g="0" b="0"/>
-      </a:fillRef>
-      <a:effectRef idx="0">
-        <a:scrgbClr r="0" g="0" b="0"/>
-      </a:effectRef>
-      <a:fontRef idx="minor"/>
-    </dgm:style>
-  </dgm:styleLbl>
-</dgm:styleDef>
-</file>
-
 <file path=ppt/handoutMasters/handoutMaster1.xml><?xml version="1.0" encoding="utf-8"?>
 <p:handoutMaster xmlns:a="http://schemas.openxmlformats.org/drawingml/2006/main" xmlns:r="http://schemas.openxmlformats.org/officeDocument/2006/relationships" xmlns:p="http://schemas.openxmlformats.org/presentationml/2006/main">
   <p:cSld>
@@ -8207,6 +4457,34 @@
           <a:bodyPr/>
           <a:lstStyle/>
           <a:p>
+            <a:r>
+              <a:rPr lang="en-US" dirty="0"/>
+              <a:t>We start from how to build a team.</a:t>
+            </a:r>
+            <a:br>
+              <a:rPr lang="en-US" dirty="0"/>
+            </a:br>
+            <a:r>
+              <a:rPr lang="en-US" dirty="0"/>
+              <a:t>Then review an architecture blueprint.</a:t>
+            </a:r>
+            <a:br>
+              <a:rPr lang="en-US" dirty="0"/>
+            </a:br>
+            <a:r>
+              <a:rPr lang="en-US" dirty="0"/>
+              <a:t>Finally, we see how could we ensure </a:t>
+            </a:r>
+            <a:r>
+              <a:rPr lang="en-US" b="0" i="0" dirty="0">
+                <a:solidFill>
+                  <a:srgbClr val="222222"/>
+                </a:solidFill>
+                <a:effectLst/>
+                <a:latin typeface="Arial" panose="020B0604020202020204" pitchFamily="34" charset="0"/>
+              </a:rPr>
+              <a:t>success criteria</a:t>
+            </a:r>
             <a:endParaRPr lang="en-US" dirty="0"/>
           </a:p>
         </p:txBody>
@@ -8226,9 +4504,298 @@
           <a:bodyPr/>
           <a:lstStyle/>
           <a:p>
+            <a:fld id="{8530193B-564F-4854-8A52-728F3FB19C85}" type="slidenum">
+              <a:rPr lang="en-US" noProof="0" smtClean="0"/>
+              <a:t>2</a:t>
+            </a:fld>
+            <a:endParaRPr lang="en-US" noProof="0"/>
+          </a:p>
+        </p:txBody>
+      </p:sp>
+    </p:spTree>
+    <p:extLst>
+      <p:ext uri="{BB962C8B-B14F-4D97-AF65-F5344CB8AC3E}">
+        <p14:creationId xmlns:p14="http://schemas.microsoft.com/office/powerpoint/2010/main" val="929680232"/>
+      </p:ext>
+    </p:extLst>
+  </p:cSld>
+  <p:clrMapOvr>
+    <a:masterClrMapping/>
+  </p:clrMapOvr>
+</p:notes>
+</file>
+
+<file path=ppt/notesSlides/notesSlide2.xml><?xml version="1.0" encoding="utf-8"?>
+<p:notes xmlns:a="http://schemas.openxmlformats.org/drawingml/2006/main" xmlns:r="http://schemas.openxmlformats.org/officeDocument/2006/relationships" xmlns:p="http://schemas.openxmlformats.org/presentationml/2006/main">
+  <p:cSld>
+    <p:spTree>
+      <p:nvGrpSpPr>
+        <p:cNvPr id="1" name=""/>
+        <p:cNvGrpSpPr/>
+        <p:nvPr/>
+      </p:nvGrpSpPr>
+      <p:grpSpPr>
+        <a:xfrm>
+          <a:off x="0" y="0"/>
+          <a:ext cx="0" cy="0"/>
+          <a:chOff x="0" y="0"/>
+          <a:chExt cx="0" cy="0"/>
+        </a:xfrm>
+      </p:grpSpPr>
+      <p:sp>
+        <p:nvSpPr>
+          <p:cNvPr id="2" name="Slide Image Placeholder 1"/>
+          <p:cNvSpPr>
+            <a:spLocks noGrp="1" noRot="1" noChangeAspect="1"/>
+          </p:cNvSpPr>
+          <p:nvPr>
+            <p:ph type="sldImg"/>
+          </p:nvPr>
+        </p:nvSpPr>
+        <p:spPr/>
+      </p:sp>
+      <p:sp>
+        <p:nvSpPr>
+          <p:cNvPr id="3" name="Notes Placeholder 2"/>
+          <p:cNvSpPr>
+            <a:spLocks noGrp="1"/>
+          </p:cNvSpPr>
+          <p:nvPr>
+            <p:ph type="body" idx="1"/>
+          </p:nvPr>
+        </p:nvSpPr>
+        <p:spPr/>
+        <p:txBody>
+          <a:bodyPr/>
+          <a:lstStyle/>
+          <a:p>
+            <a:r>
+              <a:rPr lang="en-US" dirty="0"/>
+              <a:t>Talking about building team is really hard to tell now, since I don’t have a clear picture of company vision, mission and culture.</a:t>
+            </a:r>
+            <a:br>
+              <a:rPr lang="en-US" dirty="0"/>
+            </a:br>
+            <a:r>
+              <a:rPr lang="en-US" dirty="0"/>
+              <a:t>Result-oriented: prompt people based on the result, instead of checking how many hours team members are working.</a:t>
+            </a:r>
+            <a:br>
+              <a:rPr lang="en-US" dirty="0"/>
+            </a:br>
+            <a:r>
+              <a:rPr lang="en-US" dirty="0"/>
+              <a:t>Using Tool indicates obstacle or changes, will improve team end-result. (Some people are shy and they hesitate to ask help during Daily standup meeting)</a:t>
+            </a:r>
+            <a:br>
+              <a:rPr lang="en-US" dirty="0"/>
+            </a:br>
+            <a:r>
+              <a:rPr lang="en-US" dirty="0"/>
+              <a:t>Here is my thoughts generally.</a:t>
+            </a:r>
+          </a:p>
+        </p:txBody>
+      </p:sp>
+      <p:sp>
+        <p:nvSpPr>
+          <p:cNvPr id="4" name="Slide Number Placeholder 3"/>
+          <p:cNvSpPr>
+            <a:spLocks noGrp="1"/>
+          </p:cNvSpPr>
+          <p:nvPr>
+            <p:ph type="sldNum" sz="quarter" idx="5"/>
+          </p:nvPr>
+        </p:nvSpPr>
+        <p:spPr/>
+        <p:txBody>
+          <a:bodyPr/>
+          <a:lstStyle/>
+          <a:p>
+            <a:fld id="{8530193B-564F-4854-8A52-728F3FB19C85}" type="slidenum">
+              <a:rPr lang="en-US" noProof="0" smtClean="0"/>
+              <a:t>3</a:t>
+            </a:fld>
+            <a:endParaRPr lang="en-US" noProof="0"/>
+          </a:p>
+        </p:txBody>
+      </p:sp>
+    </p:spTree>
+    <p:extLst>
+      <p:ext uri="{BB962C8B-B14F-4D97-AF65-F5344CB8AC3E}">
+        <p14:creationId xmlns:p14="http://schemas.microsoft.com/office/powerpoint/2010/main" val="1243674461"/>
+      </p:ext>
+    </p:extLst>
+  </p:cSld>
+  <p:clrMapOvr>
+    <a:masterClrMapping/>
+  </p:clrMapOvr>
+</p:notes>
+</file>
+
+<file path=ppt/notesSlides/notesSlide3.xml><?xml version="1.0" encoding="utf-8"?>
+<p:notes xmlns:a="http://schemas.openxmlformats.org/drawingml/2006/main" xmlns:r="http://schemas.openxmlformats.org/officeDocument/2006/relationships" xmlns:p="http://schemas.openxmlformats.org/presentationml/2006/main">
+  <p:cSld>
+    <p:spTree>
+      <p:nvGrpSpPr>
+        <p:cNvPr id="1" name=""/>
+        <p:cNvGrpSpPr/>
+        <p:nvPr/>
+      </p:nvGrpSpPr>
+      <p:grpSpPr>
+        <a:xfrm>
+          <a:off x="0" y="0"/>
+          <a:ext cx="0" cy="0"/>
+          <a:chOff x="0" y="0"/>
+          <a:chExt cx="0" cy="0"/>
+        </a:xfrm>
+      </p:grpSpPr>
+      <p:sp>
+        <p:nvSpPr>
+          <p:cNvPr id="2" name="Slide Image Placeholder 1"/>
+          <p:cNvSpPr>
+            <a:spLocks noGrp="1" noRot="1" noChangeAspect="1"/>
+          </p:cNvSpPr>
+          <p:nvPr>
+            <p:ph type="sldImg"/>
+          </p:nvPr>
+        </p:nvSpPr>
+        <p:spPr/>
+      </p:sp>
+      <p:sp>
+        <p:nvSpPr>
+          <p:cNvPr id="3" name="Notes Placeholder 2"/>
+          <p:cNvSpPr>
+            <a:spLocks noGrp="1"/>
+          </p:cNvSpPr>
+          <p:nvPr>
+            <p:ph type="body" idx="1"/>
+          </p:nvPr>
+        </p:nvSpPr>
+        <p:spPr/>
+        <p:txBody>
+          <a:bodyPr/>
+          <a:lstStyle/>
+          <a:p>
+            <a:r>
+              <a:rPr lang="en-US" dirty="0"/>
+              <a:t>This is a draft architecture design based on what I learn from my interviews. Definitely need to review and adjust. </a:t>
+            </a:r>
+          </a:p>
+        </p:txBody>
+      </p:sp>
+      <p:sp>
+        <p:nvSpPr>
+          <p:cNvPr id="4" name="Slide Number Placeholder 3"/>
+          <p:cNvSpPr>
+            <a:spLocks noGrp="1"/>
+          </p:cNvSpPr>
+          <p:nvPr>
+            <p:ph type="sldNum" sz="quarter" idx="5"/>
+          </p:nvPr>
+        </p:nvSpPr>
+        <p:spPr/>
+        <p:txBody>
+          <a:bodyPr/>
+          <a:lstStyle/>
+          <a:p>
+            <a:fld id="{8530193B-564F-4854-8A52-728F3FB19C85}" type="slidenum">
+              <a:rPr lang="en-US" noProof="0" smtClean="0"/>
+              <a:t>4</a:t>
+            </a:fld>
+            <a:endParaRPr lang="en-US" noProof="0"/>
+          </a:p>
+        </p:txBody>
+      </p:sp>
+    </p:spTree>
+    <p:extLst>
+      <p:ext uri="{BB962C8B-B14F-4D97-AF65-F5344CB8AC3E}">
+        <p14:creationId xmlns:p14="http://schemas.microsoft.com/office/powerpoint/2010/main" val="2975680177"/>
+      </p:ext>
+    </p:extLst>
+  </p:cSld>
+  <p:clrMapOvr>
+    <a:masterClrMapping/>
+  </p:clrMapOvr>
+</p:notes>
+</file>
+
+<file path=ppt/notesSlides/notesSlide4.xml><?xml version="1.0" encoding="utf-8"?>
+<p:notes xmlns:a="http://schemas.openxmlformats.org/drawingml/2006/main" xmlns:r="http://schemas.openxmlformats.org/officeDocument/2006/relationships" xmlns:p="http://schemas.openxmlformats.org/presentationml/2006/main">
+  <p:cSld>
+    <p:spTree>
+      <p:nvGrpSpPr>
+        <p:cNvPr id="1" name=""/>
+        <p:cNvGrpSpPr/>
+        <p:nvPr/>
+      </p:nvGrpSpPr>
+      <p:grpSpPr>
+        <a:xfrm>
+          <a:off x="0" y="0"/>
+          <a:ext cx="0" cy="0"/>
+          <a:chOff x="0" y="0"/>
+          <a:chExt cx="0" cy="0"/>
+        </a:xfrm>
+      </p:grpSpPr>
+      <p:sp>
+        <p:nvSpPr>
+          <p:cNvPr id="2" name="Slide Image Placeholder 1"/>
+          <p:cNvSpPr>
+            <a:spLocks noGrp="1" noRot="1" noChangeAspect="1"/>
+          </p:cNvSpPr>
+          <p:nvPr>
+            <p:ph type="sldImg"/>
+          </p:nvPr>
+        </p:nvSpPr>
+        <p:spPr/>
+      </p:sp>
+      <p:sp>
+        <p:nvSpPr>
+          <p:cNvPr id="3" name="Notes Placeholder 2"/>
+          <p:cNvSpPr>
+            <a:spLocks noGrp="1"/>
+          </p:cNvSpPr>
+          <p:nvPr>
+            <p:ph type="body" idx="1"/>
+          </p:nvPr>
+        </p:nvSpPr>
+        <p:spPr/>
+        <p:txBody>
+          <a:bodyPr/>
+          <a:lstStyle/>
+          <a:p>
+            <a:r>
+              <a:rPr lang="en-US" dirty="0"/>
+              <a:t>As soon as business value and customer changed, Success criteria might also change and it needs review.</a:t>
+            </a:r>
+            <a:br>
+              <a:rPr lang="en-US" dirty="0"/>
+            </a:br>
+            <a:r>
+              <a:rPr lang="en-US" dirty="0"/>
+              <a:t>Shared understanding of these criteria is a vital key.</a:t>
+            </a:r>
+          </a:p>
+        </p:txBody>
+      </p:sp>
+      <p:sp>
+        <p:nvSpPr>
+          <p:cNvPr id="4" name="Slide Number Placeholder 3"/>
+          <p:cNvSpPr>
+            <a:spLocks noGrp="1"/>
+          </p:cNvSpPr>
+          <p:nvPr>
+            <p:ph type="sldNum" sz="quarter" idx="5"/>
+          </p:nvPr>
+        </p:nvSpPr>
+        <p:spPr/>
+        <p:txBody>
+          <a:bodyPr/>
+          <a:lstStyle/>
+          <a:p>
             <a:fld id="{5A226AB8-ACBE-42E6-92F5-667EDDCD9652}" type="slidenum">
               <a:rPr lang="en-US" smtClean="0"/>
-              <a:t>6</a:t>
+              <a:t>5</a:t>
             </a:fld>
             <a:endParaRPr lang="en-US" dirty="0"/>
           </a:p>
@@ -17509,7 +14076,7 @@
           <a:p>
             <a:r>
               <a:rPr lang="en-US" dirty="0"/>
-              <a:t>How to Build a Team</a:t>
+              <a:t> How to Build   a Team </a:t>
             </a:r>
           </a:p>
         </p:txBody>
@@ -17683,30 +14250,8 @@
           </p:nvPr>
         </p:nvPicPr>
         <p:blipFill>
-          <a:blip r:embed="rId2">
-            <a:duotone>
-              <a:prstClr val="black"/>
-              <a:schemeClr val="tx2">
-                <a:tint val="45000"/>
-                <a:satMod val="400000"/>
-              </a:schemeClr>
-            </a:duotone>
-            <a:extLst>
-              <a:ext uri="{BEBA8EAE-BF5A-486C-A8C5-ECC9F3942E4B}">
-                <a14:imgProps xmlns:a14="http://schemas.microsoft.com/office/drawing/2010/main">
-                  <a14:imgLayer r:embed="rId3">
-                    <a14:imgEffect>
-                      <a14:colorTemperature colorTemp="6599"/>
-                    </a14:imgEffect>
-                    <a14:imgEffect>
-                      <a14:saturation sat="59000"/>
-                    </a14:imgEffect>
-                  </a14:imgLayer>
-                </a14:imgProps>
-              </a:ext>
-            </a:extLst>
-          </a:blip>
-          <a:srcRect t="10897" b="10897"/>
+          <a:blip r:embed="rId3"/>
+          <a:srcRect t="32" b="32"/>
           <a:stretch/>
         </p:blipFill>
         <p:spPr>
@@ -17822,7 +14367,7 @@
           <p:nvPr>
             <p:extLst>
               <p:ext uri="{D42A27DB-BD31-4B8C-83A1-F6EECF244321}">
-                <p14:modId xmlns:p14="http://schemas.microsoft.com/office/powerpoint/2010/main" val="32988410"/>
+                <p14:modId xmlns:p14="http://schemas.microsoft.com/office/powerpoint/2010/main" val="4282746211"/>
               </p:ext>
             </p:extLst>
           </p:nvPr>
@@ -17948,7 +14493,7 @@
     </p:spTree>
     <p:extLst>
       <p:ext uri="{BB962C8B-B14F-4D97-AF65-F5344CB8AC3E}">
-        <p14:creationId xmlns:p14="http://schemas.microsoft.com/office/powerpoint/2010/main" val="3056176707"/>
+        <p14:creationId xmlns:p14="http://schemas.microsoft.com/office/powerpoint/2010/main" val="388257012"/>
       </p:ext>
     </p:extLst>
   </p:cSld>
@@ -17977,10 +14522,10 @@
       </p:grpSpPr>
       <p:pic>
         <p:nvPicPr>
-          <p:cNvPr id="11" name="Picture Placeholder 10">
+          <p:cNvPr id="12" name="Picture Placeholder 11">
             <a:extLst>
               <a:ext uri="{FF2B5EF4-FFF2-40B4-BE49-F238E27FC236}">
-                <a16:creationId xmlns:a16="http://schemas.microsoft.com/office/drawing/2014/main" id="{BD4658D3-8B25-4812-8BDB-869FB73EEE88}"/>
+                <a16:creationId xmlns:a16="http://schemas.microsoft.com/office/drawing/2014/main" id="{8F5AE0D5-C196-A947-8AFE-449A48B26153}"/>
               </a:ext>
             </a:extLst>
           </p:cNvPr>
@@ -17992,288 +14537,7 @@
           </p:nvPr>
         </p:nvPicPr>
         <p:blipFill>
-          <a:blip r:embed="rId2"/>
-          <a:srcRect t="9957" b="9957"/>
-          <a:stretch/>
-        </p:blipFill>
-        <p:spPr>
-          <a:xfrm>
-            <a:off x="0" y="1"/>
-            <a:ext cx="12192000" cy="6371350"/>
-          </a:xfrm>
-        </p:spPr>
-      </p:pic>
-      <p:sp>
-        <p:nvSpPr>
-          <p:cNvPr id="6" name="Slide Number Placeholder 5">
-            <a:extLst>
-              <a:ext uri="{FF2B5EF4-FFF2-40B4-BE49-F238E27FC236}">
-                <a16:creationId xmlns:a16="http://schemas.microsoft.com/office/drawing/2014/main" id="{48CC7997-CF71-452E-A736-8569100DD84D}"/>
-              </a:ext>
-            </a:extLst>
-          </p:cNvPr>
-          <p:cNvSpPr>
-            <a:spLocks noGrp="1"/>
-          </p:cNvSpPr>
-          <p:nvPr>
-            <p:ph type="sldNum" sz="quarter" idx="15"/>
-          </p:nvPr>
-        </p:nvSpPr>
-        <p:spPr/>
-        <p:txBody>
-          <a:bodyPr/>
-          <a:lstStyle/>
-          <a:p>
-            <a:fld id="{19B51A1E-902D-48AF-9020-955120F399B6}" type="slidenum">
-              <a:rPr lang="en-US" noProof="0" smtClean="0"/>
-              <a:pPr/>
-              <a:t>3</a:t>
-            </a:fld>
-            <a:endParaRPr lang="en-US" noProof="0" dirty="0"/>
-          </a:p>
-        </p:txBody>
-      </p:sp>
-      <p:sp>
-        <p:nvSpPr>
-          <p:cNvPr id="13" name="Oval 12">
-            <a:extLst>
-              <a:ext uri="{FF2B5EF4-FFF2-40B4-BE49-F238E27FC236}">
-                <a16:creationId xmlns:a16="http://schemas.microsoft.com/office/drawing/2014/main" id="{78135626-33D6-4F99-8349-D05BBD58D5C9}"/>
-              </a:ext>
-              <a:ext uri="{C183D7F6-B498-43B3-948B-1728B52AA6E4}">
-                <adec:decorative xmlns:adec="http://schemas.microsoft.com/office/drawing/2017/decorative" val="1"/>
-              </a:ext>
-            </a:extLst>
-          </p:cNvPr>
-          <p:cNvSpPr/>
-          <p:nvPr/>
-        </p:nvSpPr>
-        <p:spPr>
-          <a:xfrm>
-            <a:off x="6304922" y="3917020"/>
-            <a:ext cx="1212102" cy="1220097"/>
-          </a:xfrm>
-          <a:prstGeom prst="ellipse">
-            <a:avLst/>
-          </a:prstGeom>
-          <a:solidFill>
-            <a:srgbClr val="FFC000"/>
-          </a:solidFill>
-          <a:ln>
-            <a:noFill/>
-          </a:ln>
-        </p:spPr>
-        <p:style>
-          <a:lnRef idx="2">
-            <a:schemeClr val="accent1">
-              <a:shade val="50000"/>
-            </a:schemeClr>
-          </a:lnRef>
-          <a:fillRef idx="1">
-            <a:schemeClr val="accent1"/>
-          </a:fillRef>
-          <a:effectRef idx="0">
-            <a:schemeClr val="accent1"/>
-          </a:effectRef>
-          <a:fontRef idx="minor">
-            <a:schemeClr val="lt1"/>
-          </a:fontRef>
-        </p:style>
-        <p:txBody>
-          <a:bodyPr rtlCol="0" anchor="ctr"/>
-          <a:lstStyle/>
-          <a:p>
-            <a:pPr algn="ctr"/>
-            <a:r>
-              <a:rPr lang="en-US" sz="1600" b="1" dirty="0">
-                <a:solidFill>
-                  <a:schemeClr val="tx1"/>
-                </a:solidFill>
-                <a:latin typeface="+mj-lt"/>
-              </a:rPr>
-              <a:t>Agenda</a:t>
-            </a:r>
-          </a:p>
-        </p:txBody>
-      </p:sp>
-      <p:graphicFrame>
-        <p:nvGraphicFramePr>
-          <p:cNvPr id="21" name="Diagram 20">
-            <a:extLst>
-              <a:ext uri="{FF2B5EF4-FFF2-40B4-BE49-F238E27FC236}">
-                <a16:creationId xmlns:a16="http://schemas.microsoft.com/office/drawing/2014/main" id="{03E4D674-F8B5-4A66-84C5-D60B9CA9570E}"/>
-              </a:ext>
-            </a:extLst>
-          </p:cNvPr>
-          <p:cNvGraphicFramePr/>
-          <p:nvPr/>
-        </p:nvGraphicFramePr>
-        <p:xfrm>
-          <a:off x="7558481" y="3296873"/>
-          <a:ext cx="4083413" cy="2460393"/>
-        </p:xfrm>
-        <a:graphic>
-          <a:graphicData uri="http://schemas.openxmlformats.org/drawingml/2006/diagram">
-            <dgm:relIds xmlns:dgm="http://schemas.openxmlformats.org/drawingml/2006/diagram" xmlns:r="http://schemas.openxmlformats.org/officeDocument/2006/relationships" r:dm="rId3" r:lo="rId4" r:qs="rId5" r:cs="rId6"/>
-          </a:graphicData>
-        </a:graphic>
-      </p:graphicFrame>
-      <p:pic>
-        <p:nvPicPr>
-          <p:cNvPr id="3" name="Graphic 2" descr="Puzzle pieces">
-            <a:extLst>
-              <a:ext uri="{FF2B5EF4-FFF2-40B4-BE49-F238E27FC236}">
-                <a16:creationId xmlns:a16="http://schemas.microsoft.com/office/drawing/2014/main" id="{00249C1D-787F-4FCB-80D6-7CAD447562C4}"/>
-              </a:ext>
-            </a:extLst>
-          </p:cNvPr>
-          <p:cNvPicPr>
-            <a:picLocks noChangeAspect="1"/>
-          </p:cNvPicPr>
-          <p:nvPr/>
-        </p:nvPicPr>
-        <p:blipFill>
-          <a:blip r:embed="rId8">
-            <a:extLst>
-              <a:ext uri="{96DAC541-7B7A-43D3-8B79-37D633B846F1}">
-                <asvg:svgBlip xmlns:asvg="http://schemas.microsoft.com/office/drawing/2016/SVG/main" r:embed="rId9"/>
-              </a:ext>
-            </a:extLst>
-          </a:blip>
-          <a:stretch>
-            <a:fillRect/>
-          </a:stretch>
-        </p:blipFill>
-        <p:spPr>
-          <a:xfrm>
-            <a:off x="7859872" y="4284031"/>
-            <a:ext cx="457200" cy="457200"/>
-          </a:xfrm>
-          <a:prstGeom prst="rect">
-            <a:avLst/>
-          </a:prstGeom>
-        </p:spPr>
-      </p:pic>
-      <p:pic>
-        <p:nvPicPr>
-          <p:cNvPr id="7" name="Graphic 6" descr="Cheers">
-            <a:extLst>
-              <a:ext uri="{FF2B5EF4-FFF2-40B4-BE49-F238E27FC236}">
-                <a16:creationId xmlns:a16="http://schemas.microsoft.com/office/drawing/2014/main" id="{2CCA0A4A-2BC6-40CE-B2D0-21E2D44EAD75}"/>
-              </a:ext>
-            </a:extLst>
-          </p:cNvPr>
-          <p:cNvPicPr>
-            <a:picLocks noChangeAspect="1"/>
-          </p:cNvPicPr>
-          <p:nvPr/>
-        </p:nvPicPr>
-        <p:blipFill>
-          <a:blip r:embed="rId10">
-            <a:extLst>
-              <a:ext uri="{96DAC541-7B7A-43D3-8B79-37D633B846F1}">
-                <asvg:svgBlip xmlns:asvg="http://schemas.microsoft.com/office/drawing/2016/SVG/main" r:embed="rId11"/>
-              </a:ext>
-            </a:extLst>
-          </a:blip>
-          <a:stretch>
-            <a:fillRect/>
-          </a:stretch>
-        </p:blipFill>
-        <p:spPr>
-          <a:xfrm>
-            <a:off x="7667719" y="3578515"/>
-            <a:ext cx="457200" cy="457200"/>
-          </a:xfrm>
-          <a:prstGeom prst="rect">
-            <a:avLst/>
-          </a:prstGeom>
-        </p:spPr>
-      </p:pic>
-      <p:pic>
-        <p:nvPicPr>
-          <p:cNvPr id="9" name="Graphic 8" descr="Group brainstorm">
-            <a:extLst>
-              <a:ext uri="{FF2B5EF4-FFF2-40B4-BE49-F238E27FC236}">
-                <a16:creationId xmlns:a16="http://schemas.microsoft.com/office/drawing/2014/main" id="{6CEB5C8E-1471-4651-B836-044163E417ED}"/>
-              </a:ext>
-            </a:extLst>
-          </p:cNvPr>
-          <p:cNvPicPr>
-            <a:picLocks noChangeAspect="1"/>
-          </p:cNvPicPr>
-          <p:nvPr/>
-        </p:nvPicPr>
-        <p:blipFill>
-          <a:blip r:embed="rId12">
-            <a:extLst>
-              <a:ext uri="{96DAC541-7B7A-43D3-8B79-37D633B846F1}">
-                <asvg:svgBlip xmlns:asvg="http://schemas.microsoft.com/office/drawing/2016/SVG/main" r:embed="rId13"/>
-              </a:ext>
-            </a:extLst>
-          </a:blip>
-          <a:stretch>
-            <a:fillRect/>
-          </a:stretch>
-        </p:blipFill>
-        <p:spPr>
-          <a:xfrm>
-            <a:off x="7658388" y="5006646"/>
-            <a:ext cx="457200" cy="457200"/>
-          </a:xfrm>
-          <a:prstGeom prst="rect">
-            <a:avLst/>
-          </a:prstGeom>
-        </p:spPr>
-      </p:pic>
-    </p:spTree>
-    <p:extLst>
-      <p:ext uri="{BB962C8B-B14F-4D97-AF65-F5344CB8AC3E}">
-        <p14:creationId xmlns:p14="http://schemas.microsoft.com/office/powerpoint/2010/main" val="3754258965"/>
-      </p:ext>
-    </p:extLst>
-  </p:cSld>
-  <p:clrMapOvr>
-    <a:masterClrMapping/>
-  </p:clrMapOvr>
-</p:sld>
-</file>
-
-<file path=ppt/slides/slide4.xml><?xml version="1.0" encoding="utf-8"?>
-<p:sld xmlns:a="http://schemas.openxmlformats.org/drawingml/2006/main" xmlns:r="http://schemas.openxmlformats.org/officeDocument/2006/relationships" xmlns:p="http://schemas.openxmlformats.org/presentationml/2006/main">
-  <p:cSld>
-    <p:spTree>
-      <p:nvGrpSpPr>
-        <p:cNvPr id="1" name=""/>
-        <p:cNvGrpSpPr/>
-        <p:nvPr/>
-      </p:nvGrpSpPr>
-      <p:grpSpPr>
-        <a:xfrm>
-          <a:off x="0" y="0"/>
-          <a:ext cx="0" cy="0"/>
-          <a:chOff x="0" y="0"/>
-          <a:chExt cx="0" cy="0"/>
-        </a:xfrm>
-      </p:grpSpPr>
-      <p:pic>
-        <p:nvPicPr>
-          <p:cNvPr id="12" name="Picture Placeholder 11">
-            <a:extLst>
-              <a:ext uri="{FF2B5EF4-FFF2-40B4-BE49-F238E27FC236}">
-                <a16:creationId xmlns:a16="http://schemas.microsoft.com/office/drawing/2014/main" id="{8F5AE0D5-C196-A947-8AFE-449A48B26153}"/>
-              </a:ext>
-            </a:extLst>
-          </p:cNvPr>
-          <p:cNvPicPr>
-            <a:picLocks noGrp="1" noChangeAspect="1"/>
-          </p:cNvPicPr>
-          <p:nvPr>
-            <p:ph type="pic" sz="quarter" idx="14"/>
-          </p:nvPr>
-        </p:nvPicPr>
-        <p:blipFill>
-          <a:blip r:embed="rId2"/>
+          <a:blip r:embed="rId3"/>
           <a:srcRect t="10806" b="10806"/>
           <a:stretch/>
         </p:blipFill>
@@ -18308,7 +14572,7 @@
             <a:fld id="{19B51A1E-902D-48AF-9020-955120F399B6}" type="slidenum">
               <a:rPr lang="en-US" smtClean="0"/>
               <a:pPr/>
-              <a:t>4</a:t>
+              <a:t>3</a:t>
             </a:fld>
             <a:endParaRPr lang="en-US" dirty="0"/>
           </a:p>
@@ -18750,7 +15014,7 @@
                 <a:ea typeface="Calibri" panose="020F0502020204030204" pitchFamily="34" charset="0"/>
                 <a:cs typeface="Arial" panose="020B0604020202020204" pitchFamily="34" charset="0"/>
               </a:rPr>
-              <a:t>Close attention to team working.</a:t>
+              <a:t>Close attention to the team working.</a:t>
             </a:r>
           </a:p>
           <a:p>
@@ -18765,7 +15029,7 @@
                 <a:ea typeface="Calibri" panose="020F0502020204030204" pitchFamily="34" charset="0"/>
                 <a:cs typeface="Arial" panose="020B0604020202020204" pitchFamily="34" charset="0"/>
               </a:rPr>
-              <a:t>Learn and prepare action plan in agile way.</a:t>
+              <a:t>Learn and prepare the action plan in an agile way.</a:t>
             </a:r>
           </a:p>
           <a:p>
@@ -19069,7 +15333,7 @@
                 <a:ea typeface="Calibri" panose="020F0502020204030204" pitchFamily="34" charset="0"/>
                 <a:cs typeface="Arial" panose="020B0604020202020204" pitchFamily="34" charset="0"/>
               </a:rPr>
-              <a:t>Learn culture, standard and processes.</a:t>
+              <a:t>Learn culture, standards and processes.</a:t>
             </a:r>
           </a:p>
         </p:txBody>
@@ -19478,7 +15742,7 @@
                 <a:ea typeface="Calibri" panose="020F0502020204030204" pitchFamily="34" charset="0"/>
                 <a:cs typeface="Arial" panose="020B0604020202020204" pitchFamily="34" charset="0"/>
               </a:rPr>
-              <a:t>Creating transparency and trust.</a:t>
+              <a:t>Create transparency and trust.</a:t>
             </a:r>
           </a:p>
         </p:txBody>
@@ -20025,7 +16289,7 @@
                 <a:ea typeface="Calibri" panose="020F0502020204030204" pitchFamily="34" charset="0"/>
                 <a:cs typeface="Arial" panose="020B0604020202020204" pitchFamily="34" charset="0"/>
               </a:rPr>
-              <a:t>Help team to review themselves individually.</a:t>
+              <a:t>Help the team to review themselves individually.</a:t>
             </a:r>
           </a:p>
         </p:txBody>
@@ -20457,7 +16721,7 @@
 </p:sld>
 </file>
 
-<file path=ppt/slides/slide5.xml><?xml version="1.0" encoding="utf-8"?>
+<file path=ppt/slides/slide4.xml><?xml version="1.0" encoding="utf-8"?>
 <p:sld xmlns:a="http://schemas.openxmlformats.org/drawingml/2006/main" xmlns:r="http://schemas.openxmlformats.org/officeDocument/2006/relationships" xmlns:p="http://schemas.openxmlformats.org/presentationml/2006/main">
   <p:cSld>
     <p:spTree>
@@ -20491,7 +16755,7 @@
           </p:nvPr>
         </p:nvPicPr>
         <p:blipFill>
-          <a:blip r:embed="rId2"/>
+          <a:blip r:embed="rId3"/>
           <a:srcRect l="8" r="8"/>
           <a:stretch/>
         </p:blipFill>
@@ -20572,7 +16836,7 @@
             <a:fld id="{19B51A1E-902D-48AF-9020-955120F399B6}" type="slidenum">
               <a:rPr lang="en-US" smtClean="0"/>
               <a:pPr/>
-              <a:t>5</a:t>
+              <a:t>4</a:t>
             </a:fld>
             <a:endParaRPr lang="en-US" dirty="0"/>
           </a:p>
@@ -20676,7 +16940,7 @@
           <p:nvPr/>
         </p:nvPicPr>
         <p:blipFill>
-          <a:blip r:embed="rId3"/>
+          <a:blip r:embed="rId4"/>
           <a:stretch>
             <a:fillRect/>
           </a:stretch>
@@ -20706,7 +16970,7 @@
           <p:nvPr/>
         </p:nvPicPr>
         <p:blipFill>
-          <a:blip r:embed="rId4"/>
+          <a:blip r:embed="rId5"/>
           <a:stretch>
             <a:fillRect/>
           </a:stretch>
@@ -20734,7 +16998,7 @@
 </p:sld>
 </file>
 
-<file path=ppt/slides/slide6.xml><?xml version="1.0" encoding="utf-8"?>
+<file path=ppt/slides/slide5.xml><?xml version="1.0" encoding="utf-8"?>
 <p:sld xmlns:a="http://schemas.openxmlformats.org/drawingml/2006/main" xmlns:r="http://schemas.openxmlformats.org/officeDocument/2006/relationships" xmlns:p="http://schemas.openxmlformats.org/presentationml/2006/main">
   <p:cSld>
     <p:spTree>
@@ -20774,7 +17038,7 @@
           <a:p>
             <a:fld id="{5A4A7955-6230-48B4-BD8B-A7C460F75945}" type="slidenum">
               <a:rPr lang="en-US" smtClean="0"/>
-              <a:t>6</a:t>
+              <a:t>5</a:t>
             </a:fld>
             <a:endParaRPr lang="en-US" dirty="0"/>
           </a:p>
@@ -23424,7 +19688,7 @@
                 </a:solidFill>
               </a:rPr>
               <a:pPr algn="ctr"/>
-              <a:t>6</a:t>
+              <a:t>5</a:t>
             </a:fld>
             <a:endParaRPr lang="en-US" sz="1200" dirty="0">
               <a:solidFill>
@@ -23448,8 +19712,8 @@
         </p:nvSpPr>
         <p:spPr>
           <a:xfrm>
-            <a:off x="5081120" y="3359550"/>
-            <a:ext cx="2117246" cy="1154162"/>
+            <a:off x="5020205" y="3359550"/>
+            <a:ext cx="2239076" cy="1154162"/>
           </a:xfrm>
           <a:prstGeom prst="rect">
             <a:avLst/>
@@ -23472,7 +19736,7 @@
             </a:br>
             <a:r>
               <a:rPr lang="en-US" dirty="0"/>
-              <a:t>Share Responsibility </a:t>
+              <a:t>Shared Responsibility </a:t>
             </a:r>
             <a:br>
               <a:rPr lang="en-US" dirty="0"/>
@@ -23493,7 +19757,7 @@
             </a:br>
             <a:r>
               <a:rPr lang="en-US" sz="1100" dirty="0"/>
-              <a:t>Architect, DEV, QA</a:t>
+              <a:t>Architect, Dev, QA</a:t>
             </a:r>
             <a:endParaRPr lang="en-US" sz="1000" dirty="0"/>
           </a:p>
@@ -24275,7 +20539,7 @@
 </p:sld>
 </file>
 
-<file path=ppt/slides/slide7.xml><?xml version="1.0" encoding="utf-8"?>
+<file path=ppt/slides/slide6.xml><?xml version="1.0" encoding="utf-8"?>
 <p:sld xmlns:a="http://schemas.openxmlformats.org/drawingml/2006/main" xmlns:r="http://schemas.openxmlformats.org/officeDocument/2006/relationships" xmlns:p="http://schemas.openxmlformats.org/presentationml/2006/main">
   <p:cSld>
     <p:spTree>
@@ -24485,7 +20749,7 @@
             <a:fld id="{19B51A1E-902D-48AF-9020-955120F399B6}" type="slidenum">
               <a:rPr lang="en-US" smtClean="0"/>
               <a:pPr/>
-              <a:t>7</a:t>
+              <a:t>6</a:t>
             </a:fld>
             <a:endParaRPr lang="en-US" dirty="0"/>
           </a:p>
@@ -24768,7 +21032,7 @@
                 </a:solidFill>
                 <a:effectLst/>
               </a:rPr>
-              <a:t> and it may contain false assumption or confidential information.</a:t>
+              <a:t> and it may contain false assumptions or confidential information.</a:t>
             </a:r>
           </a:p>
         </p:txBody>

</xml_diff>